<commit_message>
lee edits to powerpoint
</commit_message>
<xml_diff>
--- a/project_3_presentation.pptx
+++ b/project_3_presentation.pptx
@@ -5,17 +5,21 @@
     <p:sldMasterId id="2147483656" r:id="rId4"/>
   </p:sldMasterIdLst>
   <p:notesMasterIdLst>
-    <p:notesMasterId r:id="rId10"/>
+    <p:notesMasterId r:id="rId14"/>
   </p:notesMasterIdLst>
   <p:handoutMasterIdLst>
-    <p:handoutMasterId r:id="rId11"/>
+    <p:handoutMasterId r:id="rId15"/>
   </p:handoutMasterIdLst>
   <p:sldIdLst>
     <p:sldId id="1024" r:id="rId5"/>
     <p:sldId id="1030" r:id="rId6"/>
     <p:sldId id="1031" r:id="rId7"/>
-    <p:sldId id="1033" r:id="rId8"/>
-    <p:sldId id="1032" r:id="rId9"/>
+    <p:sldId id="1034" r:id="rId8"/>
+    <p:sldId id="1033" r:id="rId9"/>
+    <p:sldId id="1032" r:id="rId10"/>
+    <p:sldId id="1035" r:id="rId11"/>
+    <p:sldId id="1036" r:id="rId12"/>
+    <p:sldId id="1037" r:id="rId13"/>
   </p:sldIdLst>
   <p:sldSz cx="9144000" cy="6858000" type="screen4x3"/>
   <p:notesSz cx="6973888" cy="9236075"/>
@@ -240,7 +244,7 @@
           <a:p>
             <a:fld id="{52E54C03-13CE-40C0-B42C-6EDFF4D54357}" type="datetimeFigureOut">
               <a:rPr lang="en-US" smtClean="0"/>
-              <a:t>5/11/2019</a:t>
+              <a:t>5/14/2019</a:t>
             </a:fld>
             <a:endParaRPr lang="en-US"/>
           </a:p>
@@ -405,7 +409,7 @@
           <a:p>
             <a:fld id="{7159C058-D2F1-4477-8515-F50B3956F3CD}" type="datetimeFigureOut">
               <a:rPr lang="en-US" smtClean="0"/>
-              <a:t>5/11/2019</a:t>
+              <a:t>5/14/2019</a:t>
             </a:fld>
             <a:endParaRPr lang="en-US"/>
           </a:p>
@@ -2152,10 +2156,9 @@
           <a:lstStyle/>
           <a:p>
             <a:r>
-              <a:rPr lang="en-US" sz="2000" dirty="0" smtClean="0"/>
+              <a:rPr lang="en-US" sz="2000" dirty="0"/>
               <a:t>Eric Franco           Carlos Maqueda           Lee Taylor </a:t>
             </a:r>
-            <a:endParaRPr lang="en-US" sz="2000" dirty="0"/>
           </a:p>
         </p:txBody>
       </p:sp>
@@ -2181,10 +2184,9 @@
           <a:lstStyle/>
           <a:p>
             <a:r>
-              <a:rPr lang="en-US" sz="2400" dirty="0" smtClean="0"/>
+              <a:rPr lang="en-US" sz="2400" dirty="0"/>
               <a:t>xxxx</a:t>
             </a:r>
-            <a:endParaRPr lang="en-US" sz="2400" dirty="0"/>
           </a:p>
         </p:txBody>
       </p:sp>
@@ -2235,7 +2237,10 @@
           </a:bodyPr>
           <a:lstStyle/>
           <a:p>
-            <a:endParaRPr lang="en-US" sz="3200" dirty="0"/>
+            <a:r>
+              <a:rPr lang="en-US" sz="3200" dirty="0"/>
+              <a:t>Project Objectives</a:t>
+            </a:r>
           </a:p>
         </p:txBody>
       </p:sp>
@@ -2265,25 +2270,84 @@
               <a:buNone/>
             </a:pPr>
             <a:r>
-              <a:rPr lang="en-US" sz="2200" b="1" dirty="0" smtClean="0"/>
-              <a:t>xxxx</a:t>
-            </a:r>
-            <a:endParaRPr lang="en-US" sz="2200" b="1" dirty="0"/>
-          </a:p>
-          <a:p>
-            <a:r>
-              <a:rPr lang="en-US" sz="2200" dirty="0" smtClean="0"/>
-              <a:t>xxxx</a:t>
-            </a:r>
-            <a:endParaRPr lang="en-US" sz="2200" dirty="0"/>
+              <a:rPr lang="en-US" sz="2200" b="1" dirty="0"/>
+              <a:t>Explore real estate prices and relevant pricing variables</a:t>
+            </a:r>
+          </a:p>
+          <a:p>
+            <a:r>
+              <a:rPr lang="en-US" sz="2200" dirty="0"/>
+              <a:t>Databases used:</a:t>
+            </a:r>
           </a:p>
           <a:p>
             <a:pPr lvl="1"/>
             <a:r>
-              <a:rPr lang="en-US" sz="2200" i="1" dirty="0" err="1" smtClean="0"/>
-              <a:t>xxxxx</a:t>
-            </a:r>
-            <a:endParaRPr lang="en-US" sz="2200" i="1" dirty="0"/>
+              <a:rPr lang="en-US" sz="2200" i="1" dirty="0"/>
+              <a:t>Zillow</a:t>
+            </a:r>
+          </a:p>
+          <a:p>
+            <a:pPr lvl="1"/>
+            <a:r>
+              <a:rPr lang="en-US" sz="2200" i="1" dirty="0"/>
+              <a:t>Census</a:t>
+            </a:r>
+          </a:p>
+          <a:p>
+            <a:pPr lvl="1"/>
+            <a:r>
+              <a:rPr lang="en-US" sz="2200" i="1" dirty="0"/>
+              <a:t>IRS</a:t>
+            </a:r>
+          </a:p>
+          <a:p>
+            <a:r>
+              <a:rPr lang="en-US" sz="2400" i="1" dirty="0"/>
+              <a:t>Variables explored:</a:t>
+            </a:r>
+          </a:p>
+          <a:p>
+            <a:pPr lvl="1"/>
+            <a:r>
+              <a:rPr lang="en-US" sz="2200" i="1" dirty="0"/>
+              <a:t>Mortgage Rates</a:t>
+            </a:r>
+          </a:p>
+          <a:p>
+            <a:pPr lvl="1"/>
+            <a:r>
+              <a:rPr lang="en-US" sz="2200" i="1" dirty="0"/>
+              <a:t>Yield Curve</a:t>
+            </a:r>
+          </a:p>
+          <a:p>
+            <a:pPr lvl="1"/>
+            <a:r>
+              <a:rPr lang="en-US" sz="2200" i="1" dirty="0"/>
+              <a:t>Average Income</a:t>
+            </a:r>
+          </a:p>
+          <a:p>
+            <a:pPr lvl="1"/>
+            <a:r>
+              <a:rPr lang="en-US" sz="2200" i="1" dirty="0"/>
+              <a:t>Price Per Square Foot</a:t>
+            </a:r>
+          </a:p>
+          <a:p>
+            <a:pPr lvl="1"/>
+            <a:r>
+              <a:rPr lang="en-US" sz="2200" i="1" dirty="0"/>
+              <a:t>Median Listing Price</a:t>
+            </a:r>
+          </a:p>
+          <a:p>
+            <a:pPr lvl="1"/>
+            <a:r>
+              <a:rPr lang="en-US" sz="2200" i="1" dirty="0"/>
+              <a:t>Zillow Size Rank</a:t>
+            </a:r>
           </a:p>
         </p:txBody>
       </p:sp>
@@ -2371,10 +2435,9 @@
           <a:lstStyle/>
           <a:p>
             <a:r>
-              <a:rPr lang="en-US" dirty="0" smtClean="0"/>
+              <a:rPr lang="en-US" dirty="0"/>
               <a:t>Project Summary</a:t>
             </a:r>
-            <a:endParaRPr lang="en-US" dirty="0"/>
           </a:p>
         </p:txBody>
       </p:sp>
@@ -2393,7 +2456,31 @@
           <a:bodyPr/>
           <a:lstStyle/>
           <a:p>
-            <a:endParaRPr lang="en-US"/>
+            <a:r>
+              <a:rPr lang="en-US" sz="2400" dirty="0"/>
+              <a:t>We collected, cleaned and transformed data.</a:t>
+            </a:r>
+          </a:p>
+          <a:p>
+            <a:r>
+              <a:rPr lang="en-US" sz="2400" dirty="0"/>
+              <a:t>We collected the data and grouped it by year and zip code.</a:t>
+            </a:r>
+          </a:p>
+          <a:p>
+            <a:r>
+              <a:rPr lang="en-US" sz="2400" dirty="0"/>
+              <a:t>We investigated what improved accuracy of our predictive models, threw out the hogwash.</a:t>
+            </a:r>
+          </a:p>
+          <a:p>
+            <a:r>
+              <a:rPr lang="en-US" sz="2400" dirty="0"/>
+              <a:t>Developed a model that has an R^2 of 0.95</a:t>
+            </a:r>
+          </a:p>
+          <a:p>
+            <a:endParaRPr lang="en-US" dirty="0"/>
           </a:p>
         </p:txBody>
       </p:sp>
@@ -2467,12 +2554,48 @@
       </p:grpSpPr>
       <p:sp>
         <p:nvSpPr>
-          <p:cNvPr id="2" name="Title 1"/>
+          <p:cNvPr id="2" name="Title 1">
+            <a:extLst>
+              <a:ext uri="{FF2B5EF4-FFF2-40B4-BE49-F238E27FC236}">
+                <a16:creationId xmlns:a16="http://schemas.microsoft.com/office/drawing/2014/main" id="{FEF05C24-782B-44AB-99B6-52417D918743}"/>
+              </a:ext>
+            </a:extLst>
+          </p:cNvPr>
           <p:cNvSpPr>
             <a:spLocks noGrp="1"/>
           </p:cNvSpPr>
           <p:nvPr>
             <p:ph type="title"/>
+          </p:nvPr>
+        </p:nvSpPr>
+        <p:spPr/>
+        <p:txBody>
+          <a:bodyPr>
+            <a:normAutofit/>
+          </a:bodyPr>
+          <a:lstStyle/>
+          <a:p>
+            <a:r>
+              <a:rPr lang="en-US" sz="3200" dirty="0"/>
+              <a:t>Limitations</a:t>
+            </a:r>
+          </a:p>
+        </p:txBody>
+      </p:sp>
+      <p:sp>
+        <p:nvSpPr>
+          <p:cNvPr id="3" name="Content Placeholder 2">
+            <a:extLst>
+              <a:ext uri="{FF2B5EF4-FFF2-40B4-BE49-F238E27FC236}">
+                <a16:creationId xmlns:a16="http://schemas.microsoft.com/office/drawing/2014/main" id="{AE130E9C-008B-4DCA-B27B-C2B35ECED976}"/>
+              </a:ext>
+            </a:extLst>
+          </p:cNvPr>
+          <p:cNvSpPr>
+            <a:spLocks noGrp="1"/>
+          </p:cNvSpPr>
+          <p:nvPr>
+            <p:ph idx="1"/>
           </p:nvPr>
         </p:nvSpPr>
         <p:spPr/>
@@ -2481,35 +2604,51 @@
           <a:lstStyle/>
           <a:p>
             <a:r>
-              <a:rPr lang="en-US" dirty="0" smtClean="0"/>
-              <a:t>Project Summary</a:t>
-            </a:r>
+              <a:rPr lang="en-US" sz="2400" dirty="0"/>
+              <a:t>Length of the data we have been able to use.</a:t>
+            </a:r>
+          </a:p>
+          <a:p>
+            <a:r>
+              <a:rPr lang="en-US" sz="2400" dirty="0"/>
+              <a:t>Income data was limited to buckets provided by the IRS</a:t>
+            </a:r>
+          </a:p>
+          <a:p>
+            <a:r>
+              <a:rPr lang="en-US" sz="2400" dirty="0"/>
+              <a:t>Incomplete datasets accounted for approximately 30% of all collected data.</a:t>
+            </a:r>
+          </a:p>
+          <a:p>
+            <a:r>
+              <a:rPr lang="en-US" sz="2400" dirty="0"/>
+              <a:t>This is for average housing prices in zip codes, not used for individual houses.</a:t>
+            </a:r>
+          </a:p>
+          <a:p>
+            <a:r>
+              <a:rPr lang="en-US" sz="2400" dirty="0"/>
+              <a:t>We did not create geographic tags to account for location. </a:t>
+            </a:r>
+          </a:p>
+          <a:p>
+            <a:pPr marL="0" indent="0">
+              <a:buNone/>
+            </a:pPr>
             <a:endParaRPr lang="en-US" dirty="0"/>
           </a:p>
         </p:txBody>
       </p:sp>
       <p:sp>
         <p:nvSpPr>
-          <p:cNvPr id="3" name="Content Placeholder 2"/>
-          <p:cNvSpPr>
-            <a:spLocks noGrp="1"/>
-          </p:cNvSpPr>
-          <p:nvPr>
-            <p:ph idx="1"/>
-          </p:nvPr>
-        </p:nvSpPr>
-        <p:spPr/>
-        <p:txBody>
-          <a:bodyPr/>
-          <a:lstStyle/>
-          <a:p>
-            <a:endParaRPr lang="en-US"/>
-          </a:p>
-        </p:txBody>
-      </p:sp>
-      <p:sp>
-        <p:nvSpPr>
-          <p:cNvPr id="4" name="Slide Number Placeholder 3"/>
+          <p:cNvPr id="4" name="Slide Number Placeholder 3">
+            <a:extLst>
+              <a:ext uri="{FF2B5EF4-FFF2-40B4-BE49-F238E27FC236}">
+                <a16:creationId xmlns:a16="http://schemas.microsoft.com/office/drawing/2014/main" id="{BD5593B1-78E3-4C39-A66C-C1A4D19CD41A}"/>
+              </a:ext>
+            </a:extLst>
+          </p:cNvPr>
           <p:cNvSpPr>
             <a:spLocks noGrp="1"/>
           </p:cNvSpPr>
@@ -2548,7 +2687,7 @@
     </p:spTree>
     <p:extLst>
       <p:ext uri="{BB962C8B-B14F-4D97-AF65-F5344CB8AC3E}">
-        <p14:creationId xmlns:p14="http://schemas.microsoft.com/office/powerpoint/2010/main" val="650795747"/>
+        <p14:creationId xmlns:p14="http://schemas.microsoft.com/office/powerpoint/2010/main" val="1352961811"/>
       </p:ext>
     </p:extLst>
   </p:cSld>
@@ -2590,7 +2729,10 @@
           <a:bodyPr/>
           <a:lstStyle/>
           <a:p>
-            <a:endParaRPr lang="en-US"/>
+            <a:r>
+              <a:rPr lang="en-US" dirty="0"/>
+              <a:t>Exploratory Analysis Summary</a:t>
+            </a:r>
           </a:p>
         </p:txBody>
       </p:sp>
@@ -2604,12 +2746,26 @@
             <p:ph idx="1"/>
           </p:nvPr>
         </p:nvSpPr>
-        <p:spPr/>
+        <p:spPr>
+          <a:xfrm>
+            <a:off x="181429" y="992189"/>
+            <a:ext cx="4207691" cy="5345112"/>
+          </a:xfrm>
+        </p:spPr>
         <p:txBody>
           <a:bodyPr/>
           <a:lstStyle/>
           <a:p>
-            <a:endParaRPr lang="en-US"/>
+            <a:r>
+              <a:rPr lang="en-US" dirty="0"/>
+              <a:t>Income was a large driver of real estate prices</a:t>
+            </a:r>
+          </a:p>
+          <a:p>
+            <a:pPr marL="0" indent="0">
+              <a:buNone/>
+            </a:pPr>
+            <a:endParaRPr lang="en-US" dirty="0"/>
           </a:p>
         </p:txBody>
       </p:sp>
@@ -2651,10 +2807,541 @@
           </a:p>
         </p:txBody>
       </p:sp>
+      <p:pic>
+        <p:nvPicPr>
+          <p:cNvPr id="8" name="Picture 7" descr="A close up of a map&#10;&#10;Description automatically generated">
+            <a:extLst>
+              <a:ext uri="{FF2B5EF4-FFF2-40B4-BE49-F238E27FC236}">
+                <a16:creationId xmlns:a16="http://schemas.microsoft.com/office/drawing/2014/main" id="{D654C676-4714-4426-B95C-577E86CE5324}"/>
+              </a:ext>
+            </a:extLst>
+          </p:cNvPr>
+          <p:cNvPicPr>
+            <a:picLocks noChangeAspect="1"/>
+          </p:cNvPicPr>
+          <p:nvPr/>
+        </p:nvPicPr>
+        <p:blipFill>
+          <a:blip r:embed="rId2" cstate="print">
+            <a:extLst>
+              <a:ext uri="{28A0092B-C50C-407E-A947-70E740481C1C}">
+                <a14:useLocalDpi xmlns:a14="http://schemas.microsoft.com/office/drawing/2010/main" val="0"/>
+              </a:ext>
+            </a:extLst>
+          </a:blip>
+          <a:stretch>
+            <a:fillRect/>
+          </a:stretch>
+        </p:blipFill>
+        <p:spPr>
+          <a:xfrm>
+            <a:off x="4572000" y="992189"/>
+            <a:ext cx="4207691" cy="2608261"/>
+          </a:xfrm>
+          <a:prstGeom prst="rect">
+            <a:avLst/>
+          </a:prstGeom>
+        </p:spPr>
+      </p:pic>
+    </p:spTree>
+    <p:extLst>
+      <p:ext uri="{BB962C8B-B14F-4D97-AF65-F5344CB8AC3E}">
+        <p14:creationId xmlns:p14="http://schemas.microsoft.com/office/powerpoint/2010/main" val="650795747"/>
+      </p:ext>
+    </p:extLst>
+  </p:cSld>
+  <p:clrMapOvr>
+    <a:masterClrMapping/>
+  </p:clrMapOvr>
+</p:sld>
+</file>
+
+<file path=ppt/slides/slide6.xml><?xml version="1.0" encoding="utf-8"?>
+<p:sld xmlns:a="http://schemas.openxmlformats.org/drawingml/2006/main" xmlns:r="http://schemas.openxmlformats.org/officeDocument/2006/relationships" xmlns:p="http://schemas.openxmlformats.org/presentationml/2006/main">
+  <p:cSld>
+    <p:spTree>
+      <p:nvGrpSpPr>
+        <p:cNvPr id="1" name=""/>
+        <p:cNvGrpSpPr/>
+        <p:nvPr/>
+      </p:nvGrpSpPr>
+      <p:grpSpPr>
+        <a:xfrm>
+          <a:off x="0" y="0"/>
+          <a:ext cx="0" cy="0"/>
+          <a:chOff x="0" y="0"/>
+          <a:chExt cx="0" cy="0"/>
+        </a:xfrm>
+      </p:grpSpPr>
+      <p:sp>
+        <p:nvSpPr>
+          <p:cNvPr id="2" name="Title 1"/>
+          <p:cNvSpPr>
+            <a:spLocks noGrp="1"/>
+          </p:cNvSpPr>
+          <p:nvPr>
+            <p:ph type="title"/>
+          </p:nvPr>
+        </p:nvSpPr>
+        <p:spPr/>
+        <p:txBody>
+          <a:bodyPr/>
+          <a:lstStyle/>
+          <a:p>
+            <a:r>
+              <a:rPr lang="en-US" dirty="0"/>
+              <a:t>Data Transformation Summary</a:t>
+            </a:r>
+          </a:p>
+        </p:txBody>
+      </p:sp>
+      <p:sp>
+        <p:nvSpPr>
+          <p:cNvPr id="3" name="Content Placeholder 2"/>
+          <p:cNvSpPr>
+            <a:spLocks noGrp="1"/>
+          </p:cNvSpPr>
+          <p:nvPr>
+            <p:ph idx="1"/>
+          </p:nvPr>
+        </p:nvSpPr>
+        <p:spPr/>
+        <p:txBody>
+          <a:bodyPr/>
+          <a:lstStyle/>
+          <a:p>
+            <a:endParaRPr lang="en-US" dirty="0"/>
+          </a:p>
+        </p:txBody>
+      </p:sp>
+      <p:sp>
+        <p:nvSpPr>
+          <p:cNvPr id="4" name="Slide Number Placeholder 3"/>
+          <p:cNvSpPr>
+            <a:spLocks noGrp="1"/>
+          </p:cNvSpPr>
+          <p:nvPr>
+            <p:ph type="sldNum" sz="quarter" idx="4"/>
+          </p:nvPr>
+        </p:nvSpPr>
+        <p:spPr/>
+        <p:txBody>
+          <a:bodyPr/>
+          <a:lstStyle/>
+          <a:p>
+            <a:fld id="{37CB541D-F291-4562-B47C-62A886D26F12}" type="slidenum">
+              <a:rPr lang="en-US" smtClean="0">
+                <a:solidFill>
+                  <a:prstClr val="black">
+                    <a:lumMod val="50000"/>
+                    <a:lumOff val="50000"/>
+                  </a:prstClr>
+                </a:solidFill>
+              </a:rPr>
+              <a:pPr/>
+              <a:t>6</a:t>
+            </a:fld>
+            <a:endParaRPr lang="en-US" dirty="0">
+              <a:solidFill>
+                <a:prstClr val="black">
+                  <a:lumMod val="50000"/>
+                  <a:lumOff val="50000"/>
+                </a:prstClr>
+              </a:solidFill>
+            </a:endParaRPr>
+          </a:p>
+        </p:txBody>
+      </p:sp>
     </p:spTree>
     <p:extLst>
       <p:ext uri="{BB962C8B-B14F-4D97-AF65-F5344CB8AC3E}">
         <p14:creationId xmlns:p14="http://schemas.microsoft.com/office/powerpoint/2010/main" val="1095640628"/>
+      </p:ext>
+    </p:extLst>
+  </p:cSld>
+  <p:clrMapOvr>
+    <a:masterClrMapping/>
+  </p:clrMapOvr>
+</p:sld>
+</file>
+
+<file path=ppt/slides/slide7.xml><?xml version="1.0" encoding="utf-8"?>
+<p:sld xmlns:a="http://schemas.openxmlformats.org/drawingml/2006/main" xmlns:r="http://schemas.openxmlformats.org/officeDocument/2006/relationships" xmlns:p="http://schemas.openxmlformats.org/presentationml/2006/main">
+  <p:cSld>
+    <p:spTree>
+      <p:nvGrpSpPr>
+        <p:cNvPr id="1" name=""/>
+        <p:cNvGrpSpPr/>
+        <p:nvPr/>
+      </p:nvGrpSpPr>
+      <p:grpSpPr>
+        <a:xfrm>
+          <a:off x="0" y="0"/>
+          <a:ext cx="0" cy="0"/>
+          <a:chOff x="0" y="0"/>
+          <a:chExt cx="0" cy="0"/>
+        </a:xfrm>
+      </p:grpSpPr>
+      <p:sp>
+        <p:nvSpPr>
+          <p:cNvPr id="2" name="Title 1">
+            <a:extLst>
+              <a:ext uri="{FF2B5EF4-FFF2-40B4-BE49-F238E27FC236}">
+                <a16:creationId xmlns:a16="http://schemas.microsoft.com/office/drawing/2014/main" id="{47D0DAB6-49D8-47DC-8A12-C8DFF7C9E22D}"/>
+              </a:ext>
+            </a:extLst>
+          </p:cNvPr>
+          <p:cNvSpPr>
+            <a:spLocks noGrp="1"/>
+          </p:cNvSpPr>
+          <p:nvPr>
+            <p:ph type="title"/>
+          </p:nvPr>
+        </p:nvSpPr>
+        <p:spPr/>
+        <p:txBody>
+          <a:bodyPr/>
+          <a:lstStyle/>
+          <a:p>
+            <a:r>
+              <a:rPr lang="en-US" dirty="0"/>
+              <a:t>Model Selection Summary</a:t>
+            </a:r>
+          </a:p>
+        </p:txBody>
+      </p:sp>
+      <p:sp>
+        <p:nvSpPr>
+          <p:cNvPr id="3" name="Content Placeholder 2">
+            <a:extLst>
+              <a:ext uri="{FF2B5EF4-FFF2-40B4-BE49-F238E27FC236}">
+                <a16:creationId xmlns:a16="http://schemas.microsoft.com/office/drawing/2014/main" id="{A6FF63FF-5B24-48D8-AD3F-90D9DEA4E6B1}"/>
+              </a:ext>
+            </a:extLst>
+          </p:cNvPr>
+          <p:cNvSpPr>
+            <a:spLocks noGrp="1"/>
+          </p:cNvSpPr>
+          <p:nvPr>
+            <p:ph idx="1"/>
+          </p:nvPr>
+        </p:nvSpPr>
+        <p:spPr/>
+        <p:txBody>
+          <a:bodyPr/>
+          <a:lstStyle/>
+          <a:p>
+            <a:endParaRPr lang="en-US"/>
+          </a:p>
+        </p:txBody>
+      </p:sp>
+      <p:sp>
+        <p:nvSpPr>
+          <p:cNvPr id="4" name="Slide Number Placeholder 3">
+            <a:extLst>
+              <a:ext uri="{FF2B5EF4-FFF2-40B4-BE49-F238E27FC236}">
+                <a16:creationId xmlns:a16="http://schemas.microsoft.com/office/drawing/2014/main" id="{9EEDD167-AB23-44C7-84AB-E58F983DB3B0}"/>
+              </a:ext>
+            </a:extLst>
+          </p:cNvPr>
+          <p:cNvSpPr>
+            <a:spLocks noGrp="1"/>
+          </p:cNvSpPr>
+          <p:nvPr>
+            <p:ph type="sldNum" sz="quarter" idx="4"/>
+          </p:nvPr>
+        </p:nvSpPr>
+        <p:spPr/>
+        <p:txBody>
+          <a:bodyPr/>
+          <a:lstStyle/>
+          <a:p>
+            <a:fld id="{37CB541D-F291-4562-B47C-62A886D26F12}" type="slidenum">
+              <a:rPr lang="en-US" smtClean="0">
+                <a:solidFill>
+                  <a:prstClr val="black">
+                    <a:lumMod val="50000"/>
+                    <a:lumOff val="50000"/>
+                  </a:prstClr>
+                </a:solidFill>
+              </a:rPr>
+              <a:pPr/>
+              <a:t>7</a:t>
+            </a:fld>
+            <a:endParaRPr lang="en-US" dirty="0">
+              <a:solidFill>
+                <a:prstClr val="black">
+                  <a:lumMod val="50000"/>
+                  <a:lumOff val="50000"/>
+                </a:prstClr>
+              </a:solidFill>
+            </a:endParaRPr>
+          </a:p>
+        </p:txBody>
+      </p:sp>
+    </p:spTree>
+    <p:extLst>
+      <p:ext uri="{BB962C8B-B14F-4D97-AF65-F5344CB8AC3E}">
+        <p14:creationId xmlns:p14="http://schemas.microsoft.com/office/powerpoint/2010/main" val="918137692"/>
+      </p:ext>
+    </p:extLst>
+  </p:cSld>
+  <p:clrMapOvr>
+    <a:masterClrMapping/>
+  </p:clrMapOvr>
+</p:sld>
+</file>
+
+<file path=ppt/slides/slide8.xml><?xml version="1.0" encoding="utf-8"?>
+<p:sld xmlns:a="http://schemas.openxmlformats.org/drawingml/2006/main" xmlns:r="http://schemas.openxmlformats.org/officeDocument/2006/relationships" xmlns:p="http://schemas.openxmlformats.org/presentationml/2006/main">
+  <p:cSld>
+    <p:spTree>
+      <p:nvGrpSpPr>
+        <p:cNvPr id="1" name=""/>
+        <p:cNvGrpSpPr/>
+        <p:nvPr/>
+      </p:nvGrpSpPr>
+      <p:grpSpPr>
+        <a:xfrm>
+          <a:off x="0" y="0"/>
+          <a:ext cx="0" cy="0"/>
+          <a:chOff x="0" y="0"/>
+          <a:chExt cx="0" cy="0"/>
+        </a:xfrm>
+      </p:grpSpPr>
+      <p:sp>
+        <p:nvSpPr>
+          <p:cNvPr id="2" name="Title 1">
+            <a:extLst>
+              <a:ext uri="{FF2B5EF4-FFF2-40B4-BE49-F238E27FC236}">
+                <a16:creationId xmlns:a16="http://schemas.microsoft.com/office/drawing/2014/main" id="{204CB02D-60D4-421C-90F6-5BFDC517BB67}"/>
+              </a:ext>
+            </a:extLst>
+          </p:cNvPr>
+          <p:cNvSpPr>
+            <a:spLocks noGrp="1"/>
+          </p:cNvSpPr>
+          <p:nvPr>
+            <p:ph type="title"/>
+          </p:nvPr>
+        </p:nvSpPr>
+        <p:spPr/>
+        <p:txBody>
+          <a:bodyPr/>
+          <a:lstStyle/>
+          <a:p>
+            <a:r>
+              <a:rPr lang="en-US" dirty="0"/>
+              <a:t>Model </a:t>
+            </a:r>
+            <a:r>
+              <a:rPr lang="en-US" dirty="0" err="1"/>
+              <a:t>Explaination</a:t>
+            </a:r>
+            <a:endParaRPr lang="en-US" dirty="0"/>
+          </a:p>
+        </p:txBody>
+      </p:sp>
+      <p:sp>
+        <p:nvSpPr>
+          <p:cNvPr id="3" name="Content Placeholder 2">
+            <a:extLst>
+              <a:ext uri="{FF2B5EF4-FFF2-40B4-BE49-F238E27FC236}">
+                <a16:creationId xmlns:a16="http://schemas.microsoft.com/office/drawing/2014/main" id="{3BEFAC55-60C8-442C-A414-12CEC429E4C2}"/>
+              </a:ext>
+            </a:extLst>
+          </p:cNvPr>
+          <p:cNvSpPr>
+            <a:spLocks noGrp="1"/>
+          </p:cNvSpPr>
+          <p:nvPr>
+            <p:ph idx="1"/>
+          </p:nvPr>
+        </p:nvSpPr>
+        <p:spPr/>
+        <p:txBody>
+          <a:bodyPr/>
+          <a:lstStyle/>
+          <a:p>
+            <a:endParaRPr lang="en-US" dirty="0"/>
+          </a:p>
+        </p:txBody>
+      </p:sp>
+      <p:sp>
+        <p:nvSpPr>
+          <p:cNvPr id="4" name="Slide Number Placeholder 3">
+            <a:extLst>
+              <a:ext uri="{FF2B5EF4-FFF2-40B4-BE49-F238E27FC236}">
+                <a16:creationId xmlns:a16="http://schemas.microsoft.com/office/drawing/2014/main" id="{C423259E-F095-40B7-A651-60BA3047B135}"/>
+              </a:ext>
+            </a:extLst>
+          </p:cNvPr>
+          <p:cNvSpPr>
+            <a:spLocks noGrp="1"/>
+          </p:cNvSpPr>
+          <p:nvPr>
+            <p:ph type="sldNum" sz="quarter" idx="4"/>
+          </p:nvPr>
+        </p:nvSpPr>
+        <p:spPr/>
+        <p:txBody>
+          <a:bodyPr/>
+          <a:lstStyle/>
+          <a:p>
+            <a:fld id="{37CB541D-F291-4562-B47C-62A886D26F12}" type="slidenum">
+              <a:rPr lang="en-US" smtClean="0">
+                <a:solidFill>
+                  <a:prstClr val="black">
+                    <a:lumMod val="50000"/>
+                    <a:lumOff val="50000"/>
+                  </a:prstClr>
+                </a:solidFill>
+              </a:rPr>
+              <a:pPr/>
+              <a:t>8</a:t>
+            </a:fld>
+            <a:endParaRPr lang="en-US" dirty="0">
+              <a:solidFill>
+                <a:prstClr val="black">
+                  <a:lumMod val="50000"/>
+                  <a:lumOff val="50000"/>
+                </a:prstClr>
+              </a:solidFill>
+            </a:endParaRPr>
+          </a:p>
+        </p:txBody>
+      </p:sp>
+    </p:spTree>
+    <p:extLst>
+      <p:ext uri="{BB962C8B-B14F-4D97-AF65-F5344CB8AC3E}">
+        <p14:creationId xmlns:p14="http://schemas.microsoft.com/office/powerpoint/2010/main" val="2732917843"/>
+      </p:ext>
+    </p:extLst>
+  </p:cSld>
+  <p:clrMapOvr>
+    <a:masterClrMapping/>
+  </p:clrMapOvr>
+</p:sld>
+</file>
+
+<file path=ppt/slides/slide9.xml><?xml version="1.0" encoding="utf-8"?>
+<p:sld xmlns:a="http://schemas.openxmlformats.org/drawingml/2006/main" xmlns:r="http://schemas.openxmlformats.org/officeDocument/2006/relationships" xmlns:p="http://schemas.openxmlformats.org/presentationml/2006/main">
+  <p:cSld>
+    <p:spTree>
+      <p:nvGrpSpPr>
+        <p:cNvPr id="1" name=""/>
+        <p:cNvGrpSpPr/>
+        <p:nvPr/>
+      </p:nvGrpSpPr>
+      <p:grpSpPr>
+        <a:xfrm>
+          <a:off x="0" y="0"/>
+          <a:ext cx="0" cy="0"/>
+          <a:chOff x="0" y="0"/>
+          <a:chExt cx="0" cy="0"/>
+        </a:xfrm>
+      </p:grpSpPr>
+      <p:sp>
+        <p:nvSpPr>
+          <p:cNvPr id="2" name="Title 1">
+            <a:extLst>
+              <a:ext uri="{FF2B5EF4-FFF2-40B4-BE49-F238E27FC236}">
+                <a16:creationId xmlns:a16="http://schemas.microsoft.com/office/drawing/2014/main" id="{76F23262-D6AE-45F6-AEED-331FCE2378BC}"/>
+              </a:ext>
+            </a:extLst>
+          </p:cNvPr>
+          <p:cNvSpPr>
+            <a:spLocks noGrp="1"/>
+          </p:cNvSpPr>
+          <p:nvPr>
+            <p:ph type="title"/>
+          </p:nvPr>
+        </p:nvSpPr>
+        <p:spPr/>
+        <p:txBody>
+          <a:bodyPr/>
+          <a:lstStyle/>
+          <a:p>
+            <a:r>
+              <a:rPr lang="en-US"/>
+              <a:t>Awesome Sauce Charts</a:t>
+            </a:r>
+          </a:p>
+        </p:txBody>
+      </p:sp>
+      <p:sp>
+        <p:nvSpPr>
+          <p:cNvPr id="3" name="Content Placeholder 2">
+            <a:extLst>
+              <a:ext uri="{FF2B5EF4-FFF2-40B4-BE49-F238E27FC236}">
+                <a16:creationId xmlns:a16="http://schemas.microsoft.com/office/drawing/2014/main" id="{A23EB6AC-5E54-4578-AEE2-E2A7D68DD806}"/>
+              </a:ext>
+            </a:extLst>
+          </p:cNvPr>
+          <p:cNvSpPr>
+            <a:spLocks noGrp="1"/>
+          </p:cNvSpPr>
+          <p:nvPr>
+            <p:ph idx="1"/>
+          </p:nvPr>
+        </p:nvSpPr>
+        <p:spPr/>
+        <p:txBody>
+          <a:bodyPr/>
+          <a:lstStyle/>
+          <a:p>
+            <a:endParaRPr lang="en-US"/>
+          </a:p>
+        </p:txBody>
+      </p:sp>
+      <p:sp>
+        <p:nvSpPr>
+          <p:cNvPr id="4" name="Slide Number Placeholder 3">
+            <a:extLst>
+              <a:ext uri="{FF2B5EF4-FFF2-40B4-BE49-F238E27FC236}">
+                <a16:creationId xmlns:a16="http://schemas.microsoft.com/office/drawing/2014/main" id="{A1D9817B-6C09-4D41-A467-50176E412D13}"/>
+              </a:ext>
+            </a:extLst>
+          </p:cNvPr>
+          <p:cNvSpPr>
+            <a:spLocks noGrp="1"/>
+          </p:cNvSpPr>
+          <p:nvPr>
+            <p:ph type="sldNum" sz="quarter" idx="4"/>
+          </p:nvPr>
+        </p:nvSpPr>
+        <p:spPr/>
+        <p:txBody>
+          <a:bodyPr/>
+          <a:lstStyle/>
+          <a:p>
+            <a:fld id="{37CB541D-F291-4562-B47C-62A886D26F12}" type="slidenum">
+              <a:rPr lang="en-US" smtClean="0">
+                <a:solidFill>
+                  <a:prstClr val="black">
+                    <a:lumMod val="50000"/>
+                    <a:lumOff val="50000"/>
+                  </a:prstClr>
+                </a:solidFill>
+              </a:rPr>
+              <a:pPr/>
+              <a:t>9</a:t>
+            </a:fld>
+            <a:endParaRPr lang="en-US" dirty="0">
+              <a:solidFill>
+                <a:prstClr val="black">
+                  <a:lumMod val="50000"/>
+                  <a:lumOff val="50000"/>
+                </a:prstClr>
+              </a:solidFill>
+            </a:endParaRPr>
+          </a:p>
+        </p:txBody>
+      </p:sp>
+    </p:spTree>
+    <p:extLst>
+      <p:ext uri="{BB962C8B-B14F-4D97-AF65-F5344CB8AC3E}">
+        <p14:creationId xmlns:p14="http://schemas.microsoft.com/office/powerpoint/2010/main" val="3430165968"/>
       </p:ext>
     </p:extLst>
   </p:cSld>
@@ -3520,9 +4207,12 @@
 </file>
 
 <file path=customXml/item1.xml><?xml version="1.0" encoding="utf-8"?>
-<p:properties xmlns:p="http://schemas.microsoft.com/office/2006/metadata/properties" xmlns:xsi="http://www.w3.org/2001/XMLSchema-instance">
-  <documentManagement/>
-</p:properties>
+<?mso-contentType ?>
+<FormTemplates xmlns="http://schemas.microsoft.com/sharepoint/v3/contenttype/forms">
+  <Display>DocumentLibraryForm</Display>
+  <Edit>DocumentLibraryForm</Edit>
+  <New>DocumentLibraryForm</New>
+</FormTemplates>
 </file>
 
 <file path=customXml/item2.xml><?xml version="1.0" encoding="utf-8"?>
@@ -3575,24 +4265,15 @@
 </file>
 
 <file path=customXml/item3.xml><?xml version="1.0" encoding="utf-8"?>
-<?mso-contentType ?>
-<FormTemplates xmlns="http://schemas.microsoft.com/sharepoint/v3/contenttype/forms">
-  <Display>DocumentLibraryForm</Display>
-  <Edit>DocumentLibraryForm</Edit>
-  <New>DocumentLibraryForm</New>
-</FormTemplates>
+<p:properties xmlns:p="http://schemas.microsoft.com/office/2006/metadata/properties" xmlns:xsi="http://www.w3.org/2001/XMLSchema-instance">
+  <documentManagement/>
+</p:properties>
 </file>
 
 <file path=customXml/itemProps1.xml><?xml version="1.0" encoding="utf-8"?>
-<ds:datastoreItem xmlns:ds="http://schemas.openxmlformats.org/officeDocument/2006/customXml" ds:itemID="{EF5AC248-3016-4BC6-95F6-3E0EE4575AFB}">
+<ds:datastoreItem xmlns:ds="http://schemas.openxmlformats.org/officeDocument/2006/customXml" ds:itemID="{063CCCBC-B7A1-4566-9DE9-0A821E9534E4}">
   <ds:schemaRefs>
-    <ds:schemaRef ds:uri="http://schemas.microsoft.com/office/2006/documentManagement/types"/>
-    <ds:schemaRef ds:uri="http://purl.org/dc/elements/1.1/"/>
-    <ds:schemaRef ds:uri="http://schemas.microsoft.com/office/2006/metadata/properties"/>
-    <ds:schemaRef ds:uri="http://purl.org/dc/terms/"/>
-    <ds:schemaRef ds:uri="http://schemas.openxmlformats.org/package/2006/metadata/core-properties"/>
-    <ds:schemaRef ds:uri="http://www.w3.org/XML/1998/namespace"/>
-    <ds:schemaRef ds:uri="http://purl.org/dc/dcmitype/"/>
+    <ds:schemaRef ds:uri="http://schemas.microsoft.com/sharepoint/v3/contenttype/forms"/>
   </ds:schemaRefs>
 </ds:datastoreItem>
 </file>
@@ -3613,9 +4294,15 @@
 </file>
 
 <file path=customXml/itemProps3.xml><?xml version="1.0" encoding="utf-8"?>
-<ds:datastoreItem xmlns:ds="http://schemas.openxmlformats.org/officeDocument/2006/customXml" ds:itemID="{063CCCBC-B7A1-4566-9DE9-0A821E9534E4}">
+<ds:datastoreItem xmlns:ds="http://schemas.openxmlformats.org/officeDocument/2006/customXml" ds:itemID="{EF5AC248-3016-4BC6-95F6-3E0EE4575AFB}">
   <ds:schemaRefs>
-    <ds:schemaRef ds:uri="http://schemas.microsoft.com/sharepoint/v3/contenttype/forms"/>
+    <ds:schemaRef ds:uri="http://schemas.microsoft.com/office/2006/documentManagement/types"/>
+    <ds:schemaRef ds:uri="http://purl.org/dc/elements/1.1/"/>
+    <ds:schemaRef ds:uri="http://schemas.microsoft.com/office/2006/metadata/properties"/>
+    <ds:schemaRef ds:uri="http://purl.org/dc/terms/"/>
+    <ds:schemaRef ds:uri="http://schemas.openxmlformats.org/package/2006/metadata/core-properties"/>
+    <ds:schemaRef ds:uri="http://www.w3.org/XML/1998/namespace"/>
+    <ds:schemaRef ds:uri="http://purl.org/dc/dcmitype/"/>
   </ds:schemaRefs>
 </ds:datastoreItem>
 </file>
</xml_diff>

<commit_message>
Lee edits to Ppt
</commit_message>
<xml_diff>
--- a/project_3_presentation.pptx
+++ b/project_3_presentation.pptx
@@ -15,8 +15,8 @@
     <p:sldId id="1030" r:id="rId6"/>
     <p:sldId id="1031" r:id="rId7"/>
     <p:sldId id="1034" r:id="rId8"/>
-    <p:sldId id="1033" r:id="rId9"/>
-    <p:sldId id="1032" r:id="rId10"/>
+    <p:sldId id="1032" r:id="rId9"/>
+    <p:sldId id="1033" r:id="rId10"/>
     <p:sldId id="1035" r:id="rId11"/>
     <p:sldId id="1036" r:id="rId12"/>
     <p:sldId id="1037" r:id="rId13"/>
@@ -162,6 +162,3128 @@
 </p:presentation>
 </file>
 
+<file path=ppt/diagrams/colors1.xml><?xml version="1.0" encoding="utf-8"?>
+<dgm:colorsDef xmlns:dgm="http://schemas.openxmlformats.org/drawingml/2006/diagram" xmlns:a="http://schemas.openxmlformats.org/drawingml/2006/main" uniqueId="urn:microsoft.com/office/officeart/2005/8/colors/accent1_2">
+  <dgm:title val=""/>
+  <dgm:desc val=""/>
+  <dgm:catLst>
+    <dgm:cat type="accent1" pri="11200"/>
+  </dgm:catLst>
+  <dgm:styleLbl name="node0">
+    <dgm:fillClrLst meth="repeat">
+      <a:schemeClr val="accent1"/>
+    </dgm:fillClrLst>
+    <dgm:linClrLst meth="repeat">
+      <a:schemeClr val="lt1"/>
+    </dgm:linClrLst>
+    <dgm:effectClrLst/>
+    <dgm:txLinClrLst/>
+    <dgm:txFillClrLst/>
+    <dgm:txEffectClrLst/>
+  </dgm:styleLbl>
+  <dgm:styleLbl name="alignNode1">
+    <dgm:fillClrLst meth="repeat">
+      <a:schemeClr val="accent1"/>
+    </dgm:fillClrLst>
+    <dgm:linClrLst meth="repeat">
+      <a:schemeClr val="accent1"/>
+    </dgm:linClrLst>
+    <dgm:effectClrLst/>
+    <dgm:txLinClrLst/>
+    <dgm:txFillClrLst/>
+    <dgm:txEffectClrLst/>
+  </dgm:styleLbl>
+  <dgm:styleLbl name="node1">
+    <dgm:fillClrLst meth="repeat">
+      <a:schemeClr val="accent1"/>
+    </dgm:fillClrLst>
+    <dgm:linClrLst meth="repeat">
+      <a:schemeClr val="lt1"/>
+    </dgm:linClrLst>
+    <dgm:effectClrLst/>
+    <dgm:txLinClrLst/>
+    <dgm:txFillClrLst/>
+    <dgm:txEffectClrLst/>
+  </dgm:styleLbl>
+  <dgm:styleLbl name="lnNode1">
+    <dgm:fillClrLst meth="repeat">
+      <a:schemeClr val="accent1"/>
+    </dgm:fillClrLst>
+    <dgm:linClrLst meth="repeat">
+      <a:schemeClr val="lt1"/>
+    </dgm:linClrLst>
+    <dgm:effectClrLst/>
+    <dgm:txLinClrLst/>
+    <dgm:txFillClrLst/>
+    <dgm:txEffectClrLst/>
+  </dgm:styleLbl>
+  <dgm:styleLbl name="vennNode1">
+    <dgm:fillClrLst meth="repeat">
+      <a:schemeClr val="accent1">
+        <a:alpha val="50000"/>
+      </a:schemeClr>
+    </dgm:fillClrLst>
+    <dgm:linClrLst meth="repeat">
+      <a:schemeClr val="lt1"/>
+    </dgm:linClrLst>
+    <dgm:effectClrLst/>
+    <dgm:txLinClrLst/>
+    <dgm:txFillClrLst/>
+    <dgm:txEffectClrLst/>
+  </dgm:styleLbl>
+  <dgm:styleLbl name="node2">
+    <dgm:fillClrLst meth="repeat">
+      <a:schemeClr val="accent1"/>
+    </dgm:fillClrLst>
+    <dgm:linClrLst meth="repeat">
+      <a:schemeClr val="lt1"/>
+    </dgm:linClrLst>
+    <dgm:effectClrLst/>
+    <dgm:txLinClrLst/>
+    <dgm:txFillClrLst/>
+    <dgm:txEffectClrLst/>
+  </dgm:styleLbl>
+  <dgm:styleLbl name="node3">
+    <dgm:fillClrLst meth="repeat">
+      <a:schemeClr val="accent1"/>
+    </dgm:fillClrLst>
+    <dgm:linClrLst meth="repeat">
+      <a:schemeClr val="lt1"/>
+    </dgm:linClrLst>
+    <dgm:effectClrLst/>
+    <dgm:txLinClrLst/>
+    <dgm:txFillClrLst/>
+    <dgm:txEffectClrLst/>
+  </dgm:styleLbl>
+  <dgm:styleLbl name="node4">
+    <dgm:fillClrLst meth="repeat">
+      <a:schemeClr val="accent1"/>
+    </dgm:fillClrLst>
+    <dgm:linClrLst meth="repeat">
+      <a:schemeClr val="lt1"/>
+    </dgm:linClrLst>
+    <dgm:effectClrLst/>
+    <dgm:txLinClrLst/>
+    <dgm:txFillClrLst/>
+    <dgm:txEffectClrLst/>
+  </dgm:styleLbl>
+  <dgm:styleLbl name="fgImgPlace1">
+    <dgm:fillClrLst meth="repeat">
+      <a:schemeClr val="accent1">
+        <a:tint val="50000"/>
+      </a:schemeClr>
+    </dgm:fillClrLst>
+    <dgm:linClrLst meth="repeat">
+      <a:schemeClr val="lt1"/>
+    </dgm:linClrLst>
+    <dgm:effectClrLst/>
+    <dgm:txLinClrLst/>
+    <dgm:txFillClrLst meth="repeat">
+      <a:schemeClr val="lt1"/>
+    </dgm:txFillClrLst>
+    <dgm:txEffectClrLst/>
+  </dgm:styleLbl>
+  <dgm:styleLbl name="alignImgPlace1">
+    <dgm:fillClrLst meth="repeat">
+      <a:schemeClr val="accent1">
+        <a:tint val="50000"/>
+      </a:schemeClr>
+    </dgm:fillClrLst>
+    <dgm:linClrLst meth="repeat">
+      <a:schemeClr val="lt1"/>
+    </dgm:linClrLst>
+    <dgm:effectClrLst/>
+    <dgm:txLinClrLst/>
+    <dgm:txFillClrLst meth="repeat">
+      <a:schemeClr val="lt1"/>
+    </dgm:txFillClrLst>
+    <dgm:txEffectClrLst/>
+  </dgm:styleLbl>
+  <dgm:styleLbl name="bgImgPlace1">
+    <dgm:fillClrLst meth="repeat">
+      <a:schemeClr val="accent1">
+        <a:tint val="50000"/>
+      </a:schemeClr>
+    </dgm:fillClrLst>
+    <dgm:linClrLst meth="repeat">
+      <a:schemeClr val="lt1"/>
+    </dgm:linClrLst>
+    <dgm:effectClrLst/>
+    <dgm:txLinClrLst/>
+    <dgm:txFillClrLst meth="repeat">
+      <a:schemeClr val="lt1"/>
+    </dgm:txFillClrLst>
+    <dgm:txEffectClrLst/>
+  </dgm:styleLbl>
+  <dgm:styleLbl name="sibTrans2D1">
+    <dgm:fillClrLst meth="repeat">
+      <a:schemeClr val="accent1">
+        <a:tint val="60000"/>
+      </a:schemeClr>
+    </dgm:fillClrLst>
+    <dgm:linClrLst meth="repeat">
+      <a:schemeClr val="accent1">
+        <a:tint val="60000"/>
+      </a:schemeClr>
+    </dgm:linClrLst>
+    <dgm:effectClrLst/>
+    <dgm:txLinClrLst/>
+    <dgm:txFillClrLst/>
+    <dgm:txEffectClrLst/>
+  </dgm:styleLbl>
+  <dgm:styleLbl name="fgSibTrans2D1">
+    <dgm:fillClrLst meth="repeat">
+      <a:schemeClr val="accent1">
+        <a:tint val="60000"/>
+      </a:schemeClr>
+    </dgm:fillClrLst>
+    <dgm:linClrLst meth="repeat">
+      <a:schemeClr val="accent1">
+        <a:tint val="60000"/>
+      </a:schemeClr>
+    </dgm:linClrLst>
+    <dgm:effectClrLst/>
+    <dgm:txLinClrLst/>
+    <dgm:txFillClrLst/>
+    <dgm:txEffectClrLst/>
+  </dgm:styleLbl>
+  <dgm:styleLbl name="bgSibTrans2D1">
+    <dgm:fillClrLst meth="repeat">
+      <a:schemeClr val="accent1">
+        <a:tint val="60000"/>
+      </a:schemeClr>
+    </dgm:fillClrLst>
+    <dgm:linClrLst meth="repeat">
+      <a:schemeClr val="accent1">
+        <a:tint val="60000"/>
+      </a:schemeClr>
+    </dgm:linClrLst>
+    <dgm:effectClrLst/>
+    <dgm:txLinClrLst/>
+    <dgm:txFillClrLst/>
+    <dgm:txEffectClrLst/>
+  </dgm:styleLbl>
+  <dgm:styleLbl name="sibTrans1D1">
+    <dgm:fillClrLst meth="repeat">
+      <a:schemeClr val="accent1"/>
+    </dgm:fillClrLst>
+    <dgm:linClrLst meth="repeat">
+      <a:schemeClr val="accent1"/>
+    </dgm:linClrLst>
+    <dgm:effectClrLst/>
+    <dgm:txLinClrLst/>
+    <dgm:txFillClrLst meth="repeat">
+      <a:schemeClr val="tx1"/>
+    </dgm:txFillClrLst>
+    <dgm:txEffectClrLst/>
+  </dgm:styleLbl>
+  <dgm:styleLbl name="callout">
+    <dgm:fillClrLst meth="repeat">
+      <a:schemeClr val="accent1"/>
+    </dgm:fillClrLst>
+    <dgm:linClrLst meth="repeat">
+      <a:schemeClr val="accent1">
+        <a:tint val="50000"/>
+      </a:schemeClr>
+    </dgm:linClrLst>
+    <dgm:effectClrLst/>
+    <dgm:txLinClrLst/>
+    <dgm:txFillClrLst meth="repeat">
+      <a:schemeClr val="tx1"/>
+    </dgm:txFillClrLst>
+    <dgm:txEffectClrLst/>
+  </dgm:styleLbl>
+  <dgm:styleLbl name="asst0">
+    <dgm:fillClrLst meth="repeat">
+      <a:schemeClr val="accent1"/>
+    </dgm:fillClrLst>
+    <dgm:linClrLst meth="repeat">
+      <a:schemeClr val="lt1"/>
+    </dgm:linClrLst>
+    <dgm:effectClrLst/>
+    <dgm:txLinClrLst/>
+    <dgm:txFillClrLst/>
+    <dgm:txEffectClrLst/>
+  </dgm:styleLbl>
+  <dgm:styleLbl name="asst1">
+    <dgm:fillClrLst meth="repeat">
+      <a:schemeClr val="accent1"/>
+    </dgm:fillClrLst>
+    <dgm:linClrLst meth="repeat">
+      <a:schemeClr val="lt1"/>
+    </dgm:linClrLst>
+    <dgm:effectClrLst/>
+    <dgm:txLinClrLst/>
+    <dgm:txFillClrLst/>
+    <dgm:txEffectClrLst/>
+  </dgm:styleLbl>
+  <dgm:styleLbl name="asst2">
+    <dgm:fillClrLst meth="repeat">
+      <a:schemeClr val="accent1"/>
+    </dgm:fillClrLst>
+    <dgm:linClrLst meth="repeat">
+      <a:schemeClr val="lt1"/>
+    </dgm:linClrLst>
+    <dgm:effectClrLst/>
+    <dgm:txLinClrLst/>
+    <dgm:txFillClrLst/>
+    <dgm:txEffectClrLst/>
+  </dgm:styleLbl>
+  <dgm:styleLbl name="asst3">
+    <dgm:fillClrLst meth="repeat">
+      <a:schemeClr val="accent1"/>
+    </dgm:fillClrLst>
+    <dgm:linClrLst meth="repeat">
+      <a:schemeClr val="lt1"/>
+    </dgm:linClrLst>
+    <dgm:effectClrLst/>
+    <dgm:txLinClrLst/>
+    <dgm:txFillClrLst/>
+    <dgm:txEffectClrLst/>
+  </dgm:styleLbl>
+  <dgm:styleLbl name="asst4">
+    <dgm:fillClrLst meth="repeat">
+      <a:schemeClr val="accent1"/>
+    </dgm:fillClrLst>
+    <dgm:linClrLst meth="repeat">
+      <a:schemeClr val="lt1"/>
+    </dgm:linClrLst>
+    <dgm:effectClrLst/>
+    <dgm:txLinClrLst/>
+    <dgm:txFillClrLst/>
+    <dgm:txEffectClrLst/>
+  </dgm:styleLbl>
+  <dgm:styleLbl name="parChTrans2D1">
+    <dgm:fillClrLst meth="repeat">
+      <a:schemeClr val="accent1">
+        <a:tint val="60000"/>
+      </a:schemeClr>
+    </dgm:fillClrLst>
+    <dgm:linClrLst meth="repeat">
+      <a:schemeClr val="accent1">
+        <a:tint val="60000"/>
+      </a:schemeClr>
+    </dgm:linClrLst>
+    <dgm:effectClrLst/>
+    <dgm:txLinClrLst/>
+    <dgm:txFillClrLst meth="repeat">
+      <a:schemeClr val="lt1"/>
+    </dgm:txFillClrLst>
+    <dgm:txEffectClrLst/>
+  </dgm:styleLbl>
+  <dgm:styleLbl name="parChTrans2D2">
+    <dgm:fillClrLst meth="repeat">
+      <a:schemeClr val="accent1"/>
+    </dgm:fillClrLst>
+    <dgm:linClrLst meth="repeat">
+      <a:schemeClr val="accent1"/>
+    </dgm:linClrLst>
+    <dgm:effectClrLst/>
+    <dgm:txLinClrLst/>
+    <dgm:txFillClrLst meth="repeat">
+      <a:schemeClr val="lt1"/>
+    </dgm:txFillClrLst>
+    <dgm:txEffectClrLst/>
+  </dgm:styleLbl>
+  <dgm:styleLbl name="parChTrans2D3">
+    <dgm:fillClrLst meth="repeat">
+      <a:schemeClr val="accent1"/>
+    </dgm:fillClrLst>
+    <dgm:linClrLst meth="repeat">
+      <a:schemeClr val="accent1"/>
+    </dgm:linClrLst>
+    <dgm:effectClrLst/>
+    <dgm:txLinClrLst/>
+    <dgm:txFillClrLst meth="repeat">
+      <a:schemeClr val="lt1"/>
+    </dgm:txFillClrLst>
+    <dgm:txEffectClrLst/>
+  </dgm:styleLbl>
+  <dgm:styleLbl name="parChTrans2D4">
+    <dgm:fillClrLst meth="repeat">
+      <a:schemeClr val="accent1"/>
+    </dgm:fillClrLst>
+    <dgm:linClrLst meth="repeat">
+      <a:schemeClr val="accent1"/>
+    </dgm:linClrLst>
+    <dgm:effectClrLst/>
+    <dgm:txLinClrLst/>
+    <dgm:txFillClrLst meth="repeat">
+      <a:schemeClr val="lt1"/>
+    </dgm:txFillClrLst>
+    <dgm:txEffectClrLst/>
+  </dgm:styleLbl>
+  <dgm:styleLbl name="parChTrans1D1">
+    <dgm:fillClrLst meth="repeat">
+      <a:schemeClr val="accent1"/>
+    </dgm:fillClrLst>
+    <dgm:linClrLst meth="repeat">
+      <a:schemeClr val="accent1">
+        <a:shade val="60000"/>
+      </a:schemeClr>
+    </dgm:linClrLst>
+    <dgm:effectClrLst/>
+    <dgm:txLinClrLst/>
+    <dgm:txFillClrLst meth="repeat">
+      <a:schemeClr val="tx1"/>
+    </dgm:txFillClrLst>
+    <dgm:txEffectClrLst/>
+  </dgm:styleLbl>
+  <dgm:styleLbl name="parChTrans1D2">
+    <dgm:fillClrLst meth="repeat">
+      <a:schemeClr val="accent1"/>
+    </dgm:fillClrLst>
+    <dgm:linClrLst meth="repeat">
+      <a:schemeClr val="accent1">
+        <a:shade val="60000"/>
+      </a:schemeClr>
+    </dgm:linClrLst>
+    <dgm:effectClrLst/>
+    <dgm:txLinClrLst/>
+    <dgm:txFillClrLst meth="repeat">
+      <a:schemeClr val="tx1"/>
+    </dgm:txFillClrLst>
+    <dgm:txEffectClrLst/>
+  </dgm:styleLbl>
+  <dgm:styleLbl name="parChTrans1D3">
+    <dgm:fillClrLst meth="repeat">
+      <a:schemeClr val="accent1"/>
+    </dgm:fillClrLst>
+    <dgm:linClrLst meth="repeat">
+      <a:schemeClr val="accent1">
+        <a:shade val="80000"/>
+      </a:schemeClr>
+    </dgm:linClrLst>
+    <dgm:effectClrLst/>
+    <dgm:txLinClrLst/>
+    <dgm:txFillClrLst meth="repeat">
+      <a:schemeClr val="tx1"/>
+    </dgm:txFillClrLst>
+    <dgm:txEffectClrLst/>
+  </dgm:styleLbl>
+  <dgm:styleLbl name="parChTrans1D4">
+    <dgm:fillClrLst meth="repeat">
+      <a:schemeClr val="accent1"/>
+    </dgm:fillClrLst>
+    <dgm:linClrLst meth="repeat">
+      <a:schemeClr val="accent1">
+        <a:shade val="80000"/>
+      </a:schemeClr>
+    </dgm:linClrLst>
+    <dgm:effectClrLst/>
+    <dgm:txLinClrLst/>
+    <dgm:txFillClrLst meth="repeat">
+      <a:schemeClr val="tx1"/>
+    </dgm:txFillClrLst>
+    <dgm:txEffectClrLst/>
+  </dgm:styleLbl>
+  <dgm:styleLbl name="fgAcc1">
+    <dgm:fillClrLst meth="repeat">
+      <a:schemeClr val="lt1">
+        <a:alpha val="90000"/>
+      </a:schemeClr>
+    </dgm:fillClrLst>
+    <dgm:linClrLst meth="repeat">
+      <a:schemeClr val="accent1"/>
+    </dgm:linClrLst>
+    <dgm:effectClrLst/>
+    <dgm:txLinClrLst/>
+    <dgm:txFillClrLst meth="repeat">
+      <a:schemeClr val="dk1"/>
+    </dgm:txFillClrLst>
+    <dgm:txEffectClrLst/>
+  </dgm:styleLbl>
+  <dgm:styleLbl name="conFgAcc1">
+    <dgm:fillClrLst meth="repeat">
+      <a:schemeClr val="lt1">
+        <a:alpha val="90000"/>
+      </a:schemeClr>
+    </dgm:fillClrLst>
+    <dgm:linClrLst meth="repeat">
+      <a:schemeClr val="accent1"/>
+    </dgm:linClrLst>
+    <dgm:effectClrLst/>
+    <dgm:txLinClrLst/>
+    <dgm:txFillClrLst meth="repeat">
+      <a:schemeClr val="dk1"/>
+    </dgm:txFillClrLst>
+    <dgm:txEffectClrLst/>
+  </dgm:styleLbl>
+  <dgm:styleLbl name="alignAcc1">
+    <dgm:fillClrLst meth="repeat">
+      <a:schemeClr val="lt1">
+        <a:alpha val="90000"/>
+      </a:schemeClr>
+    </dgm:fillClrLst>
+    <dgm:linClrLst meth="repeat">
+      <a:schemeClr val="accent1"/>
+    </dgm:linClrLst>
+    <dgm:effectClrLst/>
+    <dgm:txLinClrLst/>
+    <dgm:txFillClrLst meth="repeat">
+      <a:schemeClr val="dk1"/>
+    </dgm:txFillClrLst>
+    <dgm:txEffectClrLst/>
+  </dgm:styleLbl>
+  <dgm:styleLbl name="trAlignAcc1">
+    <dgm:fillClrLst meth="repeat">
+      <a:schemeClr val="lt1">
+        <a:alpha val="40000"/>
+      </a:schemeClr>
+    </dgm:fillClrLst>
+    <dgm:linClrLst meth="repeat">
+      <a:schemeClr val="accent1"/>
+    </dgm:linClrLst>
+    <dgm:effectClrLst/>
+    <dgm:txLinClrLst/>
+    <dgm:txFillClrLst meth="repeat">
+      <a:schemeClr val="dk1"/>
+    </dgm:txFillClrLst>
+    <dgm:txEffectClrLst/>
+  </dgm:styleLbl>
+  <dgm:styleLbl name="bgAcc1">
+    <dgm:fillClrLst meth="repeat">
+      <a:schemeClr val="lt1">
+        <a:alpha val="90000"/>
+      </a:schemeClr>
+    </dgm:fillClrLst>
+    <dgm:linClrLst meth="repeat">
+      <a:schemeClr val="accent1"/>
+    </dgm:linClrLst>
+    <dgm:effectClrLst/>
+    <dgm:txLinClrLst/>
+    <dgm:txFillClrLst meth="repeat">
+      <a:schemeClr val="dk1"/>
+    </dgm:txFillClrLst>
+    <dgm:txEffectClrLst/>
+  </dgm:styleLbl>
+  <dgm:styleLbl name="solidFgAcc1">
+    <dgm:fillClrLst meth="repeat">
+      <a:schemeClr val="lt1"/>
+    </dgm:fillClrLst>
+    <dgm:linClrLst meth="repeat">
+      <a:schemeClr val="accent1"/>
+    </dgm:linClrLst>
+    <dgm:effectClrLst/>
+    <dgm:txLinClrLst/>
+    <dgm:txFillClrLst meth="repeat">
+      <a:schemeClr val="dk1"/>
+    </dgm:txFillClrLst>
+    <dgm:txEffectClrLst/>
+  </dgm:styleLbl>
+  <dgm:styleLbl name="solidAlignAcc1">
+    <dgm:fillClrLst meth="repeat">
+      <a:schemeClr val="lt1"/>
+    </dgm:fillClrLst>
+    <dgm:linClrLst meth="repeat">
+      <a:schemeClr val="accent1"/>
+    </dgm:linClrLst>
+    <dgm:effectClrLst/>
+    <dgm:txLinClrLst/>
+    <dgm:txFillClrLst meth="repeat">
+      <a:schemeClr val="dk1"/>
+    </dgm:txFillClrLst>
+    <dgm:txEffectClrLst/>
+  </dgm:styleLbl>
+  <dgm:styleLbl name="solidBgAcc1">
+    <dgm:fillClrLst meth="repeat">
+      <a:schemeClr val="lt1"/>
+    </dgm:fillClrLst>
+    <dgm:linClrLst meth="repeat">
+      <a:schemeClr val="accent1"/>
+    </dgm:linClrLst>
+    <dgm:effectClrLst/>
+    <dgm:txLinClrLst/>
+    <dgm:txFillClrLst meth="repeat">
+      <a:schemeClr val="dk1"/>
+    </dgm:txFillClrLst>
+    <dgm:txEffectClrLst/>
+  </dgm:styleLbl>
+  <dgm:styleLbl name="fgAccFollowNode1">
+    <dgm:fillClrLst meth="repeat">
+      <a:schemeClr val="accent1">
+        <a:alpha val="90000"/>
+        <a:tint val="40000"/>
+      </a:schemeClr>
+    </dgm:fillClrLst>
+    <dgm:linClrLst meth="repeat">
+      <a:schemeClr val="accent1">
+        <a:alpha val="90000"/>
+        <a:tint val="40000"/>
+      </a:schemeClr>
+    </dgm:linClrLst>
+    <dgm:effectClrLst/>
+    <dgm:txLinClrLst/>
+    <dgm:txFillClrLst meth="repeat">
+      <a:schemeClr val="dk1"/>
+    </dgm:txFillClrLst>
+    <dgm:txEffectClrLst/>
+  </dgm:styleLbl>
+  <dgm:styleLbl name="alignAccFollowNode1">
+    <dgm:fillClrLst meth="repeat">
+      <a:schemeClr val="accent1">
+        <a:alpha val="90000"/>
+        <a:tint val="40000"/>
+      </a:schemeClr>
+    </dgm:fillClrLst>
+    <dgm:linClrLst meth="repeat">
+      <a:schemeClr val="accent1">
+        <a:alpha val="90000"/>
+        <a:tint val="40000"/>
+      </a:schemeClr>
+    </dgm:linClrLst>
+    <dgm:effectClrLst/>
+    <dgm:txLinClrLst/>
+    <dgm:txFillClrLst meth="repeat">
+      <a:schemeClr val="dk1"/>
+    </dgm:txFillClrLst>
+    <dgm:txEffectClrLst/>
+  </dgm:styleLbl>
+  <dgm:styleLbl name="bgAccFollowNode1">
+    <dgm:fillClrLst meth="repeat">
+      <a:schemeClr val="accent1">
+        <a:alpha val="90000"/>
+        <a:tint val="40000"/>
+      </a:schemeClr>
+    </dgm:fillClrLst>
+    <dgm:linClrLst meth="repeat">
+      <a:schemeClr val="accent1">
+        <a:alpha val="90000"/>
+        <a:tint val="40000"/>
+      </a:schemeClr>
+    </dgm:linClrLst>
+    <dgm:effectClrLst/>
+    <dgm:txLinClrLst/>
+    <dgm:txFillClrLst meth="repeat">
+      <a:schemeClr val="dk1"/>
+    </dgm:txFillClrLst>
+    <dgm:txEffectClrLst/>
+  </dgm:styleLbl>
+  <dgm:styleLbl name="fgAcc0">
+    <dgm:fillClrLst meth="repeat">
+      <a:schemeClr val="lt1">
+        <a:alpha val="90000"/>
+      </a:schemeClr>
+    </dgm:fillClrLst>
+    <dgm:linClrLst meth="repeat">
+      <a:schemeClr val="accent1"/>
+    </dgm:linClrLst>
+    <dgm:effectClrLst/>
+    <dgm:txLinClrLst/>
+    <dgm:txFillClrLst meth="repeat">
+      <a:schemeClr val="dk1"/>
+    </dgm:txFillClrLst>
+    <dgm:txEffectClrLst/>
+  </dgm:styleLbl>
+  <dgm:styleLbl name="fgAcc2">
+    <dgm:fillClrLst meth="repeat">
+      <a:schemeClr val="lt1">
+        <a:alpha val="90000"/>
+      </a:schemeClr>
+    </dgm:fillClrLst>
+    <dgm:linClrLst meth="repeat">
+      <a:schemeClr val="accent1"/>
+    </dgm:linClrLst>
+    <dgm:effectClrLst/>
+    <dgm:txLinClrLst/>
+    <dgm:txFillClrLst meth="repeat">
+      <a:schemeClr val="dk1"/>
+    </dgm:txFillClrLst>
+    <dgm:txEffectClrLst/>
+  </dgm:styleLbl>
+  <dgm:styleLbl name="fgAcc3">
+    <dgm:fillClrLst meth="repeat">
+      <a:schemeClr val="lt1">
+        <a:alpha val="90000"/>
+      </a:schemeClr>
+    </dgm:fillClrLst>
+    <dgm:linClrLst meth="repeat">
+      <a:schemeClr val="accent1"/>
+    </dgm:linClrLst>
+    <dgm:effectClrLst/>
+    <dgm:txLinClrLst/>
+    <dgm:txFillClrLst meth="repeat">
+      <a:schemeClr val="dk1"/>
+    </dgm:txFillClrLst>
+    <dgm:txEffectClrLst/>
+  </dgm:styleLbl>
+  <dgm:styleLbl name="fgAcc4">
+    <dgm:fillClrLst meth="repeat">
+      <a:schemeClr val="lt1">
+        <a:alpha val="90000"/>
+      </a:schemeClr>
+    </dgm:fillClrLst>
+    <dgm:linClrLst meth="repeat">
+      <a:schemeClr val="accent1"/>
+    </dgm:linClrLst>
+    <dgm:effectClrLst/>
+    <dgm:txLinClrLst/>
+    <dgm:txFillClrLst meth="repeat">
+      <a:schemeClr val="dk1"/>
+    </dgm:txFillClrLst>
+    <dgm:txEffectClrLst/>
+  </dgm:styleLbl>
+  <dgm:styleLbl name="bgShp">
+    <dgm:fillClrLst meth="repeat">
+      <a:schemeClr val="accent1">
+        <a:tint val="40000"/>
+      </a:schemeClr>
+    </dgm:fillClrLst>
+    <dgm:linClrLst meth="repeat">
+      <a:schemeClr val="accent1"/>
+    </dgm:linClrLst>
+    <dgm:effectClrLst/>
+    <dgm:txLinClrLst/>
+    <dgm:txFillClrLst meth="repeat">
+      <a:schemeClr val="dk1"/>
+    </dgm:txFillClrLst>
+    <dgm:txEffectClrLst/>
+  </dgm:styleLbl>
+  <dgm:styleLbl name="dkBgShp">
+    <dgm:fillClrLst meth="repeat">
+      <a:schemeClr val="accent1">
+        <a:shade val="80000"/>
+      </a:schemeClr>
+    </dgm:fillClrLst>
+    <dgm:linClrLst meth="repeat">
+      <a:schemeClr val="accent1"/>
+    </dgm:linClrLst>
+    <dgm:effectClrLst/>
+    <dgm:txLinClrLst/>
+    <dgm:txFillClrLst meth="repeat">
+      <a:schemeClr val="lt1"/>
+    </dgm:txFillClrLst>
+    <dgm:txEffectClrLst/>
+  </dgm:styleLbl>
+  <dgm:styleLbl name="trBgShp">
+    <dgm:fillClrLst meth="repeat">
+      <a:schemeClr val="accent1">
+        <a:tint val="50000"/>
+        <a:alpha val="40000"/>
+      </a:schemeClr>
+    </dgm:fillClrLst>
+    <dgm:linClrLst meth="repeat">
+      <a:schemeClr val="accent1"/>
+    </dgm:linClrLst>
+    <dgm:effectClrLst/>
+    <dgm:txLinClrLst/>
+    <dgm:txFillClrLst meth="repeat">
+      <a:schemeClr val="lt1"/>
+    </dgm:txFillClrLst>
+    <dgm:txEffectClrLst/>
+  </dgm:styleLbl>
+  <dgm:styleLbl name="fgShp">
+    <dgm:fillClrLst meth="repeat">
+      <a:schemeClr val="accent1">
+        <a:tint val="60000"/>
+      </a:schemeClr>
+    </dgm:fillClrLst>
+    <dgm:linClrLst meth="repeat">
+      <a:schemeClr val="lt1"/>
+    </dgm:linClrLst>
+    <dgm:effectClrLst/>
+    <dgm:txLinClrLst/>
+    <dgm:txFillClrLst meth="repeat">
+      <a:schemeClr val="dk1"/>
+    </dgm:txFillClrLst>
+    <dgm:txEffectClrLst/>
+  </dgm:styleLbl>
+  <dgm:styleLbl name="revTx">
+    <dgm:fillClrLst meth="repeat">
+      <a:schemeClr val="lt1">
+        <a:alpha val="0"/>
+      </a:schemeClr>
+    </dgm:fillClrLst>
+    <dgm:linClrLst meth="repeat">
+      <a:schemeClr val="dk1">
+        <a:alpha val="0"/>
+      </a:schemeClr>
+    </dgm:linClrLst>
+    <dgm:effectClrLst/>
+    <dgm:txLinClrLst/>
+    <dgm:txFillClrLst meth="repeat">
+      <a:schemeClr val="tx1"/>
+    </dgm:txFillClrLst>
+    <dgm:txEffectClrLst/>
+  </dgm:styleLbl>
+</dgm:colorsDef>
+</file>
+
+<file path=ppt/diagrams/data1.xml><?xml version="1.0" encoding="utf-8"?>
+<dgm:dataModel xmlns:dgm="http://schemas.openxmlformats.org/drawingml/2006/diagram" xmlns:a="http://schemas.openxmlformats.org/drawingml/2006/main">
+  <dgm:ptLst>
+    <dgm:pt modelId="{F2AC81BD-9732-4272-A106-D1A846FB5937}" type="doc">
+      <dgm:prSet loTypeId="urn:microsoft.com/office/officeart/2005/8/layout/chevron2" loCatId="process" qsTypeId="urn:microsoft.com/office/officeart/2005/8/quickstyle/simple1" qsCatId="simple" csTypeId="urn:microsoft.com/office/officeart/2005/8/colors/accent1_2" csCatId="accent1" phldr="1"/>
+      <dgm:spPr/>
+      <dgm:t>
+        <a:bodyPr/>
+        <a:lstStyle/>
+        <a:p>
+          <a:endParaRPr lang="en-US"/>
+        </a:p>
+      </dgm:t>
+    </dgm:pt>
+    <dgm:pt modelId="{01E00153-5F75-46F9-B286-AE450936338F}">
+      <dgm:prSet phldrT="[Text]"/>
+      <dgm:spPr/>
+      <dgm:t>
+        <a:bodyPr/>
+        <a:lstStyle/>
+        <a:p>
+          <a:r>
+            <a:rPr lang="en-US" dirty="0"/>
+            <a:t>Collect</a:t>
+          </a:r>
+        </a:p>
+      </dgm:t>
+    </dgm:pt>
+    <dgm:pt modelId="{7283EDC8-D38A-4B01-8E3C-99D11FC7E788}" type="parTrans" cxnId="{FE1CB5C0-B9FE-478A-8ABB-C39B371A906A}">
+      <dgm:prSet/>
+      <dgm:spPr/>
+      <dgm:t>
+        <a:bodyPr/>
+        <a:lstStyle/>
+        <a:p>
+          <a:endParaRPr lang="en-US"/>
+        </a:p>
+      </dgm:t>
+    </dgm:pt>
+    <dgm:pt modelId="{2B0796F4-1D70-4F5B-BBFA-1F8A1975280A}" type="sibTrans" cxnId="{FE1CB5C0-B9FE-478A-8ABB-C39B371A906A}">
+      <dgm:prSet/>
+      <dgm:spPr/>
+      <dgm:t>
+        <a:bodyPr/>
+        <a:lstStyle/>
+        <a:p>
+          <a:endParaRPr lang="en-US"/>
+        </a:p>
+      </dgm:t>
+    </dgm:pt>
+    <dgm:pt modelId="{6E6B7B0C-6FA3-4E65-A0D2-32E188153B68}">
+      <dgm:prSet phldrT="[Text]"/>
+      <dgm:spPr/>
+      <dgm:t>
+        <a:bodyPr/>
+        <a:lstStyle/>
+        <a:p>
+          <a:r>
+            <a:rPr lang="en-US" dirty="0"/>
+            <a:t>Zillow Housing Data</a:t>
+          </a:r>
+        </a:p>
+      </dgm:t>
+    </dgm:pt>
+    <dgm:pt modelId="{11BF46B6-B001-49EA-9A6A-AF0095B6E899}" type="parTrans" cxnId="{9140DB36-BB21-49AD-B988-E2E3F70417F3}">
+      <dgm:prSet/>
+      <dgm:spPr/>
+      <dgm:t>
+        <a:bodyPr/>
+        <a:lstStyle/>
+        <a:p>
+          <a:endParaRPr lang="en-US"/>
+        </a:p>
+      </dgm:t>
+    </dgm:pt>
+    <dgm:pt modelId="{6A94F0CB-42EA-4844-BBFE-CE833BCB979F}" type="sibTrans" cxnId="{9140DB36-BB21-49AD-B988-E2E3F70417F3}">
+      <dgm:prSet/>
+      <dgm:spPr/>
+      <dgm:t>
+        <a:bodyPr/>
+        <a:lstStyle/>
+        <a:p>
+          <a:endParaRPr lang="en-US"/>
+        </a:p>
+      </dgm:t>
+    </dgm:pt>
+    <dgm:pt modelId="{17E7C481-8479-4BCF-A990-9C8629BF15A5}">
+      <dgm:prSet phldrT="[Text]"/>
+      <dgm:spPr/>
+      <dgm:t>
+        <a:bodyPr/>
+        <a:lstStyle/>
+        <a:p>
+          <a:r>
+            <a:rPr lang="en-US" dirty="0"/>
+            <a:t>BLS Employment Data</a:t>
+          </a:r>
+        </a:p>
+      </dgm:t>
+    </dgm:pt>
+    <dgm:pt modelId="{92F1267B-2EEA-4039-8E24-ADD0D15B81D7}" type="parTrans" cxnId="{D0B90894-A9A8-48C6-8A79-4E3D23692D39}">
+      <dgm:prSet/>
+      <dgm:spPr/>
+      <dgm:t>
+        <a:bodyPr/>
+        <a:lstStyle/>
+        <a:p>
+          <a:endParaRPr lang="en-US"/>
+        </a:p>
+      </dgm:t>
+    </dgm:pt>
+    <dgm:pt modelId="{2EB85D4F-27E7-4B23-B28C-02DCBBB7E2C2}" type="sibTrans" cxnId="{D0B90894-A9A8-48C6-8A79-4E3D23692D39}">
+      <dgm:prSet/>
+      <dgm:spPr/>
+      <dgm:t>
+        <a:bodyPr/>
+        <a:lstStyle/>
+        <a:p>
+          <a:endParaRPr lang="en-US"/>
+        </a:p>
+      </dgm:t>
+    </dgm:pt>
+    <dgm:pt modelId="{5A816D14-7600-4C03-837D-96609B3338F9}">
+      <dgm:prSet phldrT="[Text]"/>
+      <dgm:spPr/>
+      <dgm:t>
+        <a:bodyPr/>
+        <a:lstStyle/>
+        <a:p>
+          <a:r>
+            <a:rPr lang="en-US" dirty="0"/>
+            <a:t>Merge</a:t>
+          </a:r>
+        </a:p>
+      </dgm:t>
+    </dgm:pt>
+    <dgm:pt modelId="{3A2F1BF1-42A7-495D-ADFE-948983D1F544}" type="parTrans" cxnId="{BE87F6F5-33A3-467D-94C4-860EB35E9695}">
+      <dgm:prSet/>
+      <dgm:spPr/>
+      <dgm:t>
+        <a:bodyPr/>
+        <a:lstStyle/>
+        <a:p>
+          <a:endParaRPr lang="en-US"/>
+        </a:p>
+      </dgm:t>
+    </dgm:pt>
+    <dgm:pt modelId="{2BCAACD6-28A6-4A28-B0A1-ACB9BB7D98C4}" type="sibTrans" cxnId="{BE87F6F5-33A3-467D-94C4-860EB35E9695}">
+      <dgm:prSet/>
+      <dgm:spPr/>
+      <dgm:t>
+        <a:bodyPr/>
+        <a:lstStyle/>
+        <a:p>
+          <a:endParaRPr lang="en-US"/>
+        </a:p>
+      </dgm:t>
+    </dgm:pt>
+    <dgm:pt modelId="{C388CDFE-DE9E-4957-9A16-88184AC8877A}">
+      <dgm:prSet phldrT="[Text]"/>
+      <dgm:spPr/>
+      <dgm:t>
+        <a:bodyPr/>
+        <a:lstStyle/>
+        <a:p>
+          <a:r>
+            <a:rPr lang="en-US" dirty="0"/>
+            <a:t>Converted data to annual data </a:t>
+          </a:r>
+        </a:p>
+      </dgm:t>
+    </dgm:pt>
+    <dgm:pt modelId="{29AD9FA6-E766-4C65-8966-80ADDCF7EA87}" type="parTrans" cxnId="{474696FA-0E02-43D4-A080-353958082A92}">
+      <dgm:prSet/>
+      <dgm:spPr/>
+      <dgm:t>
+        <a:bodyPr/>
+        <a:lstStyle/>
+        <a:p>
+          <a:endParaRPr lang="en-US"/>
+        </a:p>
+      </dgm:t>
+    </dgm:pt>
+    <dgm:pt modelId="{A3E57C68-70FA-44EF-9B2B-7A5597BBF1F3}" type="sibTrans" cxnId="{474696FA-0E02-43D4-A080-353958082A92}">
+      <dgm:prSet/>
+      <dgm:spPr/>
+      <dgm:t>
+        <a:bodyPr/>
+        <a:lstStyle/>
+        <a:p>
+          <a:endParaRPr lang="en-US"/>
+        </a:p>
+      </dgm:t>
+    </dgm:pt>
+    <dgm:pt modelId="{05E8B2D9-9D1D-4F6E-B6F1-EC0904398FA4}">
+      <dgm:prSet phldrT="[Text]"/>
+      <dgm:spPr/>
+      <dgm:t>
+        <a:bodyPr/>
+        <a:lstStyle/>
+        <a:p>
+          <a:r>
+            <a:rPr lang="en-US" dirty="0"/>
+            <a:t>Merge all data sets into a Master Data Frame</a:t>
+          </a:r>
+        </a:p>
+      </dgm:t>
+    </dgm:pt>
+    <dgm:pt modelId="{288F07E2-6230-43CB-9BE7-7C381F0FEFCA}" type="parTrans" cxnId="{AE86A138-8B06-42DE-BBB1-5C828470E822}">
+      <dgm:prSet/>
+      <dgm:spPr/>
+      <dgm:t>
+        <a:bodyPr/>
+        <a:lstStyle/>
+        <a:p>
+          <a:endParaRPr lang="en-US"/>
+        </a:p>
+      </dgm:t>
+    </dgm:pt>
+    <dgm:pt modelId="{25042658-CFD0-4C52-9C7B-DA000C4018A4}" type="sibTrans" cxnId="{AE86A138-8B06-42DE-BBB1-5C828470E822}">
+      <dgm:prSet/>
+      <dgm:spPr/>
+      <dgm:t>
+        <a:bodyPr/>
+        <a:lstStyle/>
+        <a:p>
+          <a:endParaRPr lang="en-US"/>
+        </a:p>
+      </dgm:t>
+    </dgm:pt>
+    <dgm:pt modelId="{EDEF6686-056E-402A-8143-1B2CBBC473C7}">
+      <dgm:prSet phldrT="[Text]"/>
+      <dgm:spPr/>
+      <dgm:t>
+        <a:bodyPr/>
+        <a:lstStyle/>
+        <a:p>
+          <a:r>
+            <a:rPr lang="en-US" dirty="0"/>
+            <a:t>Clean</a:t>
+          </a:r>
+        </a:p>
+      </dgm:t>
+    </dgm:pt>
+    <dgm:pt modelId="{B47EC89A-6C51-4FDB-A5F1-3E4B5FEECD52}" type="parTrans" cxnId="{BFC3C30B-2A3E-413D-8B29-E39D920B3A20}">
+      <dgm:prSet/>
+      <dgm:spPr/>
+      <dgm:t>
+        <a:bodyPr/>
+        <a:lstStyle/>
+        <a:p>
+          <a:endParaRPr lang="en-US"/>
+        </a:p>
+      </dgm:t>
+    </dgm:pt>
+    <dgm:pt modelId="{B9ECD2AE-8059-4107-9405-1BF65A66F01F}" type="sibTrans" cxnId="{BFC3C30B-2A3E-413D-8B29-E39D920B3A20}">
+      <dgm:prSet/>
+      <dgm:spPr/>
+      <dgm:t>
+        <a:bodyPr/>
+        <a:lstStyle/>
+        <a:p>
+          <a:endParaRPr lang="en-US"/>
+        </a:p>
+      </dgm:t>
+    </dgm:pt>
+    <dgm:pt modelId="{0FBEFF63-24DE-4AD6-95B2-D1F54F0E47F3}">
+      <dgm:prSet phldrT="[Text]"/>
+      <dgm:spPr/>
+      <dgm:t>
+        <a:bodyPr/>
+        <a:lstStyle/>
+        <a:p>
+          <a:r>
+            <a:rPr lang="en-US" dirty="0"/>
+            <a:t>We removed all rows that had incomplete data for that year. </a:t>
+          </a:r>
+        </a:p>
+      </dgm:t>
+    </dgm:pt>
+    <dgm:pt modelId="{9C623CCC-1AA1-4D37-B3E3-0FA1464A97DC}" type="parTrans" cxnId="{75729BA9-A118-4395-8599-C16B0CFA4909}">
+      <dgm:prSet/>
+      <dgm:spPr/>
+      <dgm:t>
+        <a:bodyPr/>
+        <a:lstStyle/>
+        <a:p>
+          <a:endParaRPr lang="en-US"/>
+        </a:p>
+      </dgm:t>
+    </dgm:pt>
+    <dgm:pt modelId="{1848489A-AA0D-4042-9114-A68CF6F69910}" type="sibTrans" cxnId="{75729BA9-A118-4395-8599-C16B0CFA4909}">
+      <dgm:prSet/>
+      <dgm:spPr/>
+      <dgm:t>
+        <a:bodyPr/>
+        <a:lstStyle/>
+        <a:p>
+          <a:endParaRPr lang="en-US"/>
+        </a:p>
+      </dgm:t>
+    </dgm:pt>
+    <dgm:pt modelId="{54952176-235B-463E-A749-2ADFA4D6367F}">
+      <dgm:prSet phldrT="[Text]"/>
+      <dgm:spPr/>
+      <dgm:t>
+        <a:bodyPr/>
+        <a:lstStyle/>
+        <a:p>
+          <a:r>
+            <a:rPr lang="en-US" dirty="0"/>
+            <a:t>Output the data for analysis to CSVs.</a:t>
+          </a:r>
+        </a:p>
+      </dgm:t>
+    </dgm:pt>
+    <dgm:pt modelId="{9A094C4E-8DBD-4C17-A776-FEE2C62C96F0}" type="parTrans" cxnId="{21D9784B-648D-4702-B21C-FAE72FB93895}">
+      <dgm:prSet/>
+      <dgm:spPr/>
+      <dgm:t>
+        <a:bodyPr/>
+        <a:lstStyle/>
+        <a:p>
+          <a:endParaRPr lang="en-US"/>
+        </a:p>
+      </dgm:t>
+    </dgm:pt>
+    <dgm:pt modelId="{7A1E3DF4-B11F-4266-86CA-F633411D154A}" type="sibTrans" cxnId="{21D9784B-648D-4702-B21C-FAE72FB93895}">
+      <dgm:prSet/>
+      <dgm:spPr/>
+      <dgm:t>
+        <a:bodyPr/>
+        <a:lstStyle/>
+        <a:p>
+          <a:endParaRPr lang="en-US"/>
+        </a:p>
+      </dgm:t>
+    </dgm:pt>
+    <dgm:pt modelId="{5010CB09-90D3-475F-B6FD-BADF8EDDE138}">
+      <dgm:prSet phldrT="[Text]"/>
+      <dgm:spPr/>
+      <dgm:t>
+        <a:bodyPr/>
+        <a:lstStyle/>
+        <a:p>
+          <a:r>
+            <a:rPr lang="en-US" dirty="0"/>
+            <a:t>IRS Income Data</a:t>
+          </a:r>
+        </a:p>
+      </dgm:t>
+    </dgm:pt>
+    <dgm:pt modelId="{ED77489D-15CC-4DAD-8F6E-61BDF95C71BD}" type="parTrans" cxnId="{98CE6760-F8AD-4641-891A-721D22E37D08}">
+      <dgm:prSet/>
+      <dgm:spPr/>
+      <dgm:t>
+        <a:bodyPr/>
+        <a:lstStyle/>
+        <a:p>
+          <a:endParaRPr lang="en-US"/>
+        </a:p>
+      </dgm:t>
+    </dgm:pt>
+    <dgm:pt modelId="{91D4FC13-9723-4A63-8B85-0F3925A3100C}" type="sibTrans" cxnId="{98CE6760-F8AD-4641-891A-721D22E37D08}">
+      <dgm:prSet/>
+      <dgm:spPr/>
+      <dgm:t>
+        <a:bodyPr/>
+        <a:lstStyle/>
+        <a:p>
+          <a:endParaRPr lang="en-US"/>
+        </a:p>
+      </dgm:t>
+    </dgm:pt>
+    <dgm:pt modelId="{29043C36-391B-41C0-9890-15E6EA4619DB}">
+      <dgm:prSet phldrT="[Text]"/>
+      <dgm:spPr/>
+      <dgm:t>
+        <a:bodyPr/>
+        <a:lstStyle/>
+        <a:p>
+          <a:r>
+            <a:rPr lang="en-US" dirty="0"/>
+            <a:t>We then merged on year and zip code</a:t>
+          </a:r>
+        </a:p>
+      </dgm:t>
+    </dgm:pt>
+    <dgm:pt modelId="{AE7D5EFD-EE36-486C-9766-B73CAD27C9A9}" type="parTrans" cxnId="{B3749050-0A7F-481B-A521-F3E493FB3EAB}">
+      <dgm:prSet/>
+      <dgm:spPr/>
+    </dgm:pt>
+    <dgm:pt modelId="{B5B29170-69F2-47FE-AF4F-8229FD513618}" type="sibTrans" cxnId="{B3749050-0A7F-481B-A521-F3E493FB3EAB}">
+      <dgm:prSet/>
+      <dgm:spPr/>
+    </dgm:pt>
+    <dgm:pt modelId="{5EE6085E-A16A-4E86-9A55-24F435CCB7FD}" type="pres">
+      <dgm:prSet presAssocID="{F2AC81BD-9732-4272-A106-D1A846FB5937}" presName="linearFlow" presStyleCnt="0">
+        <dgm:presLayoutVars>
+          <dgm:dir/>
+          <dgm:animLvl val="lvl"/>
+          <dgm:resizeHandles val="exact"/>
+        </dgm:presLayoutVars>
+      </dgm:prSet>
+      <dgm:spPr/>
+    </dgm:pt>
+    <dgm:pt modelId="{88B78FAA-7350-4485-A47D-A2C6760BB1E9}" type="pres">
+      <dgm:prSet presAssocID="{01E00153-5F75-46F9-B286-AE450936338F}" presName="composite" presStyleCnt="0"/>
+      <dgm:spPr/>
+    </dgm:pt>
+    <dgm:pt modelId="{75D778B2-2691-4103-86DE-B9B9565F8E17}" type="pres">
+      <dgm:prSet presAssocID="{01E00153-5F75-46F9-B286-AE450936338F}" presName="parentText" presStyleLbl="alignNode1" presStyleIdx="0" presStyleCnt="3">
+        <dgm:presLayoutVars>
+          <dgm:chMax val="1"/>
+          <dgm:bulletEnabled val="1"/>
+        </dgm:presLayoutVars>
+      </dgm:prSet>
+      <dgm:spPr/>
+    </dgm:pt>
+    <dgm:pt modelId="{18CBD214-83CB-4F32-A097-052938B80ADD}" type="pres">
+      <dgm:prSet presAssocID="{01E00153-5F75-46F9-B286-AE450936338F}" presName="descendantText" presStyleLbl="alignAcc1" presStyleIdx="0" presStyleCnt="3">
+        <dgm:presLayoutVars>
+          <dgm:bulletEnabled val="1"/>
+        </dgm:presLayoutVars>
+      </dgm:prSet>
+      <dgm:spPr/>
+    </dgm:pt>
+    <dgm:pt modelId="{D4CD4396-F8F1-4985-A448-FA82F7B4C109}" type="pres">
+      <dgm:prSet presAssocID="{2B0796F4-1D70-4F5B-BBFA-1F8A1975280A}" presName="sp" presStyleCnt="0"/>
+      <dgm:spPr/>
+    </dgm:pt>
+    <dgm:pt modelId="{43D07C9C-0B62-4B63-AE6C-0DDC72E95053}" type="pres">
+      <dgm:prSet presAssocID="{5A816D14-7600-4C03-837D-96609B3338F9}" presName="composite" presStyleCnt="0"/>
+      <dgm:spPr/>
+    </dgm:pt>
+    <dgm:pt modelId="{C048B855-E79B-4CA5-BD91-D367696D93A3}" type="pres">
+      <dgm:prSet presAssocID="{5A816D14-7600-4C03-837D-96609B3338F9}" presName="parentText" presStyleLbl="alignNode1" presStyleIdx="1" presStyleCnt="3">
+        <dgm:presLayoutVars>
+          <dgm:chMax val="1"/>
+          <dgm:bulletEnabled val="1"/>
+        </dgm:presLayoutVars>
+      </dgm:prSet>
+      <dgm:spPr/>
+    </dgm:pt>
+    <dgm:pt modelId="{F9B07533-D0CC-437D-A991-88CA84DBA6EC}" type="pres">
+      <dgm:prSet presAssocID="{5A816D14-7600-4C03-837D-96609B3338F9}" presName="descendantText" presStyleLbl="alignAcc1" presStyleIdx="1" presStyleCnt="3">
+        <dgm:presLayoutVars>
+          <dgm:bulletEnabled val="1"/>
+        </dgm:presLayoutVars>
+      </dgm:prSet>
+      <dgm:spPr/>
+    </dgm:pt>
+    <dgm:pt modelId="{626089AB-2AEA-4380-A395-624CD2475072}" type="pres">
+      <dgm:prSet presAssocID="{2BCAACD6-28A6-4A28-B0A1-ACB9BB7D98C4}" presName="sp" presStyleCnt="0"/>
+      <dgm:spPr/>
+    </dgm:pt>
+    <dgm:pt modelId="{B9D5259B-ADB5-4791-B2FC-2C893177C011}" type="pres">
+      <dgm:prSet presAssocID="{EDEF6686-056E-402A-8143-1B2CBBC473C7}" presName="composite" presStyleCnt="0"/>
+      <dgm:spPr/>
+    </dgm:pt>
+    <dgm:pt modelId="{0F5F1EA3-A467-41FE-9EA8-F84943D3CC61}" type="pres">
+      <dgm:prSet presAssocID="{EDEF6686-056E-402A-8143-1B2CBBC473C7}" presName="parentText" presStyleLbl="alignNode1" presStyleIdx="2" presStyleCnt="3">
+        <dgm:presLayoutVars>
+          <dgm:chMax val="1"/>
+          <dgm:bulletEnabled val="1"/>
+        </dgm:presLayoutVars>
+      </dgm:prSet>
+      <dgm:spPr/>
+    </dgm:pt>
+    <dgm:pt modelId="{21E06A02-D81D-4E5C-B5A1-6AEDC0FC238E}" type="pres">
+      <dgm:prSet presAssocID="{EDEF6686-056E-402A-8143-1B2CBBC473C7}" presName="descendantText" presStyleLbl="alignAcc1" presStyleIdx="2" presStyleCnt="3">
+        <dgm:presLayoutVars>
+          <dgm:bulletEnabled val="1"/>
+        </dgm:presLayoutVars>
+      </dgm:prSet>
+      <dgm:spPr/>
+    </dgm:pt>
+  </dgm:ptLst>
+  <dgm:cxnLst>
+    <dgm:cxn modelId="{457C0801-2542-44AE-A5E8-DB5058584FEB}" type="presOf" srcId="{5A816D14-7600-4C03-837D-96609B3338F9}" destId="{C048B855-E79B-4CA5-BD91-D367696D93A3}" srcOrd="0" destOrd="0" presId="urn:microsoft.com/office/officeart/2005/8/layout/chevron2"/>
+    <dgm:cxn modelId="{BFC3C30B-2A3E-413D-8B29-E39D920B3A20}" srcId="{F2AC81BD-9732-4272-A106-D1A846FB5937}" destId="{EDEF6686-056E-402A-8143-1B2CBBC473C7}" srcOrd="2" destOrd="0" parTransId="{B47EC89A-6C51-4FDB-A5F1-3E4B5FEECD52}" sibTransId="{B9ECD2AE-8059-4107-9405-1BF65A66F01F}"/>
+    <dgm:cxn modelId="{9D114030-BD06-4C90-84A6-245C0B5CFA39}" type="presOf" srcId="{17E7C481-8479-4BCF-A990-9C8629BF15A5}" destId="{18CBD214-83CB-4F32-A097-052938B80ADD}" srcOrd="0" destOrd="1" presId="urn:microsoft.com/office/officeart/2005/8/layout/chevron2"/>
+    <dgm:cxn modelId="{9140DB36-BB21-49AD-B988-E2E3F70417F3}" srcId="{01E00153-5F75-46F9-B286-AE450936338F}" destId="{6E6B7B0C-6FA3-4E65-A0D2-32E188153B68}" srcOrd="0" destOrd="0" parTransId="{11BF46B6-B001-49EA-9A6A-AF0095B6E899}" sibTransId="{6A94F0CB-42EA-4844-BBFE-CE833BCB979F}"/>
+    <dgm:cxn modelId="{AE86A138-8B06-42DE-BBB1-5C828470E822}" srcId="{5A816D14-7600-4C03-837D-96609B3338F9}" destId="{05E8B2D9-9D1D-4F6E-B6F1-EC0904398FA4}" srcOrd="1" destOrd="0" parTransId="{288F07E2-6230-43CB-9BE7-7C381F0FEFCA}" sibTransId="{25042658-CFD0-4C52-9C7B-DA000C4018A4}"/>
+    <dgm:cxn modelId="{86A6BE3C-C558-4365-9590-6029DA4052D0}" type="presOf" srcId="{C388CDFE-DE9E-4957-9A16-88184AC8877A}" destId="{F9B07533-D0CC-437D-A991-88CA84DBA6EC}" srcOrd="0" destOrd="0" presId="urn:microsoft.com/office/officeart/2005/8/layout/chevron2"/>
+    <dgm:cxn modelId="{04499F3D-EC47-4438-9055-A2F7E85BC065}" type="presOf" srcId="{6E6B7B0C-6FA3-4E65-A0D2-32E188153B68}" destId="{18CBD214-83CB-4F32-A097-052938B80ADD}" srcOrd="0" destOrd="0" presId="urn:microsoft.com/office/officeart/2005/8/layout/chevron2"/>
+    <dgm:cxn modelId="{98CE6760-F8AD-4641-891A-721D22E37D08}" srcId="{01E00153-5F75-46F9-B286-AE450936338F}" destId="{5010CB09-90D3-475F-B6FD-BADF8EDDE138}" srcOrd="2" destOrd="0" parTransId="{ED77489D-15CC-4DAD-8F6E-61BDF95C71BD}" sibTransId="{91D4FC13-9723-4A63-8B85-0F3925A3100C}"/>
+    <dgm:cxn modelId="{4A850D4A-9DED-40BE-95DB-47A882710AAC}" type="presOf" srcId="{0FBEFF63-24DE-4AD6-95B2-D1F54F0E47F3}" destId="{21E06A02-D81D-4E5C-B5A1-6AEDC0FC238E}" srcOrd="0" destOrd="0" presId="urn:microsoft.com/office/officeart/2005/8/layout/chevron2"/>
+    <dgm:cxn modelId="{21D9784B-648D-4702-B21C-FAE72FB93895}" srcId="{EDEF6686-056E-402A-8143-1B2CBBC473C7}" destId="{54952176-235B-463E-A749-2ADFA4D6367F}" srcOrd="1" destOrd="0" parTransId="{9A094C4E-8DBD-4C17-A776-FEE2C62C96F0}" sibTransId="{7A1E3DF4-B11F-4266-86CA-F633411D154A}"/>
+    <dgm:cxn modelId="{70F7854C-C7F3-475C-BA20-C7557A56D303}" type="presOf" srcId="{F2AC81BD-9732-4272-A106-D1A846FB5937}" destId="{5EE6085E-A16A-4E86-9A55-24F435CCB7FD}" srcOrd="0" destOrd="0" presId="urn:microsoft.com/office/officeart/2005/8/layout/chevron2"/>
+    <dgm:cxn modelId="{CE479B4D-402C-4796-A863-3EA5572FB7CD}" type="presOf" srcId="{29043C36-391B-41C0-9890-15E6EA4619DB}" destId="{F9B07533-D0CC-437D-A991-88CA84DBA6EC}" srcOrd="0" destOrd="2" presId="urn:microsoft.com/office/officeart/2005/8/layout/chevron2"/>
+    <dgm:cxn modelId="{B3749050-0A7F-481B-A521-F3E493FB3EAB}" srcId="{5A816D14-7600-4C03-837D-96609B3338F9}" destId="{29043C36-391B-41C0-9890-15E6EA4619DB}" srcOrd="2" destOrd="0" parTransId="{AE7D5EFD-EE36-486C-9766-B73CAD27C9A9}" sibTransId="{B5B29170-69F2-47FE-AF4F-8229FD513618}"/>
+    <dgm:cxn modelId="{E912D975-9D25-4248-B591-AA4E1269687A}" type="presOf" srcId="{54952176-235B-463E-A749-2ADFA4D6367F}" destId="{21E06A02-D81D-4E5C-B5A1-6AEDC0FC238E}" srcOrd="0" destOrd="1" presId="urn:microsoft.com/office/officeart/2005/8/layout/chevron2"/>
+    <dgm:cxn modelId="{A53E6483-C607-4774-8A0C-B1D20FAE69CF}" type="presOf" srcId="{EDEF6686-056E-402A-8143-1B2CBBC473C7}" destId="{0F5F1EA3-A467-41FE-9EA8-F84943D3CC61}" srcOrd="0" destOrd="0" presId="urn:microsoft.com/office/officeart/2005/8/layout/chevron2"/>
+    <dgm:cxn modelId="{B4DC278B-0700-4927-B412-2F389B8D0BF3}" type="presOf" srcId="{5010CB09-90D3-475F-B6FD-BADF8EDDE138}" destId="{18CBD214-83CB-4F32-A097-052938B80ADD}" srcOrd="0" destOrd="2" presId="urn:microsoft.com/office/officeart/2005/8/layout/chevron2"/>
+    <dgm:cxn modelId="{D0B90894-A9A8-48C6-8A79-4E3D23692D39}" srcId="{01E00153-5F75-46F9-B286-AE450936338F}" destId="{17E7C481-8479-4BCF-A990-9C8629BF15A5}" srcOrd="1" destOrd="0" parTransId="{92F1267B-2EEA-4039-8E24-ADD0D15B81D7}" sibTransId="{2EB85D4F-27E7-4B23-B28C-02DCBBB7E2C2}"/>
+    <dgm:cxn modelId="{0DDB489C-6997-4406-82DA-2AA041816139}" type="presOf" srcId="{01E00153-5F75-46F9-B286-AE450936338F}" destId="{75D778B2-2691-4103-86DE-B9B9565F8E17}" srcOrd="0" destOrd="0" presId="urn:microsoft.com/office/officeart/2005/8/layout/chevron2"/>
+    <dgm:cxn modelId="{75729BA9-A118-4395-8599-C16B0CFA4909}" srcId="{EDEF6686-056E-402A-8143-1B2CBBC473C7}" destId="{0FBEFF63-24DE-4AD6-95B2-D1F54F0E47F3}" srcOrd="0" destOrd="0" parTransId="{9C623CCC-1AA1-4D37-B3E3-0FA1464A97DC}" sibTransId="{1848489A-AA0D-4042-9114-A68CF6F69910}"/>
+    <dgm:cxn modelId="{21A6F7B0-A482-48DB-932C-DCE666370E4F}" type="presOf" srcId="{05E8B2D9-9D1D-4F6E-B6F1-EC0904398FA4}" destId="{F9B07533-D0CC-437D-A991-88CA84DBA6EC}" srcOrd="0" destOrd="1" presId="urn:microsoft.com/office/officeart/2005/8/layout/chevron2"/>
+    <dgm:cxn modelId="{FE1CB5C0-B9FE-478A-8ABB-C39B371A906A}" srcId="{F2AC81BD-9732-4272-A106-D1A846FB5937}" destId="{01E00153-5F75-46F9-B286-AE450936338F}" srcOrd="0" destOrd="0" parTransId="{7283EDC8-D38A-4B01-8E3C-99D11FC7E788}" sibTransId="{2B0796F4-1D70-4F5B-BBFA-1F8A1975280A}"/>
+    <dgm:cxn modelId="{BE87F6F5-33A3-467D-94C4-860EB35E9695}" srcId="{F2AC81BD-9732-4272-A106-D1A846FB5937}" destId="{5A816D14-7600-4C03-837D-96609B3338F9}" srcOrd="1" destOrd="0" parTransId="{3A2F1BF1-42A7-495D-ADFE-948983D1F544}" sibTransId="{2BCAACD6-28A6-4A28-B0A1-ACB9BB7D98C4}"/>
+    <dgm:cxn modelId="{474696FA-0E02-43D4-A080-353958082A92}" srcId="{5A816D14-7600-4C03-837D-96609B3338F9}" destId="{C388CDFE-DE9E-4957-9A16-88184AC8877A}" srcOrd="0" destOrd="0" parTransId="{29AD9FA6-E766-4C65-8966-80ADDCF7EA87}" sibTransId="{A3E57C68-70FA-44EF-9B2B-7A5597BBF1F3}"/>
+    <dgm:cxn modelId="{B9BE6614-9457-41B1-9E65-474BF7BA1BDD}" type="presParOf" srcId="{5EE6085E-A16A-4E86-9A55-24F435CCB7FD}" destId="{88B78FAA-7350-4485-A47D-A2C6760BB1E9}" srcOrd="0" destOrd="0" presId="urn:microsoft.com/office/officeart/2005/8/layout/chevron2"/>
+    <dgm:cxn modelId="{4319DBD1-7369-4BB3-968F-C6EEFC725E0C}" type="presParOf" srcId="{88B78FAA-7350-4485-A47D-A2C6760BB1E9}" destId="{75D778B2-2691-4103-86DE-B9B9565F8E17}" srcOrd="0" destOrd="0" presId="urn:microsoft.com/office/officeart/2005/8/layout/chevron2"/>
+    <dgm:cxn modelId="{58FF14FD-701A-48FB-9D0D-46B630C61128}" type="presParOf" srcId="{88B78FAA-7350-4485-A47D-A2C6760BB1E9}" destId="{18CBD214-83CB-4F32-A097-052938B80ADD}" srcOrd="1" destOrd="0" presId="urn:microsoft.com/office/officeart/2005/8/layout/chevron2"/>
+    <dgm:cxn modelId="{446BF3AE-E439-41E4-A498-AD2B5EF7C089}" type="presParOf" srcId="{5EE6085E-A16A-4E86-9A55-24F435CCB7FD}" destId="{D4CD4396-F8F1-4985-A448-FA82F7B4C109}" srcOrd="1" destOrd="0" presId="urn:microsoft.com/office/officeart/2005/8/layout/chevron2"/>
+    <dgm:cxn modelId="{369AAEB0-2A18-4E35-8F5E-0400E7CF359F}" type="presParOf" srcId="{5EE6085E-A16A-4E86-9A55-24F435CCB7FD}" destId="{43D07C9C-0B62-4B63-AE6C-0DDC72E95053}" srcOrd="2" destOrd="0" presId="urn:microsoft.com/office/officeart/2005/8/layout/chevron2"/>
+    <dgm:cxn modelId="{6C5B0213-1BE3-4173-87E2-D7FB6F99F362}" type="presParOf" srcId="{43D07C9C-0B62-4B63-AE6C-0DDC72E95053}" destId="{C048B855-E79B-4CA5-BD91-D367696D93A3}" srcOrd="0" destOrd="0" presId="urn:microsoft.com/office/officeart/2005/8/layout/chevron2"/>
+    <dgm:cxn modelId="{80153157-E86C-4B55-A514-289CA6866661}" type="presParOf" srcId="{43D07C9C-0B62-4B63-AE6C-0DDC72E95053}" destId="{F9B07533-D0CC-437D-A991-88CA84DBA6EC}" srcOrd="1" destOrd="0" presId="urn:microsoft.com/office/officeart/2005/8/layout/chevron2"/>
+    <dgm:cxn modelId="{5BC81562-AE03-4C1B-BE92-1C7575876D6B}" type="presParOf" srcId="{5EE6085E-A16A-4E86-9A55-24F435CCB7FD}" destId="{626089AB-2AEA-4380-A395-624CD2475072}" srcOrd="3" destOrd="0" presId="urn:microsoft.com/office/officeart/2005/8/layout/chevron2"/>
+    <dgm:cxn modelId="{8C3CFD28-E37D-4549-A74D-AA7DA057087D}" type="presParOf" srcId="{5EE6085E-A16A-4E86-9A55-24F435CCB7FD}" destId="{B9D5259B-ADB5-4791-B2FC-2C893177C011}" srcOrd="4" destOrd="0" presId="urn:microsoft.com/office/officeart/2005/8/layout/chevron2"/>
+    <dgm:cxn modelId="{4E46DA56-2BAC-4B0A-925C-1F4F00087A8F}" type="presParOf" srcId="{B9D5259B-ADB5-4791-B2FC-2C893177C011}" destId="{0F5F1EA3-A467-41FE-9EA8-F84943D3CC61}" srcOrd="0" destOrd="0" presId="urn:microsoft.com/office/officeart/2005/8/layout/chevron2"/>
+    <dgm:cxn modelId="{517A19BC-F8DF-4499-B62A-4A1C4E0226D0}" type="presParOf" srcId="{B9D5259B-ADB5-4791-B2FC-2C893177C011}" destId="{21E06A02-D81D-4E5C-B5A1-6AEDC0FC238E}" srcOrd="1" destOrd="0" presId="urn:microsoft.com/office/officeart/2005/8/layout/chevron2"/>
+  </dgm:cxnLst>
+  <dgm:bg/>
+  <dgm:whole/>
+  <dgm:extLst>
+    <a:ext uri="http://schemas.microsoft.com/office/drawing/2008/diagram">
+      <dsp:dataModelExt xmlns:dsp="http://schemas.microsoft.com/office/drawing/2008/diagram" relId="rId6" minVer="http://schemas.openxmlformats.org/drawingml/2006/diagram"/>
+    </a:ext>
+  </dgm:extLst>
+</dgm:dataModel>
+</file>
+
+<file path=ppt/diagrams/drawing1.xml><?xml version="1.0" encoding="utf-8"?>
+<dsp:drawing xmlns:dgm="http://schemas.openxmlformats.org/drawingml/2006/diagram" xmlns:dsp="http://schemas.microsoft.com/office/drawing/2008/diagram" xmlns:a="http://schemas.openxmlformats.org/drawingml/2006/main">
+  <dsp:spTree>
+    <dsp:nvGrpSpPr>
+      <dsp:cNvPr id="0" name=""/>
+      <dsp:cNvGrpSpPr/>
+    </dsp:nvGrpSpPr>
+    <dsp:grpSpPr/>
+    <dsp:sp modelId="{75D778B2-2691-4103-86DE-B9B9565F8E17}">
+      <dsp:nvSpPr>
+        <dsp:cNvPr id="0" name=""/>
+        <dsp:cNvSpPr/>
+      </dsp:nvSpPr>
+      <dsp:spPr>
+        <a:xfrm rot="5400000">
+          <a:off x="-286177" y="288160"/>
+          <a:ext cx="1907850" cy="1335495"/>
+        </a:xfrm>
+        <a:prstGeom prst="chevron">
+          <a:avLst/>
+        </a:prstGeom>
+        <a:solidFill>
+          <a:schemeClr val="accent1">
+            <a:hueOff val="0"/>
+            <a:satOff val="0"/>
+            <a:lumOff val="0"/>
+            <a:alphaOff val="0"/>
+          </a:schemeClr>
+        </a:solidFill>
+        <a:ln w="25400" cap="flat" cmpd="sng" algn="ctr">
+          <a:solidFill>
+            <a:schemeClr val="accent1">
+              <a:hueOff val="0"/>
+              <a:satOff val="0"/>
+              <a:lumOff val="0"/>
+              <a:alphaOff val="0"/>
+            </a:schemeClr>
+          </a:solidFill>
+          <a:prstDash val="solid"/>
+        </a:ln>
+        <a:effectLst/>
+      </dsp:spPr>
+      <dsp:style>
+        <a:lnRef idx="2">
+          <a:scrgbClr r="0" g="0" b="0"/>
+        </a:lnRef>
+        <a:fillRef idx="1">
+          <a:scrgbClr r="0" g="0" b="0"/>
+        </a:fillRef>
+        <a:effectRef idx="0">
+          <a:scrgbClr r="0" g="0" b="0"/>
+        </a:effectRef>
+        <a:fontRef idx="minor">
+          <a:schemeClr val="lt1"/>
+        </a:fontRef>
+      </dsp:style>
+      <dsp:txBody>
+        <a:bodyPr spcFirstLastPara="0" vert="horz" wrap="square" lIns="20955" tIns="20955" rIns="20955" bIns="20955" numCol="1" spcCol="1270" anchor="ctr" anchorCtr="0">
+          <a:noAutofit/>
+        </a:bodyPr>
+        <a:lstStyle/>
+        <a:p>
+          <a:pPr marL="0" lvl="0" indent="0" algn="ctr" defTabSz="1466850">
+            <a:lnSpc>
+              <a:spcPct val="90000"/>
+            </a:lnSpc>
+            <a:spcBef>
+              <a:spcPct val="0"/>
+            </a:spcBef>
+            <a:spcAft>
+              <a:spcPct val="35000"/>
+            </a:spcAft>
+            <a:buNone/>
+          </a:pPr>
+          <a:r>
+            <a:rPr lang="en-US" sz="3300" kern="1200" dirty="0"/>
+            <a:t>Collect</a:t>
+          </a:r>
+        </a:p>
+      </dsp:txBody>
+      <dsp:txXfrm rot="-5400000">
+        <a:off x="1" y="669731"/>
+        <a:ext cx="1335495" cy="572355"/>
+      </dsp:txXfrm>
+    </dsp:sp>
+    <dsp:sp modelId="{18CBD214-83CB-4F32-A097-052938B80ADD}">
+      <dsp:nvSpPr>
+        <dsp:cNvPr id="0" name=""/>
+        <dsp:cNvSpPr/>
+      </dsp:nvSpPr>
+      <dsp:spPr>
+        <a:xfrm rot="5400000">
+          <a:off x="4394044" y="-3056566"/>
+          <a:ext cx="1240102" cy="7357200"/>
+        </a:xfrm>
+        <a:prstGeom prst="round2SameRect">
+          <a:avLst/>
+        </a:prstGeom>
+        <a:solidFill>
+          <a:schemeClr val="lt1">
+            <a:alpha val="90000"/>
+            <a:hueOff val="0"/>
+            <a:satOff val="0"/>
+            <a:lumOff val="0"/>
+            <a:alphaOff val="0"/>
+          </a:schemeClr>
+        </a:solidFill>
+        <a:ln w="25400" cap="flat" cmpd="sng" algn="ctr">
+          <a:solidFill>
+            <a:schemeClr val="accent1">
+              <a:hueOff val="0"/>
+              <a:satOff val="0"/>
+              <a:lumOff val="0"/>
+              <a:alphaOff val="0"/>
+            </a:schemeClr>
+          </a:solidFill>
+          <a:prstDash val="solid"/>
+        </a:ln>
+        <a:effectLst/>
+      </dsp:spPr>
+      <dsp:style>
+        <a:lnRef idx="2">
+          <a:scrgbClr r="0" g="0" b="0"/>
+        </a:lnRef>
+        <a:fillRef idx="1">
+          <a:scrgbClr r="0" g="0" b="0"/>
+        </a:fillRef>
+        <a:effectRef idx="0">
+          <a:scrgbClr r="0" g="0" b="0"/>
+        </a:effectRef>
+        <a:fontRef idx="minor"/>
+      </dsp:style>
+      <dsp:txBody>
+        <a:bodyPr spcFirstLastPara="0" vert="horz" wrap="square" lIns="170688" tIns="15240" rIns="15240" bIns="15240" numCol="1" spcCol="1270" anchor="ctr" anchorCtr="0">
+          <a:noAutofit/>
+        </a:bodyPr>
+        <a:lstStyle/>
+        <a:p>
+          <a:pPr marL="228600" lvl="1" indent="-228600" algn="l" defTabSz="1066800">
+            <a:lnSpc>
+              <a:spcPct val="90000"/>
+            </a:lnSpc>
+            <a:spcBef>
+              <a:spcPct val="0"/>
+            </a:spcBef>
+            <a:spcAft>
+              <a:spcPct val="15000"/>
+            </a:spcAft>
+            <a:buChar char="•"/>
+          </a:pPr>
+          <a:r>
+            <a:rPr lang="en-US" sz="2400" kern="1200" dirty="0"/>
+            <a:t>Zillow Housing Data</a:t>
+          </a:r>
+        </a:p>
+        <a:p>
+          <a:pPr marL="228600" lvl="1" indent="-228600" algn="l" defTabSz="1066800">
+            <a:lnSpc>
+              <a:spcPct val="90000"/>
+            </a:lnSpc>
+            <a:spcBef>
+              <a:spcPct val="0"/>
+            </a:spcBef>
+            <a:spcAft>
+              <a:spcPct val="15000"/>
+            </a:spcAft>
+            <a:buChar char="•"/>
+          </a:pPr>
+          <a:r>
+            <a:rPr lang="en-US" sz="2400" kern="1200" dirty="0"/>
+            <a:t>BLS Employment Data</a:t>
+          </a:r>
+        </a:p>
+        <a:p>
+          <a:pPr marL="228600" lvl="1" indent="-228600" algn="l" defTabSz="1066800">
+            <a:lnSpc>
+              <a:spcPct val="90000"/>
+            </a:lnSpc>
+            <a:spcBef>
+              <a:spcPct val="0"/>
+            </a:spcBef>
+            <a:spcAft>
+              <a:spcPct val="15000"/>
+            </a:spcAft>
+            <a:buChar char="•"/>
+          </a:pPr>
+          <a:r>
+            <a:rPr lang="en-US" sz="2400" kern="1200" dirty="0"/>
+            <a:t>IRS Income Data</a:t>
+          </a:r>
+        </a:p>
+      </dsp:txBody>
+      <dsp:txXfrm rot="-5400000">
+        <a:off x="1335496" y="62519"/>
+        <a:ext cx="7296663" cy="1119028"/>
+      </dsp:txXfrm>
+    </dsp:sp>
+    <dsp:sp modelId="{C048B855-E79B-4CA5-BD91-D367696D93A3}">
+      <dsp:nvSpPr>
+        <dsp:cNvPr id="0" name=""/>
+        <dsp:cNvSpPr/>
+      </dsp:nvSpPr>
+      <dsp:spPr>
+        <a:xfrm rot="5400000">
+          <a:off x="-286177" y="2004808"/>
+          <a:ext cx="1907850" cy="1335495"/>
+        </a:xfrm>
+        <a:prstGeom prst="chevron">
+          <a:avLst/>
+        </a:prstGeom>
+        <a:solidFill>
+          <a:schemeClr val="accent1">
+            <a:hueOff val="0"/>
+            <a:satOff val="0"/>
+            <a:lumOff val="0"/>
+            <a:alphaOff val="0"/>
+          </a:schemeClr>
+        </a:solidFill>
+        <a:ln w="25400" cap="flat" cmpd="sng" algn="ctr">
+          <a:solidFill>
+            <a:schemeClr val="accent1">
+              <a:hueOff val="0"/>
+              <a:satOff val="0"/>
+              <a:lumOff val="0"/>
+              <a:alphaOff val="0"/>
+            </a:schemeClr>
+          </a:solidFill>
+          <a:prstDash val="solid"/>
+        </a:ln>
+        <a:effectLst/>
+      </dsp:spPr>
+      <dsp:style>
+        <a:lnRef idx="2">
+          <a:scrgbClr r="0" g="0" b="0"/>
+        </a:lnRef>
+        <a:fillRef idx="1">
+          <a:scrgbClr r="0" g="0" b="0"/>
+        </a:fillRef>
+        <a:effectRef idx="0">
+          <a:scrgbClr r="0" g="0" b="0"/>
+        </a:effectRef>
+        <a:fontRef idx="minor">
+          <a:schemeClr val="lt1"/>
+        </a:fontRef>
+      </dsp:style>
+      <dsp:txBody>
+        <a:bodyPr spcFirstLastPara="0" vert="horz" wrap="square" lIns="20955" tIns="20955" rIns="20955" bIns="20955" numCol="1" spcCol="1270" anchor="ctr" anchorCtr="0">
+          <a:noAutofit/>
+        </a:bodyPr>
+        <a:lstStyle/>
+        <a:p>
+          <a:pPr marL="0" lvl="0" indent="0" algn="ctr" defTabSz="1466850">
+            <a:lnSpc>
+              <a:spcPct val="90000"/>
+            </a:lnSpc>
+            <a:spcBef>
+              <a:spcPct val="0"/>
+            </a:spcBef>
+            <a:spcAft>
+              <a:spcPct val="35000"/>
+            </a:spcAft>
+            <a:buNone/>
+          </a:pPr>
+          <a:r>
+            <a:rPr lang="en-US" sz="3300" kern="1200" dirty="0"/>
+            <a:t>Merge</a:t>
+          </a:r>
+        </a:p>
+      </dsp:txBody>
+      <dsp:txXfrm rot="-5400000">
+        <a:off x="1" y="2386379"/>
+        <a:ext cx="1335495" cy="572355"/>
+      </dsp:txXfrm>
+    </dsp:sp>
+    <dsp:sp modelId="{F9B07533-D0CC-437D-A991-88CA84DBA6EC}">
+      <dsp:nvSpPr>
+        <dsp:cNvPr id="0" name=""/>
+        <dsp:cNvSpPr/>
+      </dsp:nvSpPr>
+      <dsp:spPr>
+        <a:xfrm rot="5400000">
+          <a:off x="4394044" y="-1339918"/>
+          <a:ext cx="1240102" cy="7357200"/>
+        </a:xfrm>
+        <a:prstGeom prst="round2SameRect">
+          <a:avLst/>
+        </a:prstGeom>
+        <a:solidFill>
+          <a:schemeClr val="lt1">
+            <a:alpha val="90000"/>
+            <a:hueOff val="0"/>
+            <a:satOff val="0"/>
+            <a:lumOff val="0"/>
+            <a:alphaOff val="0"/>
+          </a:schemeClr>
+        </a:solidFill>
+        <a:ln w="25400" cap="flat" cmpd="sng" algn="ctr">
+          <a:solidFill>
+            <a:schemeClr val="accent1">
+              <a:hueOff val="0"/>
+              <a:satOff val="0"/>
+              <a:lumOff val="0"/>
+              <a:alphaOff val="0"/>
+            </a:schemeClr>
+          </a:solidFill>
+          <a:prstDash val="solid"/>
+        </a:ln>
+        <a:effectLst/>
+      </dsp:spPr>
+      <dsp:style>
+        <a:lnRef idx="2">
+          <a:scrgbClr r="0" g="0" b="0"/>
+        </a:lnRef>
+        <a:fillRef idx="1">
+          <a:scrgbClr r="0" g="0" b="0"/>
+        </a:fillRef>
+        <a:effectRef idx="0">
+          <a:scrgbClr r="0" g="0" b="0"/>
+        </a:effectRef>
+        <a:fontRef idx="minor"/>
+      </dsp:style>
+      <dsp:txBody>
+        <a:bodyPr spcFirstLastPara="0" vert="horz" wrap="square" lIns="170688" tIns="15240" rIns="15240" bIns="15240" numCol="1" spcCol="1270" anchor="ctr" anchorCtr="0">
+          <a:noAutofit/>
+        </a:bodyPr>
+        <a:lstStyle/>
+        <a:p>
+          <a:pPr marL="228600" lvl="1" indent="-228600" algn="l" defTabSz="1066800">
+            <a:lnSpc>
+              <a:spcPct val="90000"/>
+            </a:lnSpc>
+            <a:spcBef>
+              <a:spcPct val="0"/>
+            </a:spcBef>
+            <a:spcAft>
+              <a:spcPct val="15000"/>
+            </a:spcAft>
+            <a:buChar char="•"/>
+          </a:pPr>
+          <a:r>
+            <a:rPr lang="en-US" sz="2400" kern="1200" dirty="0"/>
+            <a:t>Converted data to annual data </a:t>
+          </a:r>
+        </a:p>
+        <a:p>
+          <a:pPr marL="228600" lvl="1" indent="-228600" algn="l" defTabSz="1066800">
+            <a:lnSpc>
+              <a:spcPct val="90000"/>
+            </a:lnSpc>
+            <a:spcBef>
+              <a:spcPct val="0"/>
+            </a:spcBef>
+            <a:spcAft>
+              <a:spcPct val="15000"/>
+            </a:spcAft>
+            <a:buChar char="•"/>
+          </a:pPr>
+          <a:r>
+            <a:rPr lang="en-US" sz="2400" kern="1200" dirty="0"/>
+            <a:t>Merge all data sets into a Master Data Frame</a:t>
+          </a:r>
+        </a:p>
+        <a:p>
+          <a:pPr marL="228600" lvl="1" indent="-228600" algn="l" defTabSz="1066800">
+            <a:lnSpc>
+              <a:spcPct val="90000"/>
+            </a:lnSpc>
+            <a:spcBef>
+              <a:spcPct val="0"/>
+            </a:spcBef>
+            <a:spcAft>
+              <a:spcPct val="15000"/>
+            </a:spcAft>
+            <a:buChar char="•"/>
+          </a:pPr>
+          <a:r>
+            <a:rPr lang="en-US" sz="2400" kern="1200" dirty="0"/>
+            <a:t>We then merged on year and zip code</a:t>
+          </a:r>
+        </a:p>
+      </dsp:txBody>
+      <dsp:txXfrm rot="-5400000">
+        <a:off x="1335496" y="1779167"/>
+        <a:ext cx="7296663" cy="1119028"/>
+      </dsp:txXfrm>
+    </dsp:sp>
+    <dsp:sp modelId="{0F5F1EA3-A467-41FE-9EA8-F84943D3CC61}">
+      <dsp:nvSpPr>
+        <dsp:cNvPr id="0" name=""/>
+        <dsp:cNvSpPr/>
+      </dsp:nvSpPr>
+      <dsp:spPr>
+        <a:xfrm rot="5400000">
+          <a:off x="-286177" y="3721456"/>
+          <a:ext cx="1907850" cy="1335495"/>
+        </a:xfrm>
+        <a:prstGeom prst="chevron">
+          <a:avLst/>
+        </a:prstGeom>
+        <a:solidFill>
+          <a:schemeClr val="accent1">
+            <a:hueOff val="0"/>
+            <a:satOff val="0"/>
+            <a:lumOff val="0"/>
+            <a:alphaOff val="0"/>
+          </a:schemeClr>
+        </a:solidFill>
+        <a:ln w="25400" cap="flat" cmpd="sng" algn="ctr">
+          <a:solidFill>
+            <a:schemeClr val="accent1">
+              <a:hueOff val="0"/>
+              <a:satOff val="0"/>
+              <a:lumOff val="0"/>
+              <a:alphaOff val="0"/>
+            </a:schemeClr>
+          </a:solidFill>
+          <a:prstDash val="solid"/>
+        </a:ln>
+        <a:effectLst/>
+      </dsp:spPr>
+      <dsp:style>
+        <a:lnRef idx="2">
+          <a:scrgbClr r="0" g="0" b="0"/>
+        </a:lnRef>
+        <a:fillRef idx="1">
+          <a:scrgbClr r="0" g="0" b="0"/>
+        </a:fillRef>
+        <a:effectRef idx="0">
+          <a:scrgbClr r="0" g="0" b="0"/>
+        </a:effectRef>
+        <a:fontRef idx="minor">
+          <a:schemeClr val="lt1"/>
+        </a:fontRef>
+      </dsp:style>
+      <dsp:txBody>
+        <a:bodyPr spcFirstLastPara="0" vert="horz" wrap="square" lIns="20955" tIns="20955" rIns="20955" bIns="20955" numCol="1" spcCol="1270" anchor="ctr" anchorCtr="0">
+          <a:noAutofit/>
+        </a:bodyPr>
+        <a:lstStyle/>
+        <a:p>
+          <a:pPr marL="0" lvl="0" indent="0" algn="ctr" defTabSz="1466850">
+            <a:lnSpc>
+              <a:spcPct val="90000"/>
+            </a:lnSpc>
+            <a:spcBef>
+              <a:spcPct val="0"/>
+            </a:spcBef>
+            <a:spcAft>
+              <a:spcPct val="35000"/>
+            </a:spcAft>
+            <a:buNone/>
+          </a:pPr>
+          <a:r>
+            <a:rPr lang="en-US" sz="3300" kern="1200" dirty="0"/>
+            <a:t>Clean</a:t>
+          </a:r>
+        </a:p>
+      </dsp:txBody>
+      <dsp:txXfrm rot="-5400000">
+        <a:off x="1" y="4103027"/>
+        <a:ext cx="1335495" cy="572355"/>
+      </dsp:txXfrm>
+    </dsp:sp>
+    <dsp:sp modelId="{21E06A02-D81D-4E5C-B5A1-6AEDC0FC238E}">
+      <dsp:nvSpPr>
+        <dsp:cNvPr id="0" name=""/>
+        <dsp:cNvSpPr/>
+      </dsp:nvSpPr>
+      <dsp:spPr>
+        <a:xfrm rot="5400000">
+          <a:off x="4394044" y="376729"/>
+          <a:ext cx="1240102" cy="7357200"/>
+        </a:xfrm>
+        <a:prstGeom prst="round2SameRect">
+          <a:avLst/>
+        </a:prstGeom>
+        <a:solidFill>
+          <a:schemeClr val="lt1">
+            <a:alpha val="90000"/>
+            <a:hueOff val="0"/>
+            <a:satOff val="0"/>
+            <a:lumOff val="0"/>
+            <a:alphaOff val="0"/>
+          </a:schemeClr>
+        </a:solidFill>
+        <a:ln w="25400" cap="flat" cmpd="sng" algn="ctr">
+          <a:solidFill>
+            <a:schemeClr val="accent1">
+              <a:hueOff val="0"/>
+              <a:satOff val="0"/>
+              <a:lumOff val="0"/>
+              <a:alphaOff val="0"/>
+            </a:schemeClr>
+          </a:solidFill>
+          <a:prstDash val="solid"/>
+        </a:ln>
+        <a:effectLst/>
+      </dsp:spPr>
+      <dsp:style>
+        <a:lnRef idx="2">
+          <a:scrgbClr r="0" g="0" b="0"/>
+        </a:lnRef>
+        <a:fillRef idx="1">
+          <a:scrgbClr r="0" g="0" b="0"/>
+        </a:fillRef>
+        <a:effectRef idx="0">
+          <a:scrgbClr r="0" g="0" b="0"/>
+        </a:effectRef>
+        <a:fontRef idx="minor"/>
+      </dsp:style>
+      <dsp:txBody>
+        <a:bodyPr spcFirstLastPara="0" vert="horz" wrap="square" lIns="170688" tIns="15240" rIns="15240" bIns="15240" numCol="1" spcCol="1270" anchor="ctr" anchorCtr="0">
+          <a:noAutofit/>
+        </a:bodyPr>
+        <a:lstStyle/>
+        <a:p>
+          <a:pPr marL="228600" lvl="1" indent="-228600" algn="l" defTabSz="1066800">
+            <a:lnSpc>
+              <a:spcPct val="90000"/>
+            </a:lnSpc>
+            <a:spcBef>
+              <a:spcPct val="0"/>
+            </a:spcBef>
+            <a:spcAft>
+              <a:spcPct val="15000"/>
+            </a:spcAft>
+            <a:buChar char="•"/>
+          </a:pPr>
+          <a:r>
+            <a:rPr lang="en-US" sz="2400" kern="1200" dirty="0"/>
+            <a:t>We removed all rows that had incomplete data for that year. </a:t>
+          </a:r>
+        </a:p>
+        <a:p>
+          <a:pPr marL="228600" lvl="1" indent="-228600" algn="l" defTabSz="1066800">
+            <a:lnSpc>
+              <a:spcPct val="90000"/>
+            </a:lnSpc>
+            <a:spcBef>
+              <a:spcPct val="0"/>
+            </a:spcBef>
+            <a:spcAft>
+              <a:spcPct val="15000"/>
+            </a:spcAft>
+            <a:buChar char="•"/>
+          </a:pPr>
+          <a:r>
+            <a:rPr lang="en-US" sz="2400" kern="1200" dirty="0"/>
+            <a:t>Output the data for analysis to CSVs.</a:t>
+          </a:r>
+        </a:p>
+      </dsp:txBody>
+      <dsp:txXfrm rot="-5400000">
+        <a:off x="1335496" y="3495815"/>
+        <a:ext cx="7296663" cy="1119028"/>
+      </dsp:txXfrm>
+    </dsp:sp>
+  </dsp:spTree>
+</dsp:drawing>
+</file>
+
+<file path=ppt/diagrams/layout1.xml><?xml version="1.0" encoding="utf-8"?>
+<dgm:layoutDef xmlns:dgm="http://schemas.openxmlformats.org/drawingml/2006/diagram" xmlns:a="http://schemas.openxmlformats.org/drawingml/2006/main" uniqueId="urn:microsoft.com/office/officeart/2005/8/layout/chevron2">
+  <dgm:title val=""/>
+  <dgm:desc val=""/>
+  <dgm:catLst>
+    <dgm:cat type="process" pri="12000"/>
+    <dgm:cat type="list" pri="16000"/>
+    <dgm:cat type="convert" pri="11000"/>
+  </dgm:catLst>
+  <dgm:sampData>
+    <dgm:dataModel>
+      <dgm:ptLst>
+        <dgm:pt modelId="0" type="doc"/>
+        <dgm:pt modelId="1">
+          <dgm:prSet phldr="1"/>
+        </dgm:pt>
+        <dgm:pt modelId="11">
+          <dgm:prSet phldr="1"/>
+        </dgm:pt>
+        <dgm:pt modelId="12">
+          <dgm:prSet phldr="1"/>
+        </dgm:pt>
+        <dgm:pt modelId="2">
+          <dgm:prSet phldr="1"/>
+        </dgm:pt>
+        <dgm:pt modelId="21">
+          <dgm:prSet phldr="1"/>
+        </dgm:pt>
+        <dgm:pt modelId="22">
+          <dgm:prSet phldr="1"/>
+        </dgm:pt>
+        <dgm:pt modelId="3">
+          <dgm:prSet phldr="1"/>
+        </dgm:pt>
+        <dgm:pt modelId="31">
+          <dgm:prSet phldr="1"/>
+        </dgm:pt>
+        <dgm:pt modelId="32">
+          <dgm:prSet phldr="1"/>
+        </dgm:pt>
+      </dgm:ptLst>
+      <dgm:cxnLst>
+        <dgm:cxn modelId="4" srcId="0" destId="1" srcOrd="0" destOrd="0"/>
+        <dgm:cxn modelId="5" srcId="0" destId="2" srcOrd="1" destOrd="0"/>
+        <dgm:cxn modelId="6" srcId="0" destId="3" srcOrd="2" destOrd="0"/>
+        <dgm:cxn modelId="13" srcId="1" destId="11" srcOrd="0" destOrd="0"/>
+        <dgm:cxn modelId="14" srcId="1" destId="12" srcOrd="1" destOrd="0"/>
+        <dgm:cxn modelId="23" srcId="2" destId="21" srcOrd="0" destOrd="0"/>
+        <dgm:cxn modelId="24" srcId="2" destId="22" srcOrd="1" destOrd="0"/>
+        <dgm:cxn modelId="33" srcId="3" destId="31" srcOrd="0" destOrd="0"/>
+        <dgm:cxn modelId="34" srcId="3" destId="32" srcOrd="1" destOrd="0"/>
+      </dgm:cxnLst>
+      <dgm:bg/>
+      <dgm:whole/>
+    </dgm:dataModel>
+  </dgm:sampData>
+  <dgm:styleData>
+    <dgm:dataModel>
+      <dgm:ptLst>
+        <dgm:pt modelId="0" type="doc"/>
+        <dgm:pt modelId="1"/>
+      </dgm:ptLst>
+      <dgm:cxnLst>
+        <dgm:cxn modelId="4" srcId="0" destId="1" srcOrd="0" destOrd="0"/>
+      </dgm:cxnLst>
+      <dgm:bg/>
+      <dgm:whole/>
+    </dgm:dataModel>
+  </dgm:styleData>
+  <dgm:clrData>
+    <dgm:dataModel>
+      <dgm:ptLst>
+        <dgm:pt modelId="0" type="doc"/>
+        <dgm:pt modelId="1"/>
+        <dgm:pt modelId="11"/>
+        <dgm:pt modelId="2"/>
+        <dgm:pt modelId="21"/>
+        <dgm:pt modelId="3"/>
+        <dgm:pt modelId="31"/>
+        <dgm:pt modelId="4"/>
+        <dgm:pt modelId="41"/>
+      </dgm:ptLst>
+      <dgm:cxnLst>
+        <dgm:cxn modelId="5" srcId="0" destId="1" srcOrd="0" destOrd="0"/>
+        <dgm:cxn modelId="6" srcId="0" destId="2" srcOrd="1" destOrd="0"/>
+        <dgm:cxn modelId="7" srcId="0" destId="3" srcOrd="2" destOrd="0"/>
+        <dgm:cxn modelId="8" srcId="0" destId="4" srcOrd="3" destOrd="0"/>
+        <dgm:cxn modelId="13" srcId="1" destId="11" srcOrd="0" destOrd="0"/>
+        <dgm:cxn modelId="23" srcId="2" destId="21" srcOrd="0" destOrd="0"/>
+        <dgm:cxn modelId="33" srcId="3" destId="31" srcOrd="0" destOrd="0"/>
+        <dgm:cxn modelId="43" srcId="4" destId="41" srcOrd="0" destOrd="0"/>
+      </dgm:cxnLst>
+      <dgm:bg/>
+      <dgm:whole/>
+    </dgm:dataModel>
+  </dgm:clrData>
+  <dgm:layoutNode name="linearFlow">
+    <dgm:varLst>
+      <dgm:dir/>
+      <dgm:animLvl val="lvl"/>
+      <dgm:resizeHandles val="exact"/>
+    </dgm:varLst>
+    <dgm:alg type="lin">
+      <dgm:param type="linDir" val="fromT"/>
+      <dgm:param type="nodeHorzAlign" val="l"/>
+    </dgm:alg>
+    <dgm:shape xmlns:r="http://schemas.openxmlformats.org/officeDocument/2006/relationships" r:blip="">
+      <dgm:adjLst/>
+    </dgm:shape>
+    <dgm:presOf/>
+    <dgm:constrLst>
+      <dgm:constr type="h" for="ch" forName="composite" refType="h"/>
+      <dgm:constr type="w" for="ch" forName="composite" refType="w"/>
+      <dgm:constr type="h" for="des" forName="parentText" op="equ"/>
+      <dgm:constr type="h" for="ch" forName="sp" val="-14.88"/>
+      <dgm:constr type="h" for="ch" forName="sp" refType="w" refFor="des" refForName="parentText" op="gte" fact="-0.3"/>
+      <dgm:constr type="primFontSz" for="des" forName="parentText" op="equ" val="65"/>
+      <dgm:constr type="primFontSz" for="des" forName="descendantText" op="equ" val="65"/>
+    </dgm:constrLst>
+    <dgm:ruleLst/>
+    <dgm:forEach name="Name0" axis="ch" ptType="node">
+      <dgm:layoutNode name="composite">
+        <dgm:alg type="composite"/>
+        <dgm:shape xmlns:r="http://schemas.openxmlformats.org/officeDocument/2006/relationships" r:blip="">
+          <dgm:adjLst/>
+        </dgm:shape>
+        <dgm:presOf/>
+        <dgm:choose name="Name1">
+          <dgm:if name="Name2" func="var" arg="dir" op="equ" val="norm">
+            <dgm:constrLst>
+              <dgm:constr type="t" for="ch" forName="parentText"/>
+              <dgm:constr type="l" for="ch" forName="parentText"/>
+              <dgm:constr type="w" for="ch" forName="parentText" refType="w" fact="0.4"/>
+              <dgm:constr type="h" for="ch" forName="parentText" refType="h"/>
+              <dgm:constr type="w" for="ch" forName="parentText" refType="w" op="lte" fact="0.5"/>
+              <dgm:constr type="w" for="ch" forName="parentText" refType="h" refFor="ch" refForName="parentText" op="lte" fact="0.7"/>
+              <dgm:constr type="h" for="ch" forName="parentText" refType="w" refFor="ch" refForName="parentText" op="lte" fact="3"/>
+              <dgm:constr type="l" for="ch" forName="descendantText" refType="w" refFor="ch" refForName="parentText"/>
+              <dgm:constr type="w" for="ch" forName="descendantText" refType="w"/>
+              <dgm:constr type="wOff" for="ch" forName="descendantText" refType="w" refFor="ch" refForName="parentText" fact="-1"/>
+              <dgm:constr type="t" for="ch" forName="descendantText"/>
+              <dgm:constr type="b" for="ch" forName="descendantText" refType="h" refFor="ch" refForName="parentText"/>
+              <dgm:constr type="bOff" for="ch" forName="descendantText" refType="w" refFor="ch" refForName="parentText" fact="-0.5"/>
+            </dgm:constrLst>
+          </dgm:if>
+          <dgm:else name="Name3">
+            <dgm:constrLst>
+              <dgm:constr type="t" for="ch" forName="parentText"/>
+              <dgm:constr type="r" for="ch" forName="parentText" refType="w"/>
+              <dgm:constr type="w" for="ch" forName="parentText" refType="w" fact="0.4"/>
+              <dgm:constr type="h" for="ch" forName="parentText" refType="h"/>
+              <dgm:constr type="w" for="ch" forName="parentText" refType="w" op="lte" fact="0.5"/>
+              <dgm:constr type="w" for="ch" forName="parentText" refType="h" refFor="ch" refForName="parentText" op="lte" fact="0.7"/>
+              <dgm:constr type="h" for="ch" forName="parentText" refType="w" refFor="ch" refForName="parentText" op="lte" fact="3"/>
+              <dgm:constr type="l" for="ch" forName="descendantText"/>
+              <dgm:constr type="w" for="ch" forName="descendantText" refType="w"/>
+              <dgm:constr type="wOff" for="ch" forName="descendantText" refType="w" refFor="ch" refForName="parentText" fact="-1"/>
+              <dgm:constr type="t" for="ch" forName="descendantText"/>
+              <dgm:constr type="b" for="ch" forName="descendantText" refType="h" refFor="ch" refForName="parentText"/>
+              <dgm:constr type="bOff" for="ch" forName="descendantText" refType="w" refFor="ch" refForName="parentText" fact="-0.5"/>
+            </dgm:constrLst>
+          </dgm:else>
+        </dgm:choose>
+        <dgm:ruleLst/>
+        <dgm:layoutNode name="parentText" styleLbl="alignNode1">
+          <dgm:varLst>
+            <dgm:chMax val="1"/>
+            <dgm:bulletEnabled val="1"/>
+          </dgm:varLst>
+          <dgm:alg type="tx"/>
+          <dgm:shape xmlns:r="http://schemas.openxmlformats.org/officeDocument/2006/relationships" rot="90" type="chevron" r:blip="">
+            <dgm:adjLst/>
+          </dgm:shape>
+          <dgm:presOf axis="self" ptType="node"/>
+          <dgm:constrLst>
+            <dgm:constr type="lMarg" refType="primFontSz" fact="0.05"/>
+            <dgm:constr type="rMarg" refType="primFontSz" fact="0.05"/>
+            <dgm:constr type="tMarg" refType="primFontSz" fact="0.05"/>
+            <dgm:constr type="bMarg" refType="primFontSz" fact="0.05"/>
+          </dgm:constrLst>
+          <dgm:ruleLst>
+            <dgm:rule type="h" val="100" fact="NaN" max="NaN"/>
+            <dgm:rule type="primFontSz" val="24" fact="NaN" max="NaN"/>
+            <dgm:rule type="h" val="110" fact="NaN" max="NaN"/>
+            <dgm:rule type="primFontSz" val="18" fact="NaN" max="NaN"/>
+            <dgm:rule type="h" val="INF" fact="NaN" max="NaN"/>
+            <dgm:rule type="primFontSz" val="5" fact="NaN" max="NaN"/>
+          </dgm:ruleLst>
+        </dgm:layoutNode>
+        <dgm:layoutNode name="descendantText" styleLbl="alignAcc1">
+          <dgm:varLst>
+            <dgm:bulletEnabled val="1"/>
+          </dgm:varLst>
+          <dgm:choose name="Name4">
+            <dgm:if name="Name5" func="var" arg="dir" op="equ" val="norm">
+              <dgm:alg type="tx">
+                <dgm:param type="stBulletLvl" val="1"/>
+                <dgm:param type="txAnchorVertCh" val="mid"/>
+              </dgm:alg>
+              <dgm:shape xmlns:r="http://schemas.openxmlformats.org/officeDocument/2006/relationships" rot="90" type="round2SameRect" r:blip="">
+                <dgm:adjLst/>
+              </dgm:shape>
+            </dgm:if>
+            <dgm:else name="Name6">
+              <dgm:alg type="tx">
+                <dgm:param type="stBulletLvl" val="1"/>
+                <dgm:param type="txAnchorVertCh" val="mid"/>
+              </dgm:alg>
+              <dgm:shape xmlns:r="http://schemas.openxmlformats.org/officeDocument/2006/relationships" rot="-90" type="round2SameRect" r:blip="">
+                <dgm:adjLst/>
+              </dgm:shape>
+            </dgm:else>
+          </dgm:choose>
+          <dgm:presOf axis="des" ptType="node"/>
+          <dgm:choose name="Name7">
+            <dgm:if name="Name8" func="var" arg="dir" op="equ" val="norm">
+              <dgm:constrLst>
+                <dgm:constr type="secFontSz" refType="primFontSz"/>
+                <dgm:constr type="tMarg" refType="primFontSz" fact="0.05"/>
+                <dgm:constr type="bMarg" refType="primFontSz" fact="0.05"/>
+                <dgm:constr type="rMarg" refType="primFontSz" fact="0.05"/>
+              </dgm:constrLst>
+            </dgm:if>
+            <dgm:else name="Name9">
+              <dgm:constrLst>
+                <dgm:constr type="secFontSz" refType="primFontSz"/>
+                <dgm:constr type="tMarg" refType="primFontSz" fact="0.05"/>
+                <dgm:constr type="bMarg" refType="primFontSz" fact="0.05"/>
+                <dgm:constr type="lMarg" refType="primFontSz" fact="0.05"/>
+              </dgm:constrLst>
+            </dgm:else>
+          </dgm:choose>
+          <dgm:ruleLst>
+            <dgm:rule type="primFontSz" val="5" fact="NaN" max="NaN"/>
+          </dgm:ruleLst>
+        </dgm:layoutNode>
+      </dgm:layoutNode>
+      <dgm:forEach name="Name10" axis="followSib" ptType="sibTrans" cnt="1">
+        <dgm:layoutNode name="sp">
+          <dgm:alg type="sp"/>
+          <dgm:shape xmlns:r="http://schemas.openxmlformats.org/officeDocument/2006/relationships" r:blip="">
+            <dgm:adjLst/>
+          </dgm:shape>
+          <dgm:presOf axis="self"/>
+          <dgm:constrLst>
+            <dgm:constr type="w" val="1"/>
+            <dgm:constr type="h" val="37.5"/>
+          </dgm:constrLst>
+          <dgm:ruleLst/>
+        </dgm:layoutNode>
+      </dgm:forEach>
+    </dgm:forEach>
+  </dgm:layoutNode>
+</dgm:layoutDef>
+</file>
+
+<file path=ppt/diagrams/quickStyle1.xml><?xml version="1.0" encoding="utf-8"?>
+<dgm:styleDef xmlns:dgm="http://schemas.openxmlformats.org/drawingml/2006/diagram" xmlns:a="http://schemas.openxmlformats.org/drawingml/2006/main" uniqueId="urn:microsoft.com/office/officeart/2005/8/quickstyle/simple1">
+  <dgm:title val=""/>
+  <dgm:desc val=""/>
+  <dgm:catLst>
+    <dgm:cat type="simple" pri="10100"/>
+  </dgm:catLst>
+  <dgm:scene3d>
+    <a:camera prst="orthographicFront"/>
+    <a:lightRig rig="threePt" dir="t"/>
+  </dgm:scene3d>
+  <dgm:styleLbl name="node0">
+    <dgm:scene3d>
+      <a:camera prst="orthographicFront"/>
+      <a:lightRig rig="threePt" dir="t"/>
+    </dgm:scene3d>
+    <dgm:sp3d/>
+    <dgm:txPr/>
+    <dgm:style>
+      <a:lnRef idx="2">
+        <a:scrgbClr r="0" g="0" b="0"/>
+      </a:lnRef>
+      <a:fillRef idx="1">
+        <a:scrgbClr r="0" g="0" b="0"/>
+      </a:fillRef>
+      <a:effectRef idx="0">
+        <a:scrgbClr r="0" g="0" b="0"/>
+      </a:effectRef>
+      <a:fontRef idx="minor">
+        <a:schemeClr val="lt1"/>
+      </a:fontRef>
+    </dgm:style>
+  </dgm:styleLbl>
+  <dgm:styleLbl name="lnNode1">
+    <dgm:scene3d>
+      <a:camera prst="orthographicFront"/>
+      <a:lightRig rig="threePt" dir="t"/>
+    </dgm:scene3d>
+    <dgm:sp3d/>
+    <dgm:txPr/>
+    <dgm:style>
+      <a:lnRef idx="2">
+        <a:scrgbClr r="0" g="0" b="0"/>
+      </a:lnRef>
+      <a:fillRef idx="1">
+        <a:scrgbClr r="0" g="0" b="0"/>
+      </a:fillRef>
+      <a:effectRef idx="0">
+        <a:scrgbClr r="0" g="0" b="0"/>
+      </a:effectRef>
+      <a:fontRef idx="minor">
+        <a:schemeClr val="lt1"/>
+      </a:fontRef>
+    </dgm:style>
+  </dgm:styleLbl>
+  <dgm:styleLbl name="vennNode1">
+    <dgm:scene3d>
+      <a:camera prst="orthographicFront"/>
+      <a:lightRig rig="threePt" dir="t"/>
+    </dgm:scene3d>
+    <dgm:sp3d/>
+    <dgm:txPr/>
+    <dgm:style>
+      <a:lnRef idx="2">
+        <a:scrgbClr r="0" g="0" b="0"/>
+      </a:lnRef>
+      <a:fillRef idx="1">
+        <a:scrgbClr r="0" g="0" b="0"/>
+      </a:fillRef>
+      <a:effectRef idx="0">
+        <a:scrgbClr r="0" g="0" b="0"/>
+      </a:effectRef>
+      <a:fontRef idx="minor">
+        <a:schemeClr val="tx1"/>
+      </a:fontRef>
+    </dgm:style>
+  </dgm:styleLbl>
+  <dgm:styleLbl name="alignNode1">
+    <dgm:scene3d>
+      <a:camera prst="orthographicFront"/>
+      <a:lightRig rig="threePt" dir="t"/>
+    </dgm:scene3d>
+    <dgm:sp3d/>
+    <dgm:txPr/>
+    <dgm:style>
+      <a:lnRef idx="2">
+        <a:scrgbClr r="0" g="0" b="0"/>
+      </a:lnRef>
+      <a:fillRef idx="1">
+        <a:scrgbClr r="0" g="0" b="0"/>
+      </a:fillRef>
+      <a:effectRef idx="0">
+        <a:scrgbClr r="0" g="0" b="0"/>
+      </a:effectRef>
+      <a:fontRef idx="minor">
+        <a:schemeClr val="lt1"/>
+      </a:fontRef>
+    </dgm:style>
+  </dgm:styleLbl>
+  <dgm:styleLbl name="node1">
+    <dgm:scene3d>
+      <a:camera prst="orthographicFront"/>
+      <a:lightRig rig="threePt" dir="t"/>
+    </dgm:scene3d>
+    <dgm:sp3d/>
+    <dgm:txPr/>
+    <dgm:style>
+      <a:lnRef idx="2">
+        <a:scrgbClr r="0" g="0" b="0"/>
+      </a:lnRef>
+      <a:fillRef idx="1">
+        <a:scrgbClr r="0" g="0" b="0"/>
+      </a:fillRef>
+      <a:effectRef idx="0">
+        <a:scrgbClr r="0" g="0" b="0"/>
+      </a:effectRef>
+      <a:fontRef idx="minor">
+        <a:schemeClr val="lt1"/>
+      </a:fontRef>
+    </dgm:style>
+  </dgm:styleLbl>
+  <dgm:styleLbl name="node2">
+    <dgm:scene3d>
+      <a:camera prst="orthographicFront"/>
+      <a:lightRig rig="threePt" dir="t"/>
+    </dgm:scene3d>
+    <dgm:sp3d/>
+    <dgm:txPr/>
+    <dgm:style>
+      <a:lnRef idx="2">
+        <a:scrgbClr r="0" g="0" b="0"/>
+      </a:lnRef>
+      <a:fillRef idx="1">
+        <a:scrgbClr r="0" g="0" b="0"/>
+      </a:fillRef>
+      <a:effectRef idx="0">
+        <a:scrgbClr r="0" g="0" b="0"/>
+      </a:effectRef>
+      <a:fontRef idx="minor">
+        <a:schemeClr val="lt1"/>
+      </a:fontRef>
+    </dgm:style>
+  </dgm:styleLbl>
+  <dgm:styleLbl name="node3">
+    <dgm:scene3d>
+      <a:camera prst="orthographicFront"/>
+      <a:lightRig rig="threePt" dir="t"/>
+    </dgm:scene3d>
+    <dgm:sp3d/>
+    <dgm:txPr/>
+    <dgm:style>
+      <a:lnRef idx="2">
+        <a:scrgbClr r="0" g="0" b="0"/>
+      </a:lnRef>
+      <a:fillRef idx="1">
+        <a:scrgbClr r="0" g="0" b="0"/>
+      </a:fillRef>
+      <a:effectRef idx="0">
+        <a:scrgbClr r="0" g="0" b="0"/>
+      </a:effectRef>
+      <a:fontRef idx="minor">
+        <a:schemeClr val="lt1"/>
+      </a:fontRef>
+    </dgm:style>
+  </dgm:styleLbl>
+  <dgm:styleLbl name="node4">
+    <dgm:scene3d>
+      <a:camera prst="orthographicFront"/>
+      <a:lightRig rig="threePt" dir="t"/>
+    </dgm:scene3d>
+    <dgm:sp3d/>
+    <dgm:txPr/>
+    <dgm:style>
+      <a:lnRef idx="2">
+        <a:scrgbClr r="0" g="0" b="0"/>
+      </a:lnRef>
+      <a:fillRef idx="1">
+        <a:scrgbClr r="0" g="0" b="0"/>
+      </a:fillRef>
+      <a:effectRef idx="0">
+        <a:scrgbClr r="0" g="0" b="0"/>
+      </a:effectRef>
+      <a:fontRef idx="minor">
+        <a:schemeClr val="lt1"/>
+      </a:fontRef>
+    </dgm:style>
+  </dgm:styleLbl>
+  <dgm:styleLbl name="fgImgPlace1">
+    <dgm:scene3d>
+      <a:camera prst="orthographicFront"/>
+      <a:lightRig rig="threePt" dir="t"/>
+    </dgm:scene3d>
+    <dgm:sp3d/>
+    <dgm:txPr/>
+    <dgm:style>
+      <a:lnRef idx="2">
+        <a:scrgbClr r="0" g="0" b="0"/>
+      </a:lnRef>
+      <a:fillRef idx="1">
+        <a:scrgbClr r="0" g="0" b="0"/>
+      </a:fillRef>
+      <a:effectRef idx="0">
+        <a:scrgbClr r="0" g="0" b="0"/>
+      </a:effectRef>
+      <a:fontRef idx="minor"/>
+    </dgm:style>
+  </dgm:styleLbl>
+  <dgm:styleLbl name="alignImgPlace1">
+    <dgm:scene3d>
+      <a:camera prst="orthographicFront"/>
+      <a:lightRig rig="threePt" dir="t"/>
+    </dgm:scene3d>
+    <dgm:sp3d/>
+    <dgm:txPr/>
+    <dgm:style>
+      <a:lnRef idx="2">
+        <a:scrgbClr r="0" g="0" b="0"/>
+      </a:lnRef>
+      <a:fillRef idx="1">
+        <a:scrgbClr r="0" g="0" b="0"/>
+      </a:fillRef>
+      <a:effectRef idx="0">
+        <a:scrgbClr r="0" g="0" b="0"/>
+      </a:effectRef>
+      <a:fontRef idx="minor"/>
+    </dgm:style>
+  </dgm:styleLbl>
+  <dgm:styleLbl name="bgImgPlace1">
+    <dgm:scene3d>
+      <a:camera prst="orthographicFront"/>
+      <a:lightRig rig="threePt" dir="t"/>
+    </dgm:scene3d>
+    <dgm:sp3d/>
+    <dgm:txPr/>
+    <dgm:style>
+      <a:lnRef idx="2">
+        <a:scrgbClr r="0" g="0" b="0"/>
+      </a:lnRef>
+      <a:fillRef idx="1">
+        <a:scrgbClr r="0" g="0" b="0"/>
+      </a:fillRef>
+      <a:effectRef idx="0">
+        <a:scrgbClr r="0" g="0" b="0"/>
+      </a:effectRef>
+      <a:fontRef idx="minor"/>
+    </dgm:style>
+  </dgm:styleLbl>
+  <dgm:styleLbl name="sibTrans2D1">
+    <dgm:scene3d>
+      <a:camera prst="orthographicFront"/>
+      <a:lightRig rig="threePt" dir="t"/>
+    </dgm:scene3d>
+    <dgm:sp3d/>
+    <dgm:txPr/>
+    <dgm:style>
+      <a:lnRef idx="0">
+        <a:scrgbClr r="0" g="0" b="0"/>
+      </a:lnRef>
+      <a:fillRef idx="1">
+        <a:scrgbClr r="0" g="0" b="0"/>
+      </a:fillRef>
+      <a:effectRef idx="0">
+        <a:scrgbClr r="0" g="0" b="0"/>
+      </a:effectRef>
+      <a:fontRef idx="minor">
+        <a:schemeClr val="lt1"/>
+      </a:fontRef>
+    </dgm:style>
+  </dgm:styleLbl>
+  <dgm:styleLbl name="fgSibTrans2D1">
+    <dgm:scene3d>
+      <a:camera prst="orthographicFront"/>
+      <a:lightRig rig="threePt" dir="t"/>
+    </dgm:scene3d>
+    <dgm:sp3d/>
+    <dgm:txPr/>
+    <dgm:style>
+      <a:lnRef idx="0">
+        <a:scrgbClr r="0" g="0" b="0"/>
+      </a:lnRef>
+      <a:fillRef idx="1">
+        <a:scrgbClr r="0" g="0" b="0"/>
+      </a:fillRef>
+      <a:effectRef idx="0">
+        <a:scrgbClr r="0" g="0" b="0"/>
+      </a:effectRef>
+      <a:fontRef idx="minor">
+        <a:schemeClr val="lt1"/>
+      </a:fontRef>
+    </dgm:style>
+  </dgm:styleLbl>
+  <dgm:styleLbl name="bgSibTrans2D1">
+    <dgm:scene3d>
+      <a:camera prst="orthographicFront"/>
+      <a:lightRig rig="threePt" dir="t"/>
+    </dgm:scene3d>
+    <dgm:sp3d/>
+    <dgm:txPr/>
+    <dgm:style>
+      <a:lnRef idx="0">
+        <a:scrgbClr r="0" g="0" b="0"/>
+      </a:lnRef>
+      <a:fillRef idx="1">
+        <a:scrgbClr r="0" g="0" b="0"/>
+      </a:fillRef>
+      <a:effectRef idx="0">
+        <a:scrgbClr r="0" g="0" b="0"/>
+      </a:effectRef>
+      <a:fontRef idx="minor">
+        <a:schemeClr val="lt1"/>
+      </a:fontRef>
+    </dgm:style>
+  </dgm:styleLbl>
+  <dgm:styleLbl name="sibTrans1D1">
+    <dgm:scene3d>
+      <a:camera prst="orthographicFront"/>
+      <a:lightRig rig="threePt" dir="t"/>
+    </dgm:scene3d>
+    <dgm:sp3d/>
+    <dgm:txPr/>
+    <dgm:style>
+      <a:lnRef idx="1">
+        <a:scrgbClr r="0" g="0" b="0"/>
+      </a:lnRef>
+      <a:fillRef idx="0">
+        <a:scrgbClr r="0" g="0" b="0"/>
+      </a:fillRef>
+      <a:effectRef idx="0">
+        <a:scrgbClr r="0" g="0" b="0"/>
+      </a:effectRef>
+      <a:fontRef idx="minor"/>
+    </dgm:style>
+  </dgm:styleLbl>
+  <dgm:styleLbl name="callout">
+    <dgm:scene3d>
+      <a:camera prst="orthographicFront"/>
+      <a:lightRig rig="threePt" dir="t"/>
+    </dgm:scene3d>
+    <dgm:sp3d/>
+    <dgm:txPr/>
+    <dgm:style>
+      <a:lnRef idx="2">
+        <a:scrgbClr r="0" g="0" b="0"/>
+      </a:lnRef>
+      <a:fillRef idx="1">
+        <a:scrgbClr r="0" g="0" b="0"/>
+      </a:fillRef>
+      <a:effectRef idx="0">
+        <a:scrgbClr r="0" g="0" b="0"/>
+      </a:effectRef>
+      <a:fontRef idx="minor"/>
+    </dgm:style>
+  </dgm:styleLbl>
+  <dgm:styleLbl name="asst0">
+    <dgm:scene3d>
+      <a:camera prst="orthographicFront"/>
+      <a:lightRig rig="threePt" dir="t"/>
+    </dgm:scene3d>
+    <dgm:sp3d/>
+    <dgm:txPr/>
+    <dgm:style>
+      <a:lnRef idx="2">
+        <a:scrgbClr r="0" g="0" b="0"/>
+      </a:lnRef>
+      <a:fillRef idx="1">
+        <a:scrgbClr r="0" g="0" b="0"/>
+      </a:fillRef>
+      <a:effectRef idx="0">
+        <a:scrgbClr r="0" g="0" b="0"/>
+      </a:effectRef>
+      <a:fontRef idx="minor">
+        <a:schemeClr val="lt1"/>
+      </a:fontRef>
+    </dgm:style>
+  </dgm:styleLbl>
+  <dgm:styleLbl name="asst1">
+    <dgm:scene3d>
+      <a:camera prst="orthographicFront"/>
+      <a:lightRig rig="threePt" dir="t"/>
+    </dgm:scene3d>
+    <dgm:sp3d/>
+    <dgm:txPr/>
+    <dgm:style>
+      <a:lnRef idx="2">
+        <a:scrgbClr r="0" g="0" b="0"/>
+      </a:lnRef>
+      <a:fillRef idx="1">
+        <a:scrgbClr r="0" g="0" b="0"/>
+      </a:fillRef>
+      <a:effectRef idx="0">
+        <a:scrgbClr r="0" g="0" b="0"/>
+      </a:effectRef>
+      <a:fontRef idx="minor">
+        <a:schemeClr val="lt1"/>
+      </a:fontRef>
+    </dgm:style>
+  </dgm:styleLbl>
+  <dgm:styleLbl name="asst2">
+    <dgm:scene3d>
+      <a:camera prst="orthographicFront"/>
+      <a:lightRig rig="threePt" dir="t"/>
+    </dgm:scene3d>
+    <dgm:sp3d/>
+    <dgm:txPr/>
+    <dgm:style>
+      <a:lnRef idx="2">
+        <a:scrgbClr r="0" g="0" b="0"/>
+      </a:lnRef>
+      <a:fillRef idx="1">
+        <a:scrgbClr r="0" g="0" b="0"/>
+      </a:fillRef>
+      <a:effectRef idx="0">
+        <a:scrgbClr r="0" g="0" b="0"/>
+      </a:effectRef>
+      <a:fontRef idx="minor">
+        <a:schemeClr val="lt1"/>
+      </a:fontRef>
+    </dgm:style>
+  </dgm:styleLbl>
+  <dgm:styleLbl name="asst3">
+    <dgm:scene3d>
+      <a:camera prst="orthographicFront"/>
+      <a:lightRig rig="threePt" dir="t"/>
+    </dgm:scene3d>
+    <dgm:sp3d/>
+    <dgm:txPr/>
+    <dgm:style>
+      <a:lnRef idx="2">
+        <a:scrgbClr r="0" g="0" b="0"/>
+      </a:lnRef>
+      <a:fillRef idx="1">
+        <a:scrgbClr r="0" g="0" b="0"/>
+      </a:fillRef>
+      <a:effectRef idx="0">
+        <a:scrgbClr r="0" g="0" b="0"/>
+      </a:effectRef>
+      <a:fontRef idx="minor">
+        <a:schemeClr val="lt1"/>
+      </a:fontRef>
+    </dgm:style>
+  </dgm:styleLbl>
+  <dgm:styleLbl name="asst4">
+    <dgm:scene3d>
+      <a:camera prst="orthographicFront"/>
+      <a:lightRig rig="threePt" dir="t"/>
+    </dgm:scene3d>
+    <dgm:sp3d/>
+    <dgm:txPr/>
+    <dgm:style>
+      <a:lnRef idx="2">
+        <a:scrgbClr r="0" g="0" b="0"/>
+      </a:lnRef>
+      <a:fillRef idx="1">
+        <a:scrgbClr r="0" g="0" b="0"/>
+      </a:fillRef>
+      <a:effectRef idx="0">
+        <a:scrgbClr r="0" g="0" b="0"/>
+      </a:effectRef>
+      <a:fontRef idx="minor">
+        <a:schemeClr val="lt1"/>
+      </a:fontRef>
+    </dgm:style>
+  </dgm:styleLbl>
+  <dgm:styleLbl name="parChTrans2D1">
+    <dgm:scene3d>
+      <a:camera prst="orthographicFront"/>
+      <a:lightRig rig="threePt" dir="t"/>
+    </dgm:scene3d>
+    <dgm:sp3d/>
+    <dgm:txPr/>
+    <dgm:style>
+      <a:lnRef idx="2">
+        <a:scrgbClr r="0" g="0" b="0"/>
+      </a:lnRef>
+      <a:fillRef idx="1">
+        <a:scrgbClr r="0" g="0" b="0"/>
+      </a:fillRef>
+      <a:effectRef idx="0">
+        <a:scrgbClr r="0" g="0" b="0"/>
+      </a:effectRef>
+      <a:fontRef idx="minor">
+        <a:schemeClr val="lt1"/>
+      </a:fontRef>
+    </dgm:style>
+  </dgm:styleLbl>
+  <dgm:styleLbl name="parChTrans2D2">
+    <dgm:scene3d>
+      <a:camera prst="orthographicFront"/>
+      <a:lightRig rig="threePt" dir="t"/>
+    </dgm:scene3d>
+    <dgm:sp3d/>
+    <dgm:txPr/>
+    <dgm:style>
+      <a:lnRef idx="2">
+        <a:scrgbClr r="0" g="0" b="0"/>
+      </a:lnRef>
+      <a:fillRef idx="1">
+        <a:scrgbClr r="0" g="0" b="0"/>
+      </a:fillRef>
+      <a:effectRef idx="0">
+        <a:scrgbClr r="0" g="0" b="0"/>
+      </a:effectRef>
+      <a:fontRef idx="minor">
+        <a:schemeClr val="lt1"/>
+      </a:fontRef>
+    </dgm:style>
+  </dgm:styleLbl>
+  <dgm:styleLbl name="parChTrans2D3">
+    <dgm:scene3d>
+      <a:camera prst="orthographicFront"/>
+      <a:lightRig rig="threePt" dir="t"/>
+    </dgm:scene3d>
+    <dgm:sp3d/>
+    <dgm:txPr/>
+    <dgm:style>
+      <a:lnRef idx="2">
+        <a:scrgbClr r="0" g="0" b="0"/>
+      </a:lnRef>
+      <a:fillRef idx="1">
+        <a:scrgbClr r="0" g="0" b="0"/>
+      </a:fillRef>
+      <a:effectRef idx="0">
+        <a:scrgbClr r="0" g="0" b="0"/>
+      </a:effectRef>
+      <a:fontRef idx="minor">
+        <a:schemeClr val="lt1"/>
+      </a:fontRef>
+    </dgm:style>
+  </dgm:styleLbl>
+  <dgm:styleLbl name="parChTrans2D4">
+    <dgm:scene3d>
+      <a:camera prst="orthographicFront"/>
+      <a:lightRig rig="threePt" dir="t"/>
+    </dgm:scene3d>
+    <dgm:sp3d/>
+    <dgm:txPr/>
+    <dgm:style>
+      <a:lnRef idx="2">
+        <a:scrgbClr r="0" g="0" b="0"/>
+      </a:lnRef>
+      <a:fillRef idx="1">
+        <a:scrgbClr r="0" g="0" b="0"/>
+      </a:fillRef>
+      <a:effectRef idx="0">
+        <a:scrgbClr r="0" g="0" b="0"/>
+      </a:effectRef>
+      <a:fontRef idx="minor">
+        <a:schemeClr val="lt1"/>
+      </a:fontRef>
+    </dgm:style>
+  </dgm:styleLbl>
+  <dgm:styleLbl name="parChTrans1D1">
+    <dgm:scene3d>
+      <a:camera prst="orthographicFront"/>
+      <a:lightRig rig="threePt" dir="t"/>
+    </dgm:scene3d>
+    <dgm:sp3d/>
+    <dgm:txPr/>
+    <dgm:style>
+      <a:lnRef idx="2">
+        <a:scrgbClr r="0" g="0" b="0"/>
+      </a:lnRef>
+      <a:fillRef idx="0">
+        <a:scrgbClr r="0" g="0" b="0"/>
+      </a:fillRef>
+      <a:effectRef idx="0">
+        <a:scrgbClr r="0" g="0" b="0"/>
+      </a:effectRef>
+      <a:fontRef idx="minor"/>
+    </dgm:style>
+  </dgm:styleLbl>
+  <dgm:styleLbl name="parChTrans1D2">
+    <dgm:scene3d>
+      <a:camera prst="orthographicFront"/>
+      <a:lightRig rig="threePt" dir="t"/>
+    </dgm:scene3d>
+    <dgm:sp3d/>
+    <dgm:txPr/>
+    <dgm:style>
+      <a:lnRef idx="2">
+        <a:scrgbClr r="0" g="0" b="0"/>
+      </a:lnRef>
+      <a:fillRef idx="0">
+        <a:scrgbClr r="0" g="0" b="0"/>
+      </a:fillRef>
+      <a:effectRef idx="0">
+        <a:scrgbClr r="0" g="0" b="0"/>
+      </a:effectRef>
+      <a:fontRef idx="minor"/>
+    </dgm:style>
+  </dgm:styleLbl>
+  <dgm:styleLbl name="parChTrans1D3">
+    <dgm:scene3d>
+      <a:camera prst="orthographicFront"/>
+      <a:lightRig rig="threePt" dir="t"/>
+    </dgm:scene3d>
+    <dgm:sp3d/>
+    <dgm:txPr/>
+    <dgm:style>
+      <a:lnRef idx="2">
+        <a:scrgbClr r="0" g="0" b="0"/>
+      </a:lnRef>
+      <a:fillRef idx="0">
+        <a:scrgbClr r="0" g="0" b="0"/>
+      </a:fillRef>
+      <a:effectRef idx="0">
+        <a:scrgbClr r="0" g="0" b="0"/>
+      </a:effectRef>
+      <a:fontRef idx="minor"/>
+    </dgm:style>
+  </dgm:styleLbl>
+  <dgm:styleLbl name="parChTrans1D4">
+    <dgm:scene3d>
+      <a:camera prst="orthographicFront"/>
+      <a:lightRig rig="threePt" dir="t"/>
+    </dgm:scene3d>
+    <dgm:sp3d/>
+    <dgm:txPr/>
+    <dgm:style>
+      <a:lnRef idx="2">
+        <a:scrgbClr r="0" g="0" b="0"/>
+      </a:lnRef>
+      <a:fillRef idx="0">
+        <a:scrgbClr r="0" g="0" b="0"/>
+      </a:fillRef>
+      <a:effectRef idx="0">
+        <a:scrgbClr r="0" g="0" b="0"/>
+      </a:effectRef>
+      <a:fontRef idx="minor"/>
+    </dgm:style>
+  </dgm:styleLbl>
+  <dgm:styleLbl name="fgAcc1">
+    <dgm:scene3d>
+      <a:camera prst="orthographicFront"/>
+      <a:lightRig rig="threePt" dir="t"/>
+    </dgm:scene3d>
+    <dgm:sp3d/>
+    <dgm:txPr/>
+    <dgm:style>
+      <a:lnRef idx="2">
+        <a:scrgbClr r="0" g="0" b="0"/>
+      </a:lnRef>
+      <a:fillRef idx="1">
+        <a:scrgbClr r="0" g="0" b="0"/>
+      </a:fillRef>
+      <a:effectRef idx="0">
+        <a:scrgbClr r="0" g="0" b="0"/>
+      </a:effectRef>
+      <a:fontRef idx="minor"/>
+    </dgm:style>
+  </dgm:styleLbl>
+  <dgm:styleLbl name="conFgAcc1">
+    <dgm:scene3d>
+      <a:camera prst="orthographicFront"/>
+      <a:lightRig rig="threePt" dir="t"/>
+    </dgm:scene3d>
+    <dgm:sp3d/>
+    <dgm:txPr/>
+    <dgm:style>
+      <a:lnRef idx="2">
+        <a:scrgbClr r="0" g="0" b="0"/>
+      </a:lnRef>
+      <a:fillRef idx="1">
+        <a:scrgbClr r="0" g="0" b="0"/>
+      </a:fillRef>
+      <a:effectRef idx="0">
+        <a:scrgbClr r="0" g="0" b="0"/>
+      </a:effectRef>
+      <a:fontRef idx="minor"/>
+    </dgm:style>
+  </dgm:styleLbl>
+  <dgm:styleLbl name="alignAcc1">
+    <dgm:scene3d>
+      <a:camera prst="orthographicFront"/>
+      <a:lightRig rig="threePt" dir="t"/>
+    </dgm:scene3d>
+    <dgm:sp3d/>
+    <dgm:txPr/>
+    <dgm:style>
+      <a:lnRef idx="2">
+        <a:scrgbClr r="0" g="0" b="0"/>
+      </a:lnRef>
+      <a:fillRef idx="1">
+        <a:scrgbClr r="0" g="0" b="0"/>
+      </a:fillRef>
+      <a:effectRef idx="0">
+        <a:scrgbClr r="0" g="0" b="0"/>
+      </a:effectRef>
+      <a:fontRef idx="minor"/>
+    </dgm:style>
+  </dgm:styleLbl>
+  <dgm:styleLbl name="trAlignAcc1">
+    <dgm:scene3d>
+      <a:camera prst="orthographicFront"/>
+      <a:lightRig rig="threePt" dir="t"/>
+    </dgm:scene3d>
+    <dgm:sp3d/>
+    <dgm:txPr/>
+    <dgm:style>
+      <a:lnRef idx="1">
+        <a:scrgbClr r="0" g="0" b="0"/>
+      </a:lnRef>
+      <a:fillRef idx="1">
+        <a:scrgbClr r="0" g="0" b="0"/>
+      </a:fillRef>
+      <a:effectRef idx="0">
+        <a:scrgbClr r="0" g="0" b="0"/>
+      </a:effectRef>
+      <a:fontRef idx="minor"/>
+    </dgm:style>
+  </dgm:styleLbl>
+  <dgm:styleLbl name="bgAcc1">
+    <dgm:scene3d>
+      <a:camera prst="orthographicFront"/>
+      <a:lightRig rig="threePt" dir="t"/>
+    </dgm:scene3d>
+    <dgm:sp3d/>
+    <dgm:txPr/>
+    <dgm:style>
+      <a:lnRef idx="2">
+        <a:scrgbClr r="0" g="0" b="0"/>
+      </a:lnRef>
+      <a:fillRef idx="1">
+        <a:scrgbClr r="0" g="0" b="0"/>
+      </a:fillRef>
+      <a:effectRef idx="0">
+        <a:scrgbClr r="0" g="0" b="0"/>
+      </a:effectRef>
+      <a:fontRef idx="minor"/>
+    </dgm:style>
+  </dgm:styleLbl>
+  <dgm:styleLbl name="solidFgAcc1">
+    <dgm:scene3d>
+      <a:camera prst="orthographicFront"/>
+      <a:lightRig rig="threePt" dir="t"/>
+    </dgm:scene3d>
+    <dgm:sp3d/>
+    <dgm:txPr/>
+    <dgm:style>
+      <a:lnRef idx="2">
+        <a:scrgbClr r="0" g="0" b="0"/>
+      </a:lnRef>
+      <a:fillRef idx="1">
+        <a:scrgbClr r="0" g="0" b="0"/>
+      </a:fillRef>
+      <a:effectRef idx="0">
+        <a:scrgbClr r="0" g="0" b="0"/>
+      </a:effectRef>
+      <a:fontRef idx="minor"/>
+    </dgm:style>
+  </dgm:styleLbl>
+  <dgm:styleLbl name="solidAlignAcc1">
+    <dgm:scene3d>
+      <a:camera prst="orthographicFront"/>
+      <a:lightRig rig="threePt" dir="t"/>
+    </dgm:scene3d>
+    <dgm:sp3d/>
+    <dgm:txPr/>
+    <dgm:style>
+      <a:lnRef idx="2">
+        <a:scrgbClr r="0" g="0" b="0"/>
+      </a:lnRef>
+      <a:fillRef idx="1">
+        <a:scrgbClr r="0" g="0" b="0"/>
+      </a:fillRef>
+      <a:effectRef idx="0">
+        <a:scrgbClr r="0" g="0" b="0"/>
+      </a:effectRef>
+      <a:fontRef idx="minor"/>
+    </dgm:style>
+  </dgm:styleLbl>
+  <dgm:styleLbl name="solidBgAcc1">
+    <dgm:scene3d>
+      <a:camera prst="orthographicFront"/>
+      <a:lightRig rig="threePt" dir="t"/>
+    </dgm:scene3d>
+    <dgm:sp3d/>
+    <dgm:txPr/>
+    <dgm:style>
+      <a:lnRef idx="2">
+        <a:scrgbClr r="0" g="0" b="0"/>
+      </a:lnRef>
+      <a:fillRef idx="1">
+        <a:scrgbClr r="0" g="0" b="0"/>
+      </a:fillRef>
+      <a:effectRef idx="0">
+        <a:scrgbClr r="0" g="0" b="0"/>
+      </a:effectRef>
+      <a:fontRef idx="minor"/>
+    </dgm:style>
+  </dgm:styleLbl>
+  <dgm:styleLbl name="fgAccFollowNode1">
+    <dgm:scene3d>
+      <a:camera prst="orthographicFront"/>
+      <a:lightRig rig="threePt" dir="t"/>
+    </dgm:scene3d>
+    <dgm:sp3d/>
+    <dgm:txPr/>
+    <dgm:style>
+      <a:lnRef idx="2">
+        <a:scrgbClr r="0" g="0" b="0"/>
+      </a:lnRef>
+      <a:fillRef idx="1">
+        <a:scrgbClr r="0" g="0" b="0"/>
+      </a:fillRef>
+      <a:effectRef idx="0">
+        <a:scrgbClr r="0" g="0" b="0"/>
+      </a:effectRef>
+      <a:fontRef idx="minor"/>
+    </dgm:style>
+  </dgm:styleLbl>
+  <dgm:styleLbl name="alignAccFollowNode1">
+    <dgm:scene3d>
+      <a:camera prst="orthographicFront"/>
+      <a:lightRig rig="threePt" dir="t"/>
+    </dgm:scene3d>
+    <dgm:sp3d/>
+    <dgm:txPr/>
+    <dgm:style>
+      <a:lnRef idx="2">
+        <a:scrgbClr r="0" g="0" b="0"/>
+      </a:lnRef>
+      <a:fillRef idx="1">
+        <a:scrgbClr r="0" g="0" b="0"/>
+      </a:fillRef>
+      <a:effectRef idx="0">
+        <a:scrgbClr r="0" g="0" b="0"/>
+      </a:effectRef>
+      <a:fontRef idx="minor"/>
+    </dgm:style>
+  </dgm:styleLbl>
+  <dgm:styleLbl name="bgAccFollowNode1">
+    <dgm:scene3d>
+      <a:camera prst="orthographicFront"/>
+      <a:lightRig rig="threePt" dir="t"/>
+    </dgm:scene3d>
+    <dgm:sp3d/>
+    <dgm:txPr/>
+    <dgm:style>
+      <a:lnRef idx="2">
+        <a:scrgbClr r="0" g="0" b="0"/>
+      </a:lnRef>
+      <a:fillRef idx="1">
+        <a:scrgbClr r="0" g="0" b="0"/>
+      </a:fillRef>
+      <a:effectRef idx="0">
+        <a:scrgbClr r="0" g="0" b="0"/>
+      </a:effectRef>
+      <a:fontRef idx="minor"/>
+    </dgm:style>
+  </dgm:styleLbl>
+  <dgm:styleLbl name="fgAcc0">
+    <dgm:scene3d>
+      <a:camera prst="orthographicFront"/>
+      <a:lightRig rig="threePt" dir="t"/>
+    </dgm:scene3d>
+    <dgm:sp3d/>
+    <dgm:txPr/>
+    <dgm:style>
+      <a:lnRef idx="2">
+        <a:scrgbClr r="0" g="0" b="0"/>
+      </a:lnRef>
+      <a:fillRef idx="1">
+        <a:scrgbClr r="0" g="0" b="0"/>
+      </a:fillRef>
+      <a:effectRef idx="0">
+        <a:scrgbClr r="0" g="0" b="0"/>
+      </a:effectRef>
+      <a:fontRef idx="minor"/>
+    </dgm:style>
+  </dgm:styleLbl>
+  <dgm:styleLbl name="fgAcc2">
+    <dgm:scene3d>
+      <a:camera prst="orthographicFront"/>
+      <a:lightRig rig="threePt" dir="t"/>
+    </dgm:scene3d>
+    <dgm:sp3d/>
+    <dgm:txPr/>
+    <dgm:style>
+      <a:lnRef idx="2">
+        <a:scrgbClr r="0" g="0" b="0"/>
+      </a:lnRef>
+      <a:fillRef idx="1">
+        <a:scrgbClr r="0" g="0" b="0"/>
+      </a:fillRef>
+      <a:effectRef idx="0">
+        <a:scrgbClr r="0" g="0" b="0"/>
+      </a:effectRef>
+      <a:fontRef idx="minor"/>
+    </dgm:style>
+  </dgm:styleLbl>
+  <dgm:styleLbl name="fgAcc3">
+    <dgm:scene3d>
+      <a:camera prst="orthographicFront"/>
+      <a:lightRig rig="threePt" dir="t"/>
+    </dgm:scene3d>
+    <dgm:sp3d/>
+    <dgm:txPr/>
+    <dgm:style>
+      <a:lnRef idx="2">
+        <a:scrgbClr r="0" g="0" b="0"/>
+      </a:lnRef>
+      <a:fillRef idx="1">
+        <a:scrgbClr r="0" g="0" b="0"/>
+      </a:fillRef>
+      <a:effectRef idx="0">
+        <a:scrgbClr r="0" g="0" b="0"/>
+      </a:effectRef>
+      <a:fontRef idx="minor"/>
+    </dgm:style>
+  </dgm:styleLbl>
+  <dgm:styleLbl name="fgAcc4">
+    <dgm:scene3d>
+      <a:camera prst="orthographicFront"/>
+      <a:lightRig rig="threePt" dir="t"/>
+    </dgm:scene3d>
+    <dgm:sp3d/>
+    <dgm:txPr/>
+    <dgm:style>
+      <a:lnRef idx="2">
+        <a:scrgbClr r="0" g="0" b="0"/>
+      </a:lnRef>
+      <a:fillRef idx="1">
+        <a:scrgbClr r="0" g="0" b="0"/>
+      </a:fillRef>
+      <a:effectRef idx="0">
+        <a:scrgbClr r="0" g="0" b="0"/>
+      </a:effectRef>
+      <a:fontRef idx="minor"/>
+    </dgm:style>
+  </dgm:styleLbl>
+  <dgm:styleLbl name="bgShp">
+    <dgm:scene3d>
+      <a:camera prst="orthographicFront"/>
+      <a:lightRig rig="threePt" dir="t"/>
+    </dgm:scene3d>
+    <dgm:sp3d/>
+    <dgm:txPr/>
+    <dgm:style>
+      <a:lnRef idx="0">
+        <a:scrgbClr r="0" g="0" b="0"/>
+      </a:lnRef>
+      <a:fillRef idx="1">
+        <a:scrgbClr r="0" g="0" b="0"/>
+      </a:fillRef>
+      <a:effectRef idx="0">
+        <a:scrgbClr r="0" g="0" b="0"/>
+      </a:effectRef>
+      <a:fontRef idx="minor"/>
+    </dgm:style>
+  </dgm:styleLbl>
+  <dgm:styleLbl name="dkBgShp">
+    <dgm:scene3d>
+      <a:camera prst="orthographicFront"/>
+      <a:lightRig rig="threePt" dir="t"/>
+    </dgm:scene3d>
+    <dgm:sp3d/>
+    <dgm:txPr/>
+    <dgm:style>
+      <a:lnRef idx="0">
+        <a:scrgbClr r="0" g="0" b="0"/>
+      </a:lnRef>
+      <a:fillRef idx="1">
+        <a:scrgbClr r="0" g="0" b="0"/>
+      </a:fillRef>
+      <a:effectRef idx="0">
+        <a:scrgbClr r="0" g="0" b="0"/>
+      </a:effectRef>
+      <a:fontRef idx="minor"/>
+    </dgm:style>
+  </dgm:styleLbl>
+  <dgm:styleLbl name="trBgShp">
+    <dgm:scene3d>
+      <a:camera prst="orthographicFront"/>
+      <a:lightRig rig="threePt" dir="t"/>
+    </dgm:scene3d>
+    <dgm:sp3d/>
+    <dgm:txPr/>
+    <dgm:style>
+      <a:lnRef idx="0">
+        <a:scrgbClr r="0" g="0" b="0"/>
+      </a:lnRef>
+      <a:fillRef idx="1">
+        <a:scrgbClr r="0" g="0" b="0"/>
+      </a:fillRef>
+      <a:effectRef idx="0">
+        <a:scrgbClr r="0" g="0" b="0"/>
+      </a:effectRef>
+      <a:fontRef idx="minor"/>
+    </dgm:style>
+  </dgm:styleLbl>
+  <dgm:styleLbl name="fgShp">
+    <dgm:scene3d>
+      <a:camera prst="orthographicFront"/>
+      <a:lightRig rig="threePt" dir="t"/>
+    </dgm:scene3d>
+    <dgm:sp3d/>
+    <dgm:txPr/>
+    <dgm:style>
+      <a:lnRef idx="2">
+        <a:scrgbClr r="0" g="0" b="0"/>
+      </a:lnRef>
+      <a:fillRef idx="1">
+        <a:scrgbClr r="0" g="0" b="0"/>
+      </a:fillRef>
+      <a:effectRef idx="0">
+        <a:scrgbClr r="0" g="0" b="0"/>
+      </a:effectRef>
+      <a:fontRef idx="minor"/>
+    </dgm:style>
+  </dgm:styleLbl>
+  <dgm:styleLbl name="revTx">
+    <dgm:scene3d>
+      <a:camera prst="orthographicFront"/>
+      <a:lightRig rig="threePt" dir="t"/>
+    </dgm:scene3d>
+    <dgm:sp3d/>
+    <dgm:txPr/>
+    <dgm:style>
+      <a:lnRef idx="0">
+        <a:scrgbClr r="0" g="0" b="0"/>
+      </a:lnRef>
+      <a:fillRef idx="0">
+        <a:scrgbClr r="0" g="0" b="0"/>
+      </a:fillRef>
+      <a:effectRef idx="0">
+        <a:scrgbClr r="0" g="0" b="0"/>
+      </a:effectRef>
+      <a:fontRef idx="minor"/>
+    </dgm:style>
+  </dgm:styleLbl>
+</dgm:styleDef>
+</file>
+
 <file path=ppt/handoutMasters/handoutMaster1.xml><?xml version="1.0" encoding="utf-8"?>
 <p:handoutMaster xmlns:a="http://schemas.openxmlformats.org/drawingml/2006/main" xmlns:r="http://schemas.openxmlformats.org/officeDocument/2006/relationships" xmlns:p="http://schemas.openxmlformats.org/presentationml/2006/main">
   <p:cSld>
@@ -244,7 +3366,7 @@
           <a:p>
             <a:fld id="{52E54C03-13CE-40C0-B42C-6EDFF4D54357}" type="datetimeFigureOut">
               <a:rPr lang="en-US" smtClean="0"/>
-              <a:t>5/14/2019</a:t>
+              <a:t>5/16/2019</a:t>
             </a:fld>
             <a:endParaRPr lang="en-US"/>
           </a:p>
@@ -409,7 +3531,7 @@
           <a:p>
             <a:fld id="{7159C058-D2F1-4477-8515-F50B3956F3CD}" type="datetimeFigureOut">
               <a:rPr lang="en-US" smtClean="0"/>
-              <a:t>5/14/2019</a:t>
+              <a:t>5/16/2019</a:t>
             </a:fld>
             <a:endParaRPr lang="en-US"/>
           </a:p>
@@ -2731,6 +5853,127 @@
           <a:p>
             <a:r>
               <a:rPr lang="en-US" dirty="0"/>
+              <a:t>Data Transformation Summary</a:t>
+            </a:r>
+          </a:p>
+        </p:txBody>
+      </p:sp>
+      <p:graphicFrame>
+        <p:nvGraphicFramePr>
+          <p:cNvPr id="5" name="Content Placeholder 4">
+            <a:extLst>
+              <a:ext uri="{FF2B5EF4-FFF2-40B4-BE49-F238E27FC236}">
+                <a16:creationId xmlns:a16="http://schemas.microsoft.com/office/drawing/2014/main" id="{F7537A47-4D53-40EB-BC00-FCEB60FD0A3B}"/>
+              </a:ext>
+            </a:extLst>
+          </p:cNvPr>
+          <p:cNvGraphicFramePr>
+            <a:graphicFrameLocks noGrp="1"/>
+          </p:cNvGraphicFramePr>
+          <p:nvPr>
+            <p:ph idx="1"/>
+            <p:extLst>
+              <p:ext uri="{D42A27DB-BD31-4B8C-83A1-F6EECF244321}">
+                <p14:modId xmlns:p14="http://schemas.microsoft.com/office/powerpoint/2010/main" val="572167881"/>
+              </p:ext>
+            </p:extLst>
+          </p:nvPr>
+        </p:nvGraphicFramePr>
+        <p:xfrm>
+          <a:off x="181429" y="992189"/>
+          <a:ext cx="8692696" cy="5345112"/>
+        </p:xfrm>
+        <a:graphic>
+          <a:graphicData uri="http://schemas.openxmlformats.org/drawingml/2006/diagram">
+            <dgm:relIds xmlns:dgm="http://schemas.openxmlformats.org/drawingml/2006/diagram" xmlns:r="http://schemas.openxmlformats.org/officeDocument/2006/relationships" r:dm="rId2" r:lo="rId3" r:qs="rId4" r:cs="rId5"/>
+          </a:graphicData>
+        </a:graphic>
+      </p:graphicFrame>
+      <p:sp>
+        <p:nvSpPr>
+          <p:cNvPr id="4" name="Slide Number Placeholder 3"/>
+          <p:cNvSpPr>
+            <a:spLocks noGrp="1"/>
+          </p:cNvSpPr>
+          <p:nvPr>
+            <p:ph type="sldNum" sz="quarter" idx="4"/>
+          </p:nvPr>
+        </p:nvSpPr>
+        <p:spPr/>
+        <p:txBody>
+          <a:bodyPr/>
+          <a:lstStyle/>
+          <a:p>
+            <a:fld id="{37CB541D-F291-4562-B47C-62A886D26F12}" type="slidenum">
+              <a:rPr lang="en-US" smtClean="0">
+                <a:solidFill>
+                  <a:prstClr val="black">
+                    <a:lumMod val="50000"/>
+                    <a:lumOff val="50000"/>
+                  </a:prstClr>
+                </a:solidFill>
+              </a:rPr>
+              <a:pPr/>
+              <a:t>5</a:t>
+            </a:fld>
+            <a:endParaRPr lang="en-US" dirty="0">
+              <a:solidFill>
+                <a:prstClr val="black">
+                  <a:lumMod val="50000"/>
+                  <a:lumOff val="50000"/>
+                </a:prstClr>
+              </a:solidFill>
+            </a:endParaRPr>
+          </a:p>
+        </p:txBody>
+      </p:sp>
+    </p:spTree>
+    <p:extLst>
+      <p:ext uri="{BB962C8B-B14F-4D97-AF65-F5344CB8AC3E}">
+        <p14:creationId xmlns:p14="http://schemas.microsoft.com/office/powerpoint/2010/main" val="1095640628"/>
+      </p:ext>
+    </p:extLst>
+  </p:cSld>
+  <p:clrMapOvr>
+    <a:masterClrMapping/>
+  </p:clrMapOvr>
+</p:sld>
+</file>
+
+<file path=ppt/slides/slide6.xml><?xml version="1.0" encoding="utf-8"?>
+<p:sld xmlns:a="http://schemas.openxmlformats.org/drawingml/2006/main" xmlns:r="http://schemas.openxmlformats.org/officeDocument/2006/relationships" xmlns:p="http://schemas.openxmlformats.org/presentationml/2006/main">
+  <p:cSld>
+    <p:spTree>
+      <p:nvGrpSpPr>
+        <p:cNvPr id="1" name=""/>
+        <p:cNvGrpSpPr/>
+        <p:nvPr/>
+      </p:nvGrpSpPr>
+      <p:grpSpPr>
+        <a:xfrm>
+          <a:off x="0" y="0"/>
+          <a:ext cx="0" cy="0"/>
+          <a:chOff x="0" y="0"/>
+          <a:chExt cx="0" cy="0"/>
+        </a:xfrm>
+      </p:grpSpPr>
+      <p:sp>
+        <p:nvSpPr>
+          <p:cNvPr id="2" name="Title 1"/>
+          <p:cNvSpPr>
+            <a:spLocks noGrp="1"/>
+          </p:cNvSpPr>
+          <p:nvPr>
+            <p:ph type="title"/>
+          </p:nvPr>
+        </p:nvSpPr>
+        <p:spPr/>
+        <p:txBody>
+          <a:bodyPr/>
+          <a:lstStyle/>
+          <a:p>
+            <a:r>
+              <a:rPr lang="en-US" dirty="0"/>
               <a:t>Exploratory Analysis Summary</a:t>
             </a:r>
           </a:p>
@@ -2794,7 +6037,7 @@
                 </a:solidFill>
               </a:rPr>
               <a:pPr/>
-              <a:t>5</a:t>
+              <a:t>6</a:t>
             </a:fld>
             <a:endParaRPr lang="en-US" dirty="0">
               <a:solidFill>
@@ -2856,115 +6099,6 @@
 </p:sld>
 </file>
 
-<file path=ppt/slides/slide6.xml><?xml version="1.0" encoding="utf-8"?>
-<p:sld xmlns:a="http://schemas.openxmlformats.org/drawingml/2006/main" xmlns:r="http://schemas.openxmlformats.org/officeDocument/2006/relationships" xmlns:p="http://schemas.openxmlformats.org/presentationml/2006/main">
-  <p:cSld>
-    <p:spTree>
-      <p:nvGrpSpPr>
-        <p:cNvPr id="1" name=""/>
-        <p:cNvGrpSpPr/>
-        <p:nvPr/>
-      </p:nvGrpSpPr>
-      <p:grpSpPr>
-        <a:xfrm>
-          <a:off x="0" y="0"/>
-          <a:ext cx="0" cy="0"/>
-          <a:chOff x="0" y="0"/>
-          <a:chExt cx="0" cy="0"/>
-        </a:xfrm>
-      </p:grpSpPr>
-      <p:sp>
-        <p:nvSpPr>
-          <p:cNvPr id="2" name="Title 1"/>
-          <p:cNvSpPr>
-            <a:spLocks noGrp="1"/>
-          </p:cNvSpPr>
-          <p:nvPr>
-            <p:ph type="title"/>
-          </p:nvPr>
-        </p:nvSpPr>
-        <p:spPr/>
-        <p:txBody>
-          <a:bodyPr/>
-          <a:lstStyle/>
-          <a:p>
-            <a:r>
-              <a:rPr lang="en-US" dirty="0"/>
-              <a:t>Data Transformation Summary</a:t>
-            </a:r>
-          </a:p>
-        </p:txBody>
-      </p:sp>
-      <p:sp>
-        <p:nvSpPr>
-          <p:cNvPr id="3" name="Content Placeholder 2"/>
-          <p:cNvSpPr>
-            <a:spLocks noGrp="1"/>
-          </p:cNvSpPr>
-          <p:nvPr>
-            <p:ph idx="1"/>
-          </p:nvPr>
-        </p:nvSpPr>
-        <p:spPr/>
-        <p:txBody>
-          <a:bodyPr/>
-          <a:lstStyle/>
-          <a:p>
-            <a:endParaRPr lang="en-US" dirty="0"/>
-          </a:p>
-        </p:txBody>
-      </p:sp>
-      <p:sp>
-        <p:nvSpPr>
-          <p:cNvPr id="4" name="Slide Number Placeholder 3"/>
-          <p:cNvSpPr>
-            <a:spLocks noGrp="1"/>
-          </p:cNvSpPr>
-          <p:nvPr>
-            <p:ph type="sldNum" sz="quarter" idx="4"/>
-          </p:nvPr>
-        </p:nvSpPr>
-        <p:spPr/>
-        <p:txBody>
-          <a:bodyPr/>
-          <a:lstStyle/>
-          <a:p>
-            <a:fld id="{37CB541D-F291-4562-B47C-62A886D26F12}" type="slidenum">
-              <a:rPr lang="en-US" smtClean="0">
-                <a:solidFill>
-                  <a:prstClr val="black">
-                    <a:lumMod val="50000"/>
-                    <a:lumOff val="50000"/>
-                  </a:prstClr>
-                </a:solidFill>
-              </a:rPr>
-              <a:pPr/>
-              <a:t>6</a:t>
-            </a:fld>
-            <a:endParaRPr lang="en-US" dirty="0">
-              <a:solidFill>
-                <a:prstClr val="black">
-                  <a:lumMod val="50000"/>
-                  <a:lumOff val="50000"/>
-                </a:prstClr>
-              </a:solidFill>
-            </a:endParaRPr>
-          </a:p>
-        </p:txBody>
-      </p:sp>
-    </p:spTree>
-    <p:extLst>
-      <p:ext uri="{BB962C8B-B14F-4D97-AF65-F5344CB8AC3E}">
-        <p14:creationId xmlns:p14="http://schemas.microsoft.com/office/powerpoint/2010/main" val="1095640628"/>
-      </p:ext>
-    </p:extLst>
-  </p:cSld>
-  <p:clrMapOvr>
-    <a:masterClrMapping/>
-  </p:clrMapOvr>
-</p:sld>
-</file>
-
 <file path=ppt/slides/slide7.xml><?xml version="1.0" encoding="utf-8"?>
 <p:sld xmlns:a="http://schemas.openxmlformats.org/drawingml/2006/main" xmlns:r="http://schemas.openxmlformats.org/officeDocument/2006/relationships" xmlns:p="http://schemas.openxmlformats.org/presentationml/2006/main">
   <p:cSld>
@@ -3028,10 +6162,48 @@
         </p:nvSpPr>
         <p:spPr/>
         <p:txBody>
-          <a:bodyPr/>
+          <a:bodyPr>
+            <a:normAutofit/>
+          </a:bodyPr>
           <a:lstStyle/>
           <a:p>
-            <a:endParaRPr lang="en-US"/>
+            <a:r>
+              <a:rPr lang="en-US" sz="2000" dirty="0"/>
+              <a:t>We tried Lasso Regression</a:t>
+            </a:r>
+          </a:p>
+          <a:p>
+            <a:pPr lvl="1"/>
+            <a:r>
+              <a:rPr lang="en-US" sz="2000" dirty="0"/>
+              <a:t>This was horrible</a:t>
+            </a:r>
+          </a:p>
+          <a:p>
+            <a:r>
+              <a:rPr lang="en-US" sz="2000" dirty="0"/>
+              <a:t>We tried Neural Networks</a:t>
+            </a:r>
+          </a:p>
+          <a:p>
+            <a:pPr lvl="1"/>
+            <a:r>
+              <a:rPr lang="en-US" sz="2000" dirty="0"/>
+              <a:t>This made me want to cry</a:t>
+            </a:r>
+          </a:p>
+          <a:p>
+            <a:r>
+              <a:rPr lang="en-US" sz="2000" dirty="0"/>
+              <a:t>We tried Random Forest Linear Regression</a:t>
+            </a:r>
+          </a:p>
+          <a:p>
+            <a:pPr lvl="1"/>
+            <a:r>
+              <a:rPr lang="en-US" sz="2000" dirty="0"/>
+              <a:t>This worked gloriously!</a:t>
+            </a:r>
           </a:p>
         </p:txBody>
       </p:sp>
@@ -3132,13 +6304,8 @@
           <a:p>
             <a:r>
               <a:rPr lang="en-US" dirty="0"/>
-              <a:t>Model </a:t>
+              <a:t>Model Explanation</a:t>
             </a:r>
-            <a:r>
-              <a:rPr lang="en-US" dirty="0" err="1"/>
-              <a:t>Explaination</a:t>
-            </a:r>
-            <a:endParaRPr lang="en-US" dirty="0"/>
           </a:p>
         </p:txBody>
       </p:sp>
@@ -3163,6 +6330,108 @@
           <a:bodyPr/>
           <a:lstStyle/>
           <a:p>
+            <a:r>
+              <a:rPr lang="en-US" dirty="0"/>
+              <a:t>We fed in 4 variables: </a:t>
+            </a:r>
+          </a:p>
+          <a:p>
+            <a:pPr lvl="1"/>
+            <a:r>
+              <a:rPr lang="en-US" dirty="0"/>
+              <a:t>Zillow Size Rank</a:t>
+            </a:r>
+          </a:p>
+          <a:p>
+            <a:pPr lvl="1"/>
+            <a:r>
+              <a:rPr lang="en-US" dirty="0"/>
+              <a:t>Incomes</a:t>
+            </a:r>
+          </a:p>
+          <a:p>
+            <a:pPr lvl="1"/>
+            <a:r>
+              <a:rPr lang="en-US" dirty="0"/>
+              <a:t>Unemployment rate</a:t>
+            </a:r>
+          </a:p>
+          <a:p>
+            <a:pPr lvl="1"/>
+            <a:r>
+              <a:rPr lang="en-US" dirty="0"/>
+              <a:t>30 Year Mortgage Rate</a:t>
+            </a:r>
+          </a:p>
+          <a:p>
+            <a:r>
+              <a:rPr lang="en-US" dirty="0"/>
+              <a:t>This gage us a training set of over 45,000 observations</a:t>
+            </a:r>
+          </a:p>
+          <a:p>
+            <a:r>
+              <a:rPr lang="en-US" dirty="0"/>
+              <a:t>Random Forest Parameters</a:t>
+            </a:r>
+          </a:p>
+          <a:p>
+            <a:pPr lvl="1"/>
+            <a:r>
+              <a:rPr lang="en-US" dirty="0"/>
+              <a:t>We used a max depth of 30</a:t>
+            </a:r>
+          </a:p>
+          <a:p>
+            <a:pPr lvl="1"/>
+            <a:r>
+              <a:rPr lang="en-US" dirty="0"/>
+              <a:t>A sample size of 500</a:t>
+            </a:r>
+          </a:p>
+          <a:p>
+            <a:r>
+              <a:rPr lang="en-US" dirty="0"/>
+              <a:t>Importance Levels</a:t>
+            </a:r>
+          </a:p>
+          <a:p>
+            <a:pPr lvl="1"/>
+            <a:r>
+              <a:rPr lang="en-US" dirty="0"/>
+              <a:t>Size Rank = 22.5%</a:t>
+            </a:r>
+          </a:p>
+          <a:p>
+            <a:pPr lvl="1"/>
+            <a:r>
+              <a:rPr lang="en-US" dirty="0"/>
+              <a:t>Unemployment = 8.5%</a:t>
+            </a:r>
+          </a:p>
+          <a:p>
+            <a:pPr lvl="1"/>
+            <a:r>
+              <a:rPr lang="en-US" dirty="0"/>
+              <a:t>Mortgage Rates = 25%</a:t>
+            </a:r>
+          </a:p>
+          <a:p>
+            <a:pPr lvl="1"/>
+            <a:r>
+              <a:rPr lang="en-US" dirty="0"/>
+              <a:t>Incomes = 66.5%</a:t>
+            </a:r>
+          </a:p>
+          <a:p>
+            <a:pPr lvl="1"/>
+            <a:endParaRPr lang="en-US" dirty="0"/>
+          </a:p>
+          <a:p>
+            <a:pPr lvl="1"/>
+            <a:endParaRPr lang="en-US" dirty="0"/>
+          </a:p>
+          <a:p>
             <a:endParaRPr lang="en-US" dirty="0"/>
           </a:p>
         </p:txBody>
@@ -3211,6 +6480,36 @@
           </a:p>
         </p:txBody>
       </p:sp>
+      <p:pic>
+        <p:nvPicPr>
+          <p:cNvPr id="5" name="Picture 4">
+            <a:extLst>
+              <a:ext uri="{FF2B5EF4-FFF2-40B4-BE49-F238E27FC236}">
+                <a16:creationId xmlns:a16="http://schemas.microsoft.com/office/drawing/2014/main" id="{57F1CBF7-ADE4-4C8E-88B8-6ED4153739DE}"/>
+              </a:ext>
+            </a:extLst>
+          </p:cNvPr>
+          <p:cNvPicPr>
+            <a:picLocks noChangeAspect="1"/>
+          </p:cNvPicPr>
+          <p:nvPr/>
+        </p:nvPicPr>
+        <p:blipFill>
+          <a:blip r:embed="rId2"/>
+          <a:stretch>
+            <a:fillRect/>
+          </a:stretch>
+        </p:blipFill>
+        <p:spPr>
+          <a:xfrm>
+            <a:off x="345746" y="4421504"/>
+            <a:ext cx="8054773" cy="584835"/>
+          </a:xfrm>
+          <a:prstGeom prst="rect">
+            <a:avLst/>
+          </a:prstGeom>
+        </p:spPr>
+      </p:pic>
     </p:spTree>
     <p:extLst>
       <p:ext uri="{BB962C8B-B14F-4D97-AF65-F5344CB8AC3E}">
@@ -4207,12 +7506,9 @@
 </file>
 
 <file path=customXml/item1.xml><?xml version="1.0" encoding="utf-8"?>
-<?mso-contentType ?>
-<FormTemplates xmlns="http://schemas.microsoft.com/sharepoint/v3/contenttype/forms">
-  <Display>DocumentLibraryForm</Display>
-  <Edit>DocumentLibraryForm</Edit>
-  <New>DocumentLibraryForm</New>
-</FormTemplates>
+<p:properties xmlns:p="http://schemas.microsoft.com/office/2006/metadata/properties" xmlns:xsi="http://www.w3.org/2001/XMLSchema-instance">
+  <documentManagement/>
+</p:properties>
 </file>
 
 <file path=customXml/item2.xml><?xml version="1.0" encoding="utf-8"?>
@@ -4265,15 +7561,24 @@
 </file>
 
 <file path=customXml/item3.xml><?xml version="1.0" encoding="utf-8"?>
-<p:properties xmlns:p="http://schemas.microsoft.com/office/2006/metadata/properties" xmlns:xsi="http://www.w3.org/2001/XMLSchema-instance">
-  <documentManagement/>
-</p:properties>
+<?mso-contentType ?>
+<FormTemplates xmlns="http://schemas.microsoft.com/sharepoint/v3/contenttype/forms">
+  <Display>DocumentLibraryForm</Display>
+  <Edit>DocumentLibraryForm</Edit>
+  <New>DocumentLibraryForm</New>
+</FormTemplates>
 </file>
 
 <file path=customXml/itemProps1.xml><?xml version="1.0" encoding="utf-8"?>
-<ds:datastoreItem xmlns:ds="http://schemas.openxmlformats.org/officeDocument/2006/customXml" ds:itemID="{063CCCBC-B7A1-4566-9DE9-0A821E9534E4}">
+<ds:datastoreItem xmlns:ds="http://schemas.openxmlformats.org/officeDocument/2006/customXml" ds:itemID="{EF5AC248-3016-4BC6-95F6-3E0EE4575AFB}">
   <ds:schemaRefs>
-    <ds:schemaRef ds:uri="http://schemas.microsoft.com/sharepoint/v3/contenttype/forms"/>
+    <ds:schemaRef ds:uri="http://schemas.microsoft.com/office/2006/documentManagement/types"/>
+    <ds:schemaRef ds:uri="http://purl.org/dc/elements/1.1/"/>
+    <ds:schemaRef ds:uri="http://schemas.microsoft.com/office/2006/metadata/properties"/>
+    <ds:schemaRef ds:uri="http://purl.org/dc/terms/"/>
+    <ds:schemaRef ds:uri="http://schemas.openxmlformats.org/package/2006/metadata/core-properties"/>
+    <ds:schemaRef ds:uri="http://www.w3.org/XML/1998/namespace"/>
+    <ds:schemaRef ds:uri="http://purl.org/dc/dcmitype/"/>
   </ds:schemaRefs>
 </ds:datastoreItem>
 </file>
@@ -4294,15 +7599,9 @@
 </file>
 
 <file path=customXml/itemProps3.xml><?xml version="1.0" encoding="utf-8"?>
-<ds:datastoreItem xmlns:ds="http://schemas.openxmlformats.org/officeDocument/2006/customXml" ds:itemID="{EF5AC248-3016-4BC6-95F6-3E0EE4575AFB}">
+<ds:datastoreItem xmlns:ds="http://schemas.openxmlformats.org/officeDocument/2006/customXml" ds:itemID="{063CCCBC-B7A1-4566-9DE9-0A821E9534E4}">
   <ds:schemaRefs>
-    <ds:schemaRef ds:uri="http://schemas.microsoft.com/office/2006/documentManagement/types"/>
-    <ds:schemaRef ds:uri="http://purl.org/dc/elements/1.1/"/>
-    <ds:schemaRef ds:uri="http://schemas.microsoft.com/office/2006/metadata/properties"/>
-    <ds:schemaRef ds:uri="http://purl.org/dc/terms/"/>
-    <ds:schemaRef ds:uri="http://schemas.openxmlformats.org/package/2006/metadata/core-properties"/>
-    <ds:schemaRef ds:uri="http://www.w3.org/XML/1998/namespace"/>
-    <ds:schemaRef ds:uri="http://purl.org/dc/dcmitype/"/>
+    <ds:schemaRef ds:uri="http://schemas.microsoft.com/sharepoint/v3/contenttype/forms"/>
   </ds:schemaRefs>
 </ds:datastoreItem>
 </file>
</xml_diff>